<commit_message>
fix for upgraded RestAssured
</commit_message>
<xml_diff>
--- a/doc/advanced/slides/lesson_04.pptx
+++ b/doc/advanced/slides/lesson_04.pptx
@@ -5,7 +5,7 @@
     <p:sldMasterId id="2147483648" r:id="rId1"/>
   </p:sldMasterIdLst>
   <p:notesMasterIdLst>
-    <p:notesMasterId r:id="rId25"/>
+    <p:notesMasterId r:id="rId26"/>
   </p:notesMasterIdLst>
   <p:sldIdLst>
     <p:sldId id="256" r:id="rId2"/>
@@ -28,9 +28,10 @@
     <p:sldId id="283" r:id="rId19"/>
     <p:sldId id="284" r:id="rId20"/>
     <p:sldId id="285" r:id="rId21"/>
-    <p:sldId id="286" r:id="rId22"/>
-    <p:sldId id="287" r:id="rId23"/>
-    <p:sldId id="271" r:id="rId24"/>
+    <p:sldId id="292" r:id="rId22"/>
+    <p:sldId id="286" r:id="rId23"/>
+    <p:sldId id="287" r:id="rId24"/>
+    <p:sldId id="271" r:id="rId25"/>
   </p:sldIdLst>
   <p:sldSz cx="12192000" cy="6858000"/>
   <p:notesSz cx="6858000" cy="9144000"/>
@@ -219,7 +220,7 @@
           <a:p>
             <a:fld id="{9B5B52BA-3295-0343-9E28-A260A811DD10}" type="datetimeFigureOut">
               <a:rPr lang="en-US" smtClean="0"/>
-              <a:t>06-Aug-19</a:t>
+              <a:t>12-Aug-19</a:t>
             </a:fld>
             <a:endParaRPr lang="en-US"/>
           </a:p>
@@ -551,7 +552,7 @@
           <a:p>
             <a:fld id="{D6FB5A5B-CC88-B64A-8F56-0DBE0ACA83DE}" type="slidenum">
               <a:rPr lang="en-US" smtClean="0"/>
-              <a:t>23</a:t>
+              <a:t>24</a:t>
             </a:fld>
             <a:endParaRPr lang="en-US"/>
           </a:p>
@@ -699,7 +700,7 @@
           <a:p>
             <a:fld id="{04F1D4A2-813C-F741-B481-C92B3A596030}" type="datetimeFigureOut">
               <a:rPr lang="en-US" smtClean="0"/>
-              <a:t>06-Aug-19</a:t>
+              <a:t>12-Aug-19</a:t>
             </a:fld>
             <a:endParaRPr lang="en-US"/>
           </a:p>
@@ -867,7 +868,7 @@
           <a:p>
             <a:fld id="{04F1D4A2-813C-F741-B481-C92B3A596030}" type="datetimeFigureOut">
               <a:rPr lang="en-US" smtClean="0"/>
-              <a:t>06-Aug-19</a:t>
+              <a:t>12-Aug-19</a:t>
             </a:fld>
             <a:endParaRPr lang="en-US"/>
           </a:p>
@@ -1045,7 +1046,7 @@
           <a:p>
             <a:fld id="{04F1D4A2-813C-F741-B481-C92B3A596030}" type="datetimeFigureOut">
               <a:rPr lang="en-US" smtClean="0"/>
-              <a:t>06-Aug-19</a:t>
+              <a:t>12-Aug-19</a:t>
             </a:fld>
             <a:endParaRPr lang="en-US"/>
           </a:p>
@@ -1224,7 +1225,7 @@
           <a:p>
             <a:fld id="{04F1D4A2-813C-F741-B481-C92B3A596030}" type="datetimeFigureOut">
               <a:rPr lang="en-US" smtClean="0"/>
-              <a:t>06-Aug-19</a:t>
+              <a:t>12-Aug-19</a:t>
             </a:fld>
             <a:endParaRPr lang="en-US"/>
           </a:p>
@@ -1469,7 +1470,7 @@
           <a:p>
             <a:fld id="{04F1D4A2-813C-F741-B481-C92B3A596030}" type="datetimeFigureOut">
               <a:rPr lang="en-US" smtClean="0"/>
-              <a:t>06-Aug-19</a:t>
+              <a:t>12-Aug-19</a:t>
             </a:fld>
             <a:endParaRPr lang="en-US"/>
           </a:p>
@@ -1698,7 +1699,7 @@
           <a:p>
             <a:fld id="{04F1D4A2-813C-F741-B481-C92B3A596030}" type="datetimeFigureOut">
               <a:rPr lang="en-US" smtClean="0"/>
-              <a:t>06-Aug-19</a:t>
+              <a:t>12-Aug-19</a:t>
             </a:fld>
             <a:endParaRPr lang="en-US"/>
           </a:p>
@@ -2062,7 +2063,7 @@
           <a:p>
             <a:fld id="{04F1D4A2-813C-F741-B481-C92B3A596030}" type="datetimeFigureOut">
               <a:rPr lang="en-US" smtClean="0"/>
-              <a:t>06-Aug-19</a:t>
+              <a:t>12-Aug-19</a:t>
             </a:fld>
             <a:endParaRPr lang="en-US"/>
           </a:p>
@@ -2179,7 +2180,7 @@
           <a:p>
             <a:fld id="{04F1D4A2-813C-F741-B481-C92B3A596030}" type="datetimeFigureOut">
               <a:rPr lang="en-US" smtClean="0"/>
-              <a:t>06-Aug-19</a:t>
+              <a:t>12-Aug-19</a:t>
             </a:fld>
             <a:endParaRPr lang="en-US"/>
           </a:p>
@@ -2274,7 +2275,7 @@
           <a:p>
             <a:fld id="{04F1D4A2-813C-F741-B481-C92B3A596030}" type="datetimeFigureOut">
               <a:rPr lang="en-US" smtClean="0"/>
-              <a:t>06-Aug-19</a:t>
+              <a:t>12-Aug-19</a:t>
             </a:fld>
             <a:endParaRPr lang="en-US"/>
           </a:p>
@@ -2549,7 +2550,7 @@
           <a:p>
             <a:fld id="{04F1D4A2-813C-F741-B481-C92B3A596030}" type="datetimeFigureOut">
               <a:rPr lang="en-US" smtClean="0"/>
-              <a:t>06-Aug-19</a:t>
+              <a:t>12-Aug-19</a:t>
             </a:fld>
             <a:endParaRPr lang="en-US"/>
           </a:p>
@@ -2801,7 +2802,7 @@
           <a:p>
             <a:fld id="{04F1D4A2-813C-F741-B481-C92B3A596030}" type="datetimeFigureOut">
               <a:rPr lang="en-US" smtClean="0"/>
-              <a:t>06-Aug-19</a:t>
+              <a:t>12-Aug-19</a:t>
             </a:fld>
             <a:endParaRPr lang="en-US"/>
           </a:p>
@@ -3012,7 +3013,7 @@
           <a:p>
             <a:fld id="{04F1D4A2-813C-F741-B481-C92B3A596030}" type="datetimeFigureOut">
               <a:rPr lang="en-US" smtClean="0"/>
-              <a:t>06-Aug-19</a:t>
+              <a:t>12-Aug-19</a:t>
             </a:fld>
             <a:endParaRPr lang="en-US"/>
           </a:p>
@@ -3474,7 +3475,6 @@
               <a:rPr lang="en-US" dirty="0"/>
               <a:t>Responses, Errors and Pagination</a:t>
             </a:r>
-            <a:endParaRPr lang="en-US" dirty="0"/>
           </a:p>
         </p:txBody>
       </p:sp>
@@ -3707,13 +3707,33 @@
           <a:p>
             <a:r>
               <a:rPr lang="en-US" dirty="0"/>
-              <a:t>When an exception is thrown and not caught, Spring creates a 500 HTTP response</a:t>
-            </a:r>
-          </a:p>
-          <a:p>
-            <a:r>
-              <a:rPr lang="en-US" dirty="0"/>
-              <a:t>When using Wrapped Responses, the format used by Spring might be different from ours, so we might want to override it</a:t>
+              <a:t>When an exception is thrown and not caught, Spring creates a 500 HTTP </a:t>
+            </a:r>
+            <a:r>
+              <a:rPr lang="en-US" dirty="0" smtClean="0"/>
+              <a:t>response</a:t>
+            </a:r>
+          </a:p>
+          <a:p>
+            <a:pPr lvl="1"/>
+            <a:r>
+              <a:rPr lang="en-US" dirty="0" smtClean="0"/>
+              <a:t>exceptions in your code will not crash the whole server…</a:t>
+            </a:r>
+            <a:endParaRPr lang="en-US" dirty="0"/>
+          </a:p>
+          <a:p>
+            <a:r>
+              <a:rPr lang="en-US" dirty="0"/>
+              <a:t>When using </a:t>
+            </a:r>
+            <a:r>
+              <a:rPr lang="en-US" i="1" dirty="0"/>
+              <a:t>Wrapped Responses</a:t>
+            </a:r>
+            <a:r>
+              <a:rPr lang="en-US" dirty="0"/>
+              <a:t>, the format used by Spring might be different from ours, so we might want to override it</a:t>
             </a:r>
           </a:p>
           <a:p>
@@ -5362,7 +5382,7 @@
       </p:grpSpPr>
       <p:sp>
         <p:nvSpPr>
-          <p:cNvPr id="2" name="Title 1"/>
+          <p:cNvPr id="4" name="Title 3"/>
           <p:cNvSpPr>
             <a:spLocks noGrp="1"/>
           </p:cNvSpPr>
@@ -5376,129 +5396,9 @@
           <a:lstStyle/>
           <a:p>
             <a:r>
-              <a:rPr lang="en-US" dirty="0"/>
-              <a:t>Expansion</a:t>
-            </a:r>
-          </a:p>
-        </p:txBody>
-      </p:sp>
-      <p:sp>
-        <p:nvSpPr>
-          <p:cNvPr id="3" name="Content Placeholder 2"/>
-          <p:cNvSpPr>
-            <a:spLocks noGrp="1"/>
-          </p:cNvSpPr>
-          <p:nvPr>
-            <p:ph idx="1"/>
-          </p:nvPr>
-        </p:nvSpPr>
-        <p:spPr>
-          <a:xfrm>
-            <a:off x="98855" y="1825624"/>
-            <a:ext cx="11796584" cy="4855261"/>
-          </a:xfrm>
-        </p:spPr>
-        <p:txBody>
-          <a:bodyPr>
-            <a:normAutofit/>
-          </a:bodyPr>
-          <a:lstStyle/>
-          <a:p>
-            <a:r>
-              <a:rPr lang="en-US" dirty="0"/>
-              <a:t>A “news” might have a </a:t>
-            </a:r>
-            <a:r>
-              <a:rPr lang="en-US" i="1" dirty="0"/>
-              <a:t>list</a:t>
-            </a:r>
-            <a:r>
-              <a:rPr lang="en-US" dirty="0"/>
-              <a:t> of “comments”</a:t>
-            </a:r>
-          </a:p>
-          <a:p>
-            <a:r>
-              <a:rPr lang="en-US" dirty="0"/>
-              <a:t>A “news” might also have a </a:t>
-            </a:r>
-            <a:r>
-              <a:rPr lang="en-US" i="1" dirty="0"/>
-              <a:t>list</a:t>
-            </a:r>
-            <a:r>
-              <a:rPr lang="en-US" dirty="0"/>
-              <a:t> of “</a:t>
-            </a:r>
-            <a:r>
-              <a:rPr lang="en-US" i="1" dirty="0"/>
-              <a:t>users</a:t>
-            </a:r>
-            <a:r>
-              <a:rPr lang="en-US" dirty="0"/>
-              <a:t>” that liked it </a:t>
-            </a:r>
-          </a:p>
-          <a:p>
-            <a:r>
-              <a:rPr lang="en-US" dirty="0"/>
-              <a:t>When retrieving a single item, might not want to download as well the hundreds/thousands of other items related to it</a:t>
-            </a:r>
-          </a:p>
-          <a:p>
-            <a:r>
-              <a:rPr lang="en-US" dirty="0"/>
-              <a:t>As returning those lists can be very expensive, can have special query parameters to choose if downloaded or not</a:t>
-            </a:r>
-          </a:p>
-          <a:p>
-            <a:r>
-              <a:rPr lang="en-US" dirty="0" err="1"/>
-              <a:t>Eg</a:t>
-            </a:r>
-            <a:r>
-              <a:rPr lang="en-US" dirty="0"/>
-              <a:t>.: GET /</a:t>
-            </a:r>
-            <a:r>
-              <a:rPr lang="en-US" dirty="0" err="1"/>
-              <a:t>news?</a:t>
-            </a:r>
-            <a:r>
-              <a:rPr lang="en-US" b="1" dirty="0" err="1"/>
-              <a:t>expand</a:t>
-            </a:r>
-            <a:r>
-              <a:rPr lang="en-US" dirty="0"/>
-              <a:t>=NONE   (no lists)</a:t>
-            </a:r>
-          </a:p>
-          <a:p>
-            <a:r>
-              <a:rPr lang="en-US" dirty="0" err="1"/>
-              <a:t>Eg</a:t>
-            </a:r>
-            <a:r>
-              <a:rPr lang="en-US" dirty="0"/>
-              <a:t>.: GET /</a:t>
-            </a:r>
-            <a:r>
-              <a:rPr lang="en-US" dirty="0" err="1"/>
-              <a:t>news?</a:t>
-            </a:r>
-            <a:r>
-              <a:rPr lang="en-US" b="1" dirty="0" err="1"/>
-              <a:t>expand</a:t>
-            </a:r>
-            <a:r>
-              <a:rPr lang="en-US" dirty="0"/>
-              <a:t>=COMMENTS   (include comments)</a:t>
-            </a:r>
-          </a:p>
-          <a:p>
-            <a:endParaRPr lang="en-US" dirty="0"/>
-          </a:p>
-          <a:p>
+              <a:rPr lang="en-US" dirty="0" smtClean="0"/>
+              <a:t>Data Expansion</a:t>
+            </a:r>
             <a:endParaRPr lang="en-US" dirty="0"/>
           </a:p>
         </p:txBody>
@@ -5506,7 +5406,7 @@
     </p:spTree>
     <p:extLst>
       <p:ext uri="{BB962C8B-B14F-4D97-AF65-F5344CB8AC3E}">
-        <p14:creationId xmlns:p14="http://schemas.microsoft.com/office/powerpoint/2010/main" val="1152359187"/>
+        <p14:creationId xmlns:p14="http://schemas.microsoft.com/office/powerpoint/2010/main" val="2247111827"/>
       </p:ext>
     </p:extLst>
   </p:cSld>
@@ -5550,7 +5450,7 @@
           <a:p>
             <a:r>
               <a:rPr lang="en-US" dirty="0"/>
-              <a:t>Tradeoff</a:t>
+              <a:t>Expansion</a:t>
             </a:r>
           </a:p>
         </p:txBody>
@@ -5567,89 +5467,119 @@
         </p:nvSpPr>
         <p:spPr>
           <a:xfrm>
-            <a:off x="255373" y="1825624"/>
-            <a:ext cx="11755395" cy="4847025"/>
+            <a:off x="98855" y="1825624"/>
+            <a:ext cx="11796584" cy="4855261"/>
           </a:xfrm>
         </p:spPr>
         <p:txBody>
-          <a:bodyPr/>
-          <a:lstStyle/>
-          <a:p>
-            <a:r>
-              <a:rPr lang="en-US" dirty="0"/>
-              <a:t>Option 1: never return those lists</a:t>
-            </a:r>
-          </a:p>
-          <a:p>
-            <a:pPr lvl="1"/>
-            <a:r>
-              <a:rPr lang="en-US" dirty="0"/>
-              <a:t>But, then, need further HTTP calls to retrieve those lists if needed</a:t>
-            </a:r>
-          </a:p>
-          <a:p>
-            <a:r>
-              <a:rPr lang="en-US" dirty="0"/>
-              <a:t>Option 2: create “</a:t>
+          <a:bodyPr>
+            <a:normAutofit/>
+          </a:bodyPr>
+          <a:lstStyle/>
+          <a:p>
+            <a:r>
+              <a:rPr lang="en-US" dirty="0"/>
+              <a:t>A “news” might have a </a:t>
             </a:r>
             <a:r>
               <a:rPr lang="en-US" i="1" dirty="0"/>
+              <a:t>list</a:t>
+            </a:r>
+            <a:r>
+              <a:rPr lang="en-US" dirty="0"/>
+              <a:t> of “comments”</a:t>
+            </a:r>
+          </a:p>
+          <a:p>
+            <a:r>
+              <a:rPr lang="en-US" dirty="0"/>
+              <a:t>A “news” might also have a </a:t>
+            </a:r>
+            <a:r>
+              <a:rPr lang="en-US" i="1" dirty="0"/>
+              <a:t>list</a:t>
+            </a:r>
+            <a:r>
+              <a:rPr lang="en-US" dirty="0"/>
+              <a:t> of “</a:t>
+            </a:r>
+            <a:r>
+              <a:rPr lang="en-US" i="1" dirty="0"/>
+              <a:t>users</a:t>
+            </a:r>
+            <a:r>
+              <a:rPr lang="en-US" dirty="0"/>
+              <a:t>” that liked it </a:t>
+            </a:r>
+          </a:p>
+          <a:p>
+            <a:r>
+              <a:rPr lang="en-US" dirty="0"/>
+              <a:t>When retrieving a single item, might not want to download as well the hundreds/thousands of other items related to it</a:t>
+            </a:r>
+          </a:p>
+          <a:p>
+            <a:r>
+              <a:rPr lang="en-US" dirty="0"/>
+              <a:t>As returning those lists can be very expensive, can have special query parameters to choose if downloaded or not</a:t>
+            </a:r>
+          </a:p>
+          <a:p>
+            <a:r>
+              <a:rPr lang="en-US" dirty="0" err="1"/>
+              <a:t>Eg</a:t>
+            </a:r>
+            <a:r>
+              <a:rPr lang="en-US" dirty="0"/>
+              <a:t>.: GET /</a:t>
+            </a:r>
+            <a:r>
+              <a:rPr lang="en-US" dirty="0" err="1"/>
+              <a:t>news?</a:t>
+            </a:r>
+            <a:r>
+              <a:rPr lang="en-US" b="1" dirty="0" err="1"/>
               <a:t>expand</a:t>
             </a:r>
             <a:r>
               <a:rPr lang="en-US" dirty="0"/>
-              <a:t>” query parameters to control what returned</a:t>
-            </a:r>
-          </a:p>
-          <a:p>
-            <a:pPr lvl="1"/>
-            <a:r>
-              <a:rPr lang="en-US" dirty="0"/>
-              <a:t>Good: can return everything needed in a single HTTP request</a:t>
-            </a:r>
-          </a:p>
-          <a:p>
-            <a:pPr lvl="1"/>
-            <a:r>
-              <a:rPr lang="en-US" dirty="0"/>
-              <a:t>Bad: needs to implement all the needed cases </a:t>
-            </a:r>
-            <a:r>
-              <a:rPr lang="en-US" i="1" dirty="0"/>
-              <a:t>manually</a:t>
-            </a:r>
-          </a:p>
-          <a:p>
-            <a:r>
-              <a:rPr lang="en-US" i="1" dirty="0" err="1"/>
-              <a:t>GraphQL</a:t>
-            </a:r>
-            <a:r>
-              <a:rPr lang="en-US" dirty="0"/>
-              <a:t>: a selling point compared to REST is its ability to exactly specify what to return</a:t>
-            </a:r>
-          </a:p>
-          <a:p>
-            <a:pPr lvl="1"/>
-            <a:r>
-              <a:rPr lang="en-US" dirty="0"/>
-              <a:t>we will see </a:t>
-            </a:r>
+              <a:t>=NONE   (no lists)</a:t>
+            </a:r>
+          </a:p>
+          <a:p>
             <a:r>
               <a:rPr lang="en-US" dirty="0" err="1"/>
-              <a:t>GraphQL</a:t>
-            </a:r>
-            <a:r>
-              <a:rPr lang="en-US" dirty="0"/>
-              <a:t> later in the course</a:t>
-            </a:r>
+              <a:t>Eg</a:t>
+            </a:r>
+            <a:r>
+              <a:rPr lang="en-US" dirty="0"/>
+              <a:t>.: GET /</a:t>
+            </a:r>
+            <a:r>
+              <a:rPr lang="en-US" dirty="0" err="1"/>
+              <a:t>news?</a:t>
+            </a:r>
+            <a:r>
+              <a:rPr lang="en-US" b="1" dirty="0" err="1"/>
+              <a:t>expand</a:t>
+            </a:r>
+            <a:r>
+              <a:rPr lang="en-US" dirty="0"/>
+              <a:t>=COMMENTS   (include comments)</a:t>
+            </a:r>
+          </a:p>
+          <a:p>
+            <a:endParaRPr lang="en-US" dirty="0"/>
+          </a:p>
+          <a:p>
+            <a:endParaRPr lang="en-US" dirty="0"/>
           </a:p>
         </p:txBody>
       </p:sp>
     </p:spTree>
     <p:extLst>
       <p:ext uri="{BB962C8B-B14F-4D97-AF65-F5344CB8AC3E}">
-        <p14:creationId xmlns:p14="http://schemas.microsoft.com/office/powerpoint/2010/main" val="728222810"/>
+        <p14:creationId xmlns:p14="http://schemas.microsoft.com/office/powerpoint/2010/main" val="1152359187"/>
       </p:ext>
     </p:extLst>
   </p:cSld>
@@ -5678,6 +5608,149 @@
       </p:grpSpPr>
       <p:sp>
         <p:nvSpPr>
+          <p:cNvPr id="2" name="Title 1"/>
+          <p:cNvSpPr>
+            <a:spLocks noGrp="1"/>
+          </p:cNvSpPr>
+          <p:nvPr>
+            <p:ph type="title"/>
+          </p:nvPr>
+        </p:nvSpPr>
+        <p:spPr/>
+        <p:txBody>
+          <a:bodyPr/>
+          <a:lstStyle/>
+          <a:p>
+            <a:r>
+              <a:rPr lang="en-US" dirty="0"/>
+              <a:t>Tradeoff</a:t>
+            </a:r>
+          </a:p>
+        </p:txBody>
+      </p:sp>
+      <p:sp>
+        <p:nvSpPr>
+          <p:cNvPr id="3" name="Content Placeholder 2"/>
+          <p:cNvSpPr>
+            <a:spLocks noGrp="1"/>
+          </p:cNvSpPr>
+          <p:nvPr>
+            <p:ph idx="1"/>
+          </p:nvPr>
+        </p:nvSpPr>
+        <p:spPr>
+          <a:xfrm>
+            <a:off x="255373" y="1825624"/>
+            <a:ext cx="11755395" cy="4847025"/>
+          </a:xfrm>
+        </p:spPr>
+        <p:txBody>
+          <a:bodyPr/>
+          <a:lstStyle/>
+          <a:p>
+            <a:r>
+              <a:rPr lang="en-US" dirty="0"/>
+              <a:t>Option 1: never return those lists</a:t>
+            </a:r>
+          </a:p>
+          <a:p>
+            <a:pPr lvl="1"/>
+            <a:r>
+              <a:rPr lang="en-US" dirty="0"/>
+              <a:t>But, then, need further HTTP calls to retrieve those lists if needed</a:t>
+            </a:r>
+          </a:p>
+          <a:p>
+            <a:r>
+              <a:rPr lang="en-US" dirty="0"/>
+              <a:t>Option 2: create “</a:t>
+            </a:r>
+            <a:r>
+              <a:rPr lang="en-US" i="1" dirty="0"/>
+              <a:t>expand</a:t>
+            </a:r>
+            <a:r>
+              <a:rPr lang="en-US" dirty="0"/>
+              <a:t>” query parameters to control what returned</a:t>
+            </a:r>
+          </a:p>
+          <a:p>
+            <a:pPr lvl="1"/>
+            <a:r>
+              <a:rPr lang="en-US" dirty="0"/>
+              <a:t>Good: can return everything needed in a single HTTP request</a:t>
+            </a:r>
+          </a:p>
+          <a:p>
+            <a:pPr lvl="1"/>
+            <a:r>
+              <a:rPr lang="en-US" dirty="0"/>
+              <a:t>Bad: needs to implement all the needed cases </a:t>
+            </a:r>
+            <a:r>
+              <a:rPr lang="en-US" i="1" dirty="0"/>
+              <a:t>manually</a:t>
+            </a:r>
+          </a:p>
+          <a:p>
+            <a:r>
+              <a:rPr lang="en-US" i="1" dirty="0" err="1"/>
+              <a:t>GraphQL</a:t>
+            </a:r>
+            <a:r>
+              <a:rPr lang="en-US" dirty="0"/>
+              <a:t>: a selling point compared to REST is its ability to exactly specify what to return</a:t>
+            </a:r>
+          </a:p>
+          <a:p>
+            <a:pPr lvl="1"/>
+            <a:r>
+              <a:rPr lang="en-US" dirty="0"/>
+              <a:t>we will see </a:t>
+            </a:r>
+            <a:r>
+              <a:rPr lang="en-US" dirty="0" err="1"/>
+              <a:t>GraphQL</a:t>
+            </a:r>
+            <a:r>
+              <a:rPr lang="en-US" dirty="0"/>
+              <a:t> later in the course</a:t>
+            </a:r>
+          </a:p>
+        </p:txBody>
+      </p:sp>
+    </p:spTree>
+    <p:extLst>
+      <p:ext uri="{BB962C8B-B14F-4D97-AF65-F5344CB8AC3E}">
+        <p14:creationId xmlns:p14="http://schemas.microsoft.com/office/powerpoint/2010/main" val="728222810"/>
+      </p:ext>
+    </p:extLst>
+  </p:cSld>
+  <p:clrMapOvr>
+    <a:masterClrMapping/>
+  </p:clrMapOvr>
+</p:sld>
+</file>
+
+<file path=ppt/slides/slide24.xml><?xml version="1.0" encoding="utf-8"?>
+<p:sld xmlns:a="http://schemas.openxmlformats.org/drawingml/2006/main" xmlns:r="http://schemas.openxmlformats.org/officeDocument/2006/relationships" xmlns:p="http://schemas.openxmlformats.org/presentationml/2006/main">
+  <p:cSld>
+    <p:spTree>
+      <p:nvGrpSpPr>
+        <p:cNvPr id="1" name=""/>
+        <p:cNvGrpSpPr/>
+        <p:nvPr/>
+      </p:nvGrpSpPr>
+      <p:grpSpPr>
+        <a:xfrm>
+          <a:off x="0" y="0"/>
+          <a:ext cx="0" cy="0"/>
+          <a:chOff x="0" y="0"/>
+          <a:chExt cx="0" cy="0"/>
+        </a:xfrm>
+      </p:grpSpPr>
+      <p:sp>
+        <p:nvSpPr>
           <p:cNvPr id="4" name="Title 3"/>
           <p:cNvSpPr>
             <a:spLocks noGrp="1"/>
@@ -5720,7 +5793,7 @@
         </p:spPr>
         <p:txBody>
           <a:bodyPr>
-            <a:normAutofit fontScale="92500" lnSpcReduction="10000"/>
+            <a:normAutofit fontScale="92500" lnSpcReduction="20000"/>
           </a:bodyPr>
           <a:lstStyle/>
           <a:p>
@@ -5764,6 +5837,12 @@
             <a:r>
               <a:rPr lang="en-US" b="1" dirty="0" smtClean="0"/>
               <a:t>advanced/rest/pagination</a:t>
+            </a:r>
+          </a:p>
+          <a:p>
+            <a:r>
+              <a:rPr lang="en-US" b="1" dirty="0" smtClean="0"/>
+              <a:t>advanced/rest/gui-v2</a:t>
             </a:r>
             <a:endParaRPr lang="en-US" b="1" dirty="0"/>
           </a:p>
@@ -5931,7 +6010,11 @@
           <a:p>
             <a:r>
               <a:rPr lang="en-US" dirty="0"/>
-              <a:t>Not so great solution: provide a </a:t>
+              <a:t>Not so great solution: provide </a:t>
+            </a:r>
+            <a:r>
+              <a:rPr lang="en-US" dirty="0" smtClean="0"/>
+              <a:t>an </a:t>
             </a:r>
             <a:r>
               <a:rPr lang="en-US" i="1" dirty="0"/>

</xml_diff>

<commit_message>
working on slides of les 04
</commit_message>
<xml_diff>
--- a/doc/advanced/slides/lesson_04.pptx
+++ b/doc/advanced/slides/lesson_04.pptx
@@ -5,7 +5,7 @@
     <p:sldMasterId id="2147483648" r:id="rId1"/>
   </p:sldMasterIdLst>
   <p:notesMasterIdLst>
-    <p:notesMasterId r:id="rId26"/>
+    <p:notesMasterId r:id="rId36"/>
   </p:notesMasterIdLst>
   <p:sldIdLst>
     <p:sldId id="256" r:id="rId2"/>
@@ -24,14 +24,24 @@
     <p:sldId id="279" r:id="rId15"/>
     <p:sldId id="280" r:id="rId16"/>
     <p:sldId id="281" r:id="rId17"/>
-    <p:sldId id="282" r:id="rId18"/>
-    <p:sldId id="283" r:id="rId19"/>
-    <p:sldId id="284" r:id="rId20"/>
-    <p:sldId id="285" r:id="rId21"/>
-    <p:sldId id="292" r:id="rId22"/>
-    <p:sldId id="286" r:id="rId23"/>
-    <p:sldId id="287" r:id="rId24"/>
-    <p:sldId id="271" r:id="rId25"/>
+    <p:sldId id="293" r:id="rId18"/>
+    <p:sldId id="294" r:id="rId19"/>
+    <p:sldId id="295" r:id="rId20"/>
+    <p:sldId id="296" r:id="rId21"/>
+    <p:sldId id="283" r:id="rId22"/>
+    <p:sldId id="297" r:id="rId23"/>
+    <p:sldId id="298" r:id="rId24"/>
+    <p:sldId id="299" r:id="rId25"/>
+    <p:sldId id="300" r:id="rId26"/>
+    <p:sldId id="284" r:id="rId27"/>
+    <p:sldId id="282" r:id="rId28"/>
+    <p:sldId id="285" r:id="rId29"/>
+    <p:sldId id="301" r:id="rId30"/>
+    <p:sldId id="302" r:id="rId31"/>
+    <p:sldId id="292" r:id="rId32"/>
+    <p:sldId id="286" r:id="rId33"/>
+    <p:sldId id="287" r:id="rId34"/>
+    <p:sldId id="271" r:id="rId35"/>
   </p:sldIdLst>
   <p:sldSz cx="12192000" cy="6858000"/>
   <p:notesSz cx="6858000" cy="9144000"/>
@@ -552,7 +562,7 @@
           <a:p>
             <a:fld id="{D6FB5A5B-CC88-B64A-8F56-0DBE0ACA83DE}" type="slidenum">
               <a:rPr lang="en-US" smtClean="0"/>
-              <a:t>24</a:t>
+              <a:t>34</a:t>
             </a:fld>
             <a:endParaRPr lang="en-US"/>
           </a:p>
@@ -4437,6 +4447,29 @@
       </p:grpSpPr>
       <p:sp>
         <p:nvSpPr>
+          <p:cNvPr id="2" name="Title 1"/>
+          <p:cNvSpPr>
+            <a:spLocks noGrp="1"/>
+          </p:cNvSpPr>
+          <p:nvPr>
+            <p:ph type="title"/>
+          </p:nvPr>
+        </p:nvSpPr>
+        <p:spPr/>
+        <p:txBody>
+          <a:bodyPr/>
+          <a:lstStyle/>
+          <a:p>
+            <a:r>
+              <a:rPr lang="en-US" dirty="0" smtClean="0"/>
+              <a:t>Two Types of Pagination</a:t>
+            </a:r>
+            <a:endParaRPr lang="en-US" dirty="0"/>
+          </a:p>
+        </p:txBody>
+      </p:sp>
+      <p:sp>
+        <p:nvSpPr>
           <p:cNvPr id="3" name="Content Placeholder 2"/>
           <p:cNvSpPr>
             <a:spLocks noGrp="1"/>
@@ -4447,279 +4480,106 @@
         </p:nvSpPr>
         <p:spPr>
           <a:xfrm>
-            <a:off x="148281" y="156519"/>
-            <a:ext cx="11755395" cy="6507892"/>
-          </a:xfrm>
-        </p:spPr>
-        <p:txBody>
-          <a:bodyPr>
-            <a:normAutofit/>
-          </a:bodyPr>
-          <a:lstStyle/>
-          <a:p>
-            <a:pPr marL="0" indent="0">
-              <a:buNone/>
-            </a:pPr>
-            <a:r>
-              <a:rPr lang="en-US" dirty="0" err="1"/>
-              <a:t>dto</a:t>
-            </a:r>
-            <a:r>
-              <a:rPr lang="en-US" dirty="0"/>
-              <a:t> = {  “</a:t>
-            </a:r>
-            <a:r>
-              <a:rPr lang="en-US" b="1" dirty="0"/>
-              <a:t>list</a:t>
-            </a:r>
-            <a:r>
-              <a:rPr lang="en-US" dirty="0"/>
-              <a:t>”: [ … ],    </a:t>
-            </a:r>
-            <a:r>
-              <a:rPr lang="en-US" i="1" dirty="0"/>
-              <a:t>//the actual payload</a:t>
-            </a:r>
-          </a:p>
-          <a:p>
-            <a:pPr marL="0" indent="0">
-              <a:buNone/>
-            </a:pPr>
-            <a:r>
-              <a:rPr lang="en-US" i="1" dirty="0"/>
-              <a:t>   </a:t>
-            </a:r>
-            <a:r>
-              <a:rPr lang="en-US" dirty="0"/>
-              <a:t>           “</a:t>
-            </a:r>
-            <a:r>
-              <a:rPr lang="en-US" b="1" dirty="0" err="1"/>
-              <a:t>rangeMin</a:t>
-            </a:r>
-            <a:r>
-              <a:rPr lang="en-US" dirty="0"/>
-              <a:t>”: 40,</a:t>
-            </a:r>
-          </a:p>
-          <a:p>
-            <a:pPr marL="0" indent="0">
-              <a:buNone/>
-            </a:pPr>
-            <a:r>
-              <a:rPr lang="en-US" i="1" dirty="0"/>
-              <a:t>              </a:t>
-            </a:r>
-            <a:r>
-              <a:rPr lang="en-US" dirty="0"/>
-              <a:t>“</a:t>
-            </a:r>
-            <a:r>
-              <a:rPr lang="en-US" b="1" dirty="0" err="1"/>
-              <a:t>rangeMax</a:t>
-            </a:r>
-            <a:r>
-              <a:rPr lang="en-US" dirty="0"/>
-              <a:t>”: 49,   </a:t>
-            </a:r>
-            <a:r>
-              <a:rPr lang="en-US" i="1" dirty="0"/>
-              <a:t>//so, 10 element pages</a:t>
-            </a:r>
-          </a:p>
-          <a:p>
-            <a:pPr marL="0" indent="0">
-              <a:buNone/>
-            </a:pPr>
-            <a:r>
-              <a:rPr lang="en-US" i="1" dirty="0"/>
-              <a:t>              “</a:t>
-            </a:r>
-            <a:r>
-              <a:rPr lang="en-US" b="1" i="1" dirty="0" err="1"/>
-              <a:t>totalSize</a:t>
-            </a:r>
-            <a:r>
-              <a:rPr lang="en-US" i="1" dirty="0"/>
-              <a:t>”: 66400000, </a:t>
-            </a:r>
-          </a:p>
-          <a:p>
-            <a:pPr marL="0" indent="0">
-              <a:buNone/>
-            </a:pPr>
-            <a:r>
-              <a:rPr lang="en-US" i="1" dirty="0"/>
-              <a:t>              “</a:t>
-            </a:r>
-            <a:r>
-              <a:rPr lang="en-US" b="1" i="1" dirty="0"/>
-              <a:t>_links</a:t>
-            </a:r>
-            <a:r>
-              <a:rPr lang="en-US" i="1" dirty="0"/>
-              <a:t>”:[</a:t>
-            </a:r>
-          </a:p>
-          <a:p>
-            <a:pPr marL="0" indent="0">
-              <a:buNone/>
-            </a:pPr>
-            <a:r>
-              <a:rPr lang="en-US" i="1" dirty="0"/>
-              <a:t>                   “</a:t>
-            </a:r>
-            <a:r>
-              <a:rPr lang="en-US" b="1" i="1" dirty="0"/>
+            <a:off x="272089" y="1825624"/>
+            <a:ext cx="11735543" cy="4851725"/>
+          </a:xfrm>
+        </p:spPr>
+        <p:txBody>
+          <a:bodyPr/>
+          <a:lstStyle/>
+          <a:p>
+            <a:r>
+              <a:rPr lang="en-US" b="1" dirty="0" smtClean="0"/>
+              <a:t>Offset Pagination</a:t>
+            </a:r>
+          </a:p>
+          <a:p>
+            <a:pPr lvl="1"/>
+            <a:r>
+              <a:rPr lang="en-US" dirty="0" smtClean="0"/>
+              <a:t>likely the most common</a:t>
+            </a:r>
+          </a:p>
+          <a:p>
+            <a:pPr lvl="1"/>
+            <a:r>
+              <a:rPr lang="en-US" dirty="0" smtClean="0"/>
+              <a:t>can jump directly to a specific page</a:t>
+            </a:r>
+          </a:p>
+          <a:p>
+            <a:pPr lvl="1"/>
+            <a:r>
+              <a:rPr lang="en-US" dirty="0" smtClean="0"/>
+              <a:t>VERY INEFFICIENT, unless limited to read only a few pages from start </a:t>
+            </a:r>
+          </a:p>
+          <a:p>
+            <a:pPr lvl="1"/>
+            <a:r>
+              <a:rPr lang="en-US" dirty="0" smtClean="0"/>
+              <a:t>issues when database is manipulated while iterating over it</a:t>
+            </a:r>
+          </a:p>
+          <a:p>
+            <a:r>
+              <a:rPr lang="en-US" b="1" dirty="0" smtClean="0"/>
+              <a:t>Keyset Pagination</a:t>
+            </a:r>
+          </a:p>
+          <a:p>
+            <a:pPr lvl="1"/>
+            <a:r>
+              <a:rPr lang="en-US" dirty="0" smtClean="0"/>
+              <a:t>most efficient</a:t>
+            </a:r>
+          </a:p>
+          <a:p>
+            <a:pPr lvl="1"/>
+            <a:r>
+              <a:rPr lang="en-US" dirty="0" smtClean="0"/>
+              <a:t>bit more complex to implement</a:t>
+            </a:r>
+          </a:p>
+          <a:p>
+            <a:pPr lvl="1"/>
+            <a:r>
+              <a:rPr lang="en-US" dirty="0" smtClean="0"/>
+              <a:t>can’t jump directly to a specific page, without reading previous pages</a:t>
+            </a:r>
+          </a:p>
+          <a:p>
+            <a:pPr lvl="2"/>
+            <a:r>
+              <a:rPr lang="en-US" dirty="0" smtClean="0"/>
+              <a:t>not a problem if we just care of “</a:t>
+            </a:r>
+            <a:r>
+              <a:rPr lang="en-US" i="1" dirty="0" smtClean="0"/>
               <a:t>next</a:t>
             </a:r>
             <a:r>
-              <a:rPr lang="en-US" i="1" dirty="0"/>
-              <a:t>”: {“</a:t>
-            </a:r>
-            <a:r>
-              <a:rPr lang="en-US" i="1" dirty="0" err="1"/>
-              <a:t>href</a:t>
-            </a:r>
-            <a:r>
-              <a:rPr lang="en-US" i="1" dirty="0"/>
-              <a:t>”: “/</a:t>
-            </a:r>
-            <a:r>
-              <a:rPr lang="en-US" i="1" dirty="0" err="1"/>
-              <a:t>news?</a:t>
-            </a:r>
-            <a:r>
-              <a:rPr lang="en-US" b="1" i="1" dirty="0" err="1"/>
-              <a:t>offset</a:t>
-            </a:r>
-            <a:r>
-              <a:rPr lang="en-US" i="1" dirty="0"/>
-              <a:t>=50&amp;</a:t>
-            </a:r>
-            <a:r>
-              <a:rPr lang="en-US" b="1" i="1" dirty="0"/>
-              <a:t>limit</a:t>
-            </a:r>
-            <a:r>
-              <a:rPr lang="en-US" i="1" dirty="0"/>
-              <a:t>=10”},</a:t>
-            </a:r>
-          </a:p>
-          <a:p>
-            <a:pPr marL="0" indent="0">
-              <a:buNone/>
-            </a:pPr>
-            <a:r>
-              <a:rPr lang="en-US" i="1" dirty="0"/>
-              <a:t>                   “</a:t>
-            </a:r>
-            <a:r>
-              <a:rPr lang="en-US" b="1" i="1" dirty="0"/>
-              <a:t>self</a:t>
-            </a:r>
-            <a:r>
-              <a:rPr lang="en-US" i="1" dirty="0"/>
-              <a:t>”: {“</a:t>
-            </a:r>
-            <a:r>
-              <a:rPr lang="en-US" i="1" dirty="0" err="1"/>
-              <a:t>href</a:t>
-            </a:r>
-            <a:r>
-              <a:rPr lang="en-US" i="1" dirty="0"/>
-              <a:t>”: “/</a:t>
-            </a:r>
-            <a:r>
-              <a:rPr lang="en-US" i="1" dirty="0" err="1"/>
-              <a:t>news?</a:t>
-            </a:r>
-            <a:r>
-              <a:rPr lang="en-US" b="1" i="1" dirty="0" err="1"/>
-              <a:t>offset</a:t>
-            </a:r>
-            <a:r>
-              <a:rPr lang="en-US" i="1" dirty="0"/>
-              <a:t>=40&amp;</a:t>
-            </a:r>
-            <a:r>
-              <a:rPr lang="en-US" b="1" i="1" dirty="0"/>
-              <a:t>limit</a:t>
-            </a:r>
-            <a:r>
-              <a:rPr lang="en-US" i="1" dirty="0"/>
-              <a:t>=10”},</a:t>
-            </a:r>
-          </a:p>
-          <a:p>
-            <a:pPr marL="0" indent="0">
-              <a:buNone/>
-            </a:pPr>
-            <a:r>
-              <a:rPr lang="en-US" i="1" dirty="0"/>
-              <a:t>                   “</a:t>
-            </a:r>
-            <a:r>
-              <a:rPr lang="en-US" b="1" i="1" dirty="0"/>
-              <a:t>previous</a:t>
-            </a:r>
-            <a:r>
-              <a:rPr lang="en-US" i="1" dirty="0"/>
-              <a:t>” : {“</a:t>
-            </a:r>
-            <a:r>
-              <a:rPr lang="en-US" i="1" dirty="0" err="1"/>
-              <a:t>href</a:t>
-            </a:r>
-            <a:r>
-              <a:rPr lang="en-US" i="1" dirty="0"/>
-              <a:t>”: “/</a:t>
-            </a:r>
-            <a:r>
-              <a:rPr lang="en-US" i="1" dirty="0" err="1"/>
-              <a:t>news?</a:t>
-            </a:r>
-            <a:r>
-              <a:rPr lang="en-US" b="1" i="1" dirty="0" err="1"/>
-              <a:t>offset</a:t>
-            </a:r>
-            <a:r>
-              <a:rPr lang="en-US" i="1" dirty="0"/>
-              <a:t>=30&amp;</a:t>
-            </a:r>
-            <a:r>
-              <a:rPr lang="en-US" b="1" i="1" dirty="0"/>
-              <a:t>limit</a:t>
-            </a:r>
-            <a:r>
-              <a:rPr lang="en-US" i="1" dirty="0"/>
-              <a:t>=10”},</a:t>
-            </a:r>
-          </a:p>
-          <a:p>
-            <a:pPr marL="0" indent="0">
-              <a:buNone/>
-            </a:pPr>
-            <a:r>
-              <a:rPr lang="en-US" i="1" dirty="0"/>
-              <a:t>              ]</a:t>
-            </a:r>
-          </a:p>
-          <a:p>
-            <a:pPr marL="0" indent="0">
-              <a:buNone/>
-            </a:pPr>
-            <a:r>
-              <a:rPr lang="en-US" i="1" dirty="0"/>
-              <a:t>          }</a:t>
-            </a:r>
+              <a:rPr lang="en-US" dirty="0" smtClean="0"/>
+              <a:t>” page, or jumps ahead of only few pages (</a:t>
+            </a:r>
+            <a:r>
+              <a:rPr lang="en-US" dirty="0" err="1" smtClean="0"/>
+              <a:t>eg</a:t>
+            </a:r>
+            <a:r>
+              <a:rPr lang="en-US" dirty="0" smtClean="0"/>
+              <a:t> 5-10)</a:t>
+            </a:r>
+          </a:p>
+          <a:p>
+            <a:endParaRPr lang="en-US" dirty="0"/>
           </a:p>
         </p:txBody>
       </p:sp>
     </p:spTree>
     <p:extLst>
       <p:ext uri="{BB962C8B-B14F-4D97-AF65-F5344CB8AC3E}">
-        <p14:creationId xmlns:p14="http://schemas.microsoft.com/office/powerpoint/2010/main" val="1914574474"/>
+        <p14:creationId xmlns:p14="http://schemas.microsoft.com/office/powerpoint/2010/main" val="866110785"/>
       </p:ext>
     </p:extLst>
   </p:cSld>
@@ -4756,15 +4616,23 @@
             <p:ph type="title"/>
           </p:nvPr>
         </p:nvSpPr>
-        <p:spPr/>
-        <p:txBody>
-          <a:bodyPr/>
-          <a:lstStyle/>
-          <a:p>
-            <a:r>
-              <a:rPr lang="en-US" dirty="0"/>
-              <a:t>Offset/Limit</a:t>
-            </a:r>
+        <p:spPr>
+          <a:xfrm>
+            <a:off x="838200" y="365126"/>
+            <a:ext cx="10515600" cy="883812"/>
+          </a:xfrm>
+        </p:spPr>
+        <p:txBody>
+          <a:bodyPr>
+            <a:normAutofit fontScale="90000"/>
+          </a:bodyPr>
+          <a:lstStyle/>
+          <a:p>
+            <a:r>
+              <a:rPr lang="en-US" dirty="0" smtClean="0"/>
+              <a:t>Efficiency</a:t>
+            </a:r>
+            <a:endParaRPr lang="en-US" dirty="0"/>
           </a:p>
         </p:txBody>
       </p:sp>
@@ -4780,85 +4648,513 @@
         </p:nvSpPr>
         <p:spPr>
           <a:xfrm>
-            <a:off x="321276" y="1825625"/>
-            <a:ext cx="11648302" cy="4838786"/>
-          </a:xfrm>
-        </p:spPr>
-        <p:txBody>
-          <a:bodyPr/>
-          <a:lstStyle/>
-          <a:p>
-            <a:r>
-              <a:rPr lang="en-US" dirty="0"/>
-              <a:t>When dealing with large collections, need a way to specify the boundaries of a </a:t>
-            </a:r>
-            <a:r>
-              <a:rPr lang="en-US" i="1" dirty="0"/>
-              <a:t>Page</a:t>
-            </a:r>
-          </a:p>
-          <a:p>
-            <a:r>
-              <a:rPr lang="en-US" dirty="0"/>
-              <a:t>Example: </a:t>
-            </a:r>
-            <a:r>
-              <a:rPr lang="en-US" i="1" dirty="0"/>
-              <a:t>GET /</a:t>
-            </a:r>
-            <a:r>
-              <a:rPr lang="en-US" i="1" dirty="0" err="1"/>
-              <a:t>news?</a:t>
-            </a:r>
-            <a:r>
-              <a:rPr lang="en-US" b="1" i="1" dirty="0" err="1"/>
-              <a:t>offset</a:t>
-            </a:r>
-            <a:r>
-              <a:rPr lang="en-US" i="1" dirty="0"/>
-              <a:t>=40&amp;</a:t>
-            </a:r>
-            <a:r>
-              <a:rPr lang="en-US" b="1" i="1" dirty="0"/>
-              <a:t>limit</a:t>
-            </a:r>
-            <a:r>
-              <a:rPr lang="en-US" i="1" dirty="0"/>
-              <a:t>=10</a:t>
+            <a:off x="396983" y="1437563"/>
+            <a:ext cx="10921133" cy="1980435"/>
+          </a:xfrm>
+        </p:spPr>
+        <p:txBody>
+          <a:bodyPr>
+            <a:normAutofit/>
+          </a:bodyPr>
+          <a:lstStyle/>
+          <a:p>
+            <a:r>
+              <a:rPr lang="en-US" dirty="0" smtClean="0"/>
+              <a:t>Assume for example </a:t>
+            </a:r>
+            <a:r>
+              <a:rPr lang="en-US" i="1" dirty="0" smtClean="0"/>
+              <a:t>100 millions </a:t>
+            </a:r>
+            <a:r>
+              <a:rPr lang="en-US" dirty="0" smtClean="0"/>
+              <a:t>items in database</a:t>
+            </a:r>
+          </a:p>
+          <a:p>
+            <a:r>
+              <a:rPr lang="en-US" dirty="0" smtClean="0"/>
+              <a:t>Pages of small fixed size, </a:t>
+            </a:r>
+            <a:r>
+              <a:rPr lang="en-US" dirty="0" err="1" smtClean="0"/>
+              <a:t>eg</a:t>
+            </a:r>
+            <a:r>
+              <a:rPr lang="en-US" dirty="0" smtClean="0"/>
+              <a:t> </a:t>
+            </a:r>
+            <a:r>
+              <a:rPr lang="en-US" i="1" dirty="0" smtClean="0"/>
+              <a:t>n=20</a:t>
+            </a:r>
+          </a:p>
+          <a:p>
+            <a:r>
+              <a:rPr lang="en-US" dirty="0" smtClean="0"/>
+              <a:t>Data is sent through 3 steps</a:t>
             </a:r>
             <a:endParaRPr lang="en-US" dirty="0"/>
           </a:p>
-          <a:p>
-            <a:r>
-              <a:rPr lang="en-US" i="1" dirty="0"/>
-              <a:t>Offset</a:t>
-            </a:r>
-            <a:r>
-              <a:rPr lang="en-US" dirty="0"/>
-              <a:t>: given the collection sorted like an array, this would be the starting index </a:t>
-            </a:r>
-            <a:r>
-              <a:rPr lang="en-US" i="1" dirty="0"/>
-              <a:t>i</a:t>
-            </a:r>
-          </a:p>
-          <a:p>
-            <a:r>
-              <a:rPr lang="en-US" i="1" dirty="0"/>
-              <a:t>Limit: </a:t>
-            </a:r>
-            <a:r>
-              <a:rPr lang="en-US" dirty="0"/>
-              <a:t>starting from the offset, how many elements to return</a:t>
-            </a:r>
-            <a:endParaRPr lang="en-US" i="1" dirty="0"/>
+        </p:txBody>
+      </p:sp>
+      <p:sp>
+        <p:nvSpPr>
+          <p:cNvPr id="4" name="Rounded Rectangle 3"/>
+          <p:cNvSpPr/>
+          <p:nvPr/>
+        </p:nvSpPr>
+        <p:spPr>
+          <a:xfrm>
+            <a:off x="191429" y="3996597"/>
+            <a:ext cx="1628450" cy="914400"/>
+          </a:xfrm>
+          <a:prstGeom prst="roundRect">
+            <a:avLst/>
+          </a:prstGeom>
+        </p:spPr>
+        <p:style>
+          <a:lnRef idx="2">
+            <a:schemeClr val="accent1">
+              <a:shade val="50000"/>
+            </a:schemeClr>
+          </a:lnRef>
+          <a:fillRef idx="1">
+            <a:schemeClr val="accent1"/>
+          </a:fillRef>
+          <a:effectRef idx="0">
+            <a:schemeClr val="accent1"/>
+          </a:effectRef>
+          <a:fontRef idx="minor">
+            <a:schemeClr val="lt1"/>
+          </a:fontRef>
+        </p:style>
+        <p:txBody>
+          <a:bodyPr rtlCol="0" anchor="ctr"/>
+          <a:lstStyle/>
+          <a:p>
+            <a:pPr algn="ctr"/>
+            <a:r>
+              <a:rPr lang="en-US" dirty="0" smtClean="0"/>
+              <a:t>Client</a:t>
+            </a:r>
+          </a:p>
+          <a:p>
+            <a:pPr algn="ctr"/>
+            <a:r>
+              <a:rPr lang="en-US" dirty="0" smtClean="0"/>
+              <a:t>(</a:t>
+            </a:r>
+            <a:r>
+              <a:rPr lang="en-US" dirty="0" err="1" smtClean="0"/>
+              <a:t>eg</a:t>
+            </a:r>
+            <a:r>
+              <a:rPr lang="en-US" dirty="0" smtClean="0"/>
+              <a:t>, browser)</a:t>
+            </a:r>
+            <a:endParaRPr lang="en-US" dirty="0"/>
+          </a:p>
+        </p:txBody>
+      </p:sp>
+      <p:sp>
+        <p:nvSpPr>
+          <p:cNvPr id="5" name="Rounded Rectangle 4"/>
+          <p:cNvSpPr/>
+          <p:nvPr/>
+        </p:nvSpPr>
+        <p:spPr>
+          <a:xfrm>
+            <a:off x="3091118" y="3996597"/>
+            <a:ext cx="1793116" cy="914400"/>
+          </a:xfrm>
+          <a:prstGeom prst="roundRect">
+            <a:avLst/>
+          </a:prstGeom>
+        </p:spPr>
+        <p:style>
+          <a:lnRef idx="2">
+            <a:schemeClr val="accent4">
+              <a:shade val="50000"/>
+            </a:schemeClr>
+          </a:lnRef>
+          <a:fillRef idx="1">
+            <a:schemeClr val="accent4"/>
+          </a:fillRef>
+          <a:effectRef idx="0">
+            <a:schemeClr val="accent4"/>
+          </a:effectRef>
+          <a:fontRef idx="minor">
+            <a:schemeClr val="lt1"/>
+          </a:fontRef>
+        </p:style>
+        <p:txBody>
+          <a:bodyPr rtlCol="0" anchor="ctr"/>
+          <a:lstStyle/>
+          <a:p>
+            <a:pPr algn="ctr"/>
+            <a:r>
+              <a:rPr lang="en-US" dirty="0" smtClean="0"/>
+              <a:t>Your Application</a:t>
+            </a:r>
+          </a:p>
+          <a:p>
+            <a:pPr algn="ctr"/>
+            <a:r>
+              <a:rPr lang="en-US" dirty="0" smtClean="0"/>
+              <a:t>(</a:t>
+            </a:r>
+            <a:r>
+              <a:rPr lang="en-US" dirty="0" err="1" smtClean="0"/>
+              <a:t>eg</a:t>
+            </a:r>
+            <a:r>
+              <a:rPr lang="en-US" dirty="0" smtClean="0"/>
+              <a:t>, </a:t>
+            </a:r>
+            <a:r>
+              <a:rPr lang="en-US" dirty="0" err="1" smtClean="0"/>
+              <a:t>SpringBoot</a:t>
+            </a:r>
+            <a:r>
+              <a:rPr lang="en-US" dirty="0" smtClean="0"/>
+              <a:t>)</a:t>
+            </a:r>
+            <a:endParaRPr lang="en-US" dirty="0"/>
+          </a:p>
+        </p:txBody>
+      </p:sp>
+      <p:sp>
+        <p:nvSpPr>
+          <p:cNvPr id="6" name="Rounded Rectangle 5"/>
+          <p:cNvSpPr/>
+          <p:nvPr/>
+        </p:nvSpPr>
+        <p:spPr>
+          <a:xfrm>
+            <a:off x="6155473" y="3996597"/>
+            <a:ext cx="2030266" cy="914400"/>
+          </a:xfrm>
+          <a:prstGeom prst="roundRect">
+            <a:avLst/>
+          </a:prstGeom>
+        </p:spPr>
+        <p:style>
+          <a:lnRef idx="2">
+            <a:schemeClr val="accent4">
+              <a:shade val="50000"/>
+            </a:schemeClr>
+          </a:lnRef>
+          <a:fillRef idx="1">
+            <a:schemeClr val="accent4"/>
+          </a:fillRef>
+          <a:effectRef idx="0">
+            <a:schemeClr val="accent4"/>
+          </a:effectRef>
+          <a:fontRef idx="minor">
+            <a:schemeClr val="lt1"/>
+          </a:fontRef>
+        </p:style>
+        <p:txBody>
+          <a:bodyPr rtlCol="0" anchor="ctr"/>
+          <a:lstStyle/>
+          <a:p>
+            <a:pPr algn="ctr"/>
+            <a:r>
+              <a:rPr lang="en-US" dirty="0" smtClean="0"/>
+              <a:t>Database Process</a:t>
+            </a:r>
+          </a:p>
+          <a:p>
+            <a:pPr algn="ctr"/>
+            <a:r>
+              <a:rPr lang="en-US" dirty="0" smtClean="0"/>
+              <a:t>(</a:t>
+            </a:r>
+            <a:r>
+              <a:rPr lang="en-US" dirty="0" err="1" smtClean="0"/>
+              <a:t>eg</a:t>
+            </a:r>
+            <a:r>
+              <a:rPr lang="en-US" dirty="0" smtClean="0"/>
+              <a:t> </a:t>
+            </a:r>
+            <a:r>
+              <a:rPr lang="en-US" dirty="0" err="1" smtClean="0"/>
+              <a:t>Postgress</a:t>
+            </a:r>
+            <a:r>
+              <a:rPr lang="en-US" dirty="0" smtClean="0"/>
+              <a:t>)</a:t>
+            </a:r>
+            <a:endParaRPr lang="en-US" dirty="0"/>
+          </a:p>
+        </p:txBody>
+      </p:sp>
+      <p:sp>
+        <p:nvSpPr>
+          <p:cNvPr id="7" name="Rounded Rectangle 6"/>
+          <p:cNvSpPr/>
+          <p:nvPr/>
+        </p:nvSpPr>
+        <p:spPr>
+          <a:xfrm>
+            <a:off x="9456978" y="3996597"/>
+            <a:ext cx="2260724" cy="914400"/>
+          </a:xfrm>
+          <a:prstGeom prst="roundRect">
+            <a:avLst/>
+          </a:prstGeom>
+        </p:spPr>
+        <p:style>
+          <a:lnRef idx="2">
+            <a:schemeClr val="accent6">
+              <a:shade val="50000"/>
+            </a:schemeClr>
+          </a:lnRef>
+          <a:fillRef idx="1">
+            <a:schemeClr val="accent6"/>
+          </a:fillRef>
+          <a:effectRef idx="0">
+            <a:schemeClr val="accent6"/>
+          </a:effectRef>
+          <a:fontRef idx="minor">
+            <a:schemeClr val="lt1"/>
+          </a:fontRef>
+        </p:style>
+        <p:txBody>
+          <a:bodyPr rtlCol="0" anchor="ctr"/>
+          <a:lstStyle/>
+          <a:p>
+            <a:pPr algn="ctr"/>
+            <a:r>
+              <a:rPr lang="en-US" dirty="0" smtClean="0"/>
+              <a:t>Permanent Storage</a:t>
+            </a:r>
+          </a:p>
+          <a:p>
+            <a:pPr algn="ctr"/>
+            <a:r>
+              <a:rPr lang="en-US" dirty="0" smtClean="0"/>
+              <a:t>(</a:t>
+            </a:r>
+            <a:r>
+              <a:rPr lang="en-US" dirty="0" err="1" smtClean="0"/>
+              <a:t>eg</a:t>
+            </a:r>
+            <a:r>
+              <a:rPr lang="en-US" dirty="0" smtClean="0"/>
+              <a:t>, hard-drive)</a:t>
+            </a:r>
+            <a:endParaRPr lang="en-US" dirty="0"/>
+          </a:p>
+        </p:txBody>
+      </p:sp>
+      <p:cxnSp>
+        <p:nvCxnSpPr>
+          <p:cNvPr id="9" name="Straight Arrow Connector 8"/>
+          <p:cNvCxnSpPr>
+            <a:stCxn id="4" idx="3"/>
+            <a:endCxn id="5" idx="1"/>
+          </p:cNvCxnSpPr>
+          <p:nvPr/>
+        </p:nvCxnSpPr>
+        <p:spPr>
+          <a:xfrm>
+            <a:off x="1819879" y="4453797"/>
+            <a:ext cx="1271239" cy="0"/>
+          </a:xfrm>
+          <a:prstGeom prst="straightConnector1">
+            <a:avLst/>
+          </a:prstGeom>
+          <a:ln w="44450">
+            <a:headEnd type="triangle"/>
+            <a:tailEnd type="triangle"/>
+          </a:ln>
+        </p:spPr>
+        <p:style>
+          <a:lnRef idx="1">
+            <a:schemeClr val="dk1"/>
+          </a:lnRef>
+          <a:fillRef idx="0">
+            <a:schemeClr val="dk1"/>
+          </a:fillRef>
+          <a:effectRef idx="0">
+            <a:schemeClr val="dk1"/>
+          </a:effectRef>
+          <a:fontRef idx="minor">
+            <a:schemeClr val="tx1"/>
+          </a:fontRef>
+        </p:style>
+      </p:cxnSp>
+      <p:cxnSp>
+        <p:nvCxnSpPr>
+          <p:cNvPr id="12" name="Straight Arrow Connector 11"/>
+          <p:cNvCxnSpPr>
+            <a:stCxn id="6" idx="3"/>
+            <a:endCxn id="7" idx="1"/>
+          </p:cNvCxnSpPr>
+          <p:nvPr/>
+        </p:nvCxnSpPr>
+        <p:spPr>
+          <a:xfrm>
+            <a:off x="8185739" y="4453797"/>
+            <a:ext cx="1271239" cy="0"/>
+          </a:xfrm>
+          <a:prstGeom prst="straightConnector1">
+            <a:avLst/>
+          </a:prstGeom>
+          <a:ln w="44450">
+            <a:headEnd type="triangle"/>
+            <a:tailEnd type="triangle"/>
+          </a:ln>
+        </p:spPr>
+        <p:style>
+          <a:lnRef idx="1">
+            <a:schemeClr val="dk1"/>
+          </a:lnRef>
+          <a:fillRef idx="0">
+            <a:schemeClr val="dk1"/>
+          </a:fillRef>
+          <a:effectRef idx="0">
+            <a:schemeClr val="dk1"/>
+          </a:effectRef>
+          <a:fontRef idx="minor">
+            <a:schemeClr val="tx1"/>
+          </a:fontRef>
+        </p:style>
+      </p:cxnSp>
+      <p:cxnSp>
+        <p:nvCxnSpPr>
+          <p:cNvPr id="13" name="Straight Arrow Connector 12"/>
+          <p:cNvCxnSpPr>
+            <a:stCxn id="5" idx="3"/>
+            <a:endCxn id="6" idx="1"/>
+          </p:cNvCxnSpPr>
+          <p:nvPr/>
+        </p:nvCxnSpPr>
+        <p:spPr>
+          <a:xfrm>
+            <a:off x="4884234" y="4453797"/>
+            <a:ext cx="1271239" cy="0"/>
+          </a:xfrm>
+          <a:prstGeom prst="straightConnector1">
+            <a:avLst/>
+          </a:prstGeom>
+          <a:ln w="44450">
+            <a:headEnd type="triangle"/>
+            <a:tailEnd type="triangle"/>
+          </a:ln>
+        </p:spPr>
+        <p:style>
+          <a:lnRef idx="1">
+            <a:schemeClr val="dk1"/>
+          </a:lnRef>
+          <a:fillRef idx="0">
+            <a:schemeClr val="dk1"/>
+          </a:fillRef>
+          <a:effectRef idx="0">
+            <a:schemeClr val="dk1"/>
+          </a:effectRef>
+          <a:fontRef idx="minor">
+            <a:schemeClr val="tx1"/>
+          </a:fontRef>
+        </p:style>
+      </p:cxnSp>
+      <p:sp>
+        <p:nvSpPr>
+          <p:cNvPr id="18" name="TextBox 17"/>
+          <p:cNvSpPr txBox="1"/>
+          <p:nvPr/>
+        </p:nvSpPr>
+        <p:spPr>
+          <a:xfrm>
+            <a:off x="2117937" y="3996597"/>
+            <a:ext cx="675121" cy="369332"/>
+          </a:xfrm>
+          <a:prstGeom prst="rect">
+            <a:avLst/>
+          </a:prstGeom>
+          <a:noFill/>
+        </p:spPr>
+        <p:txBody>
+          <a:bodyPr wrap="none" rtlCol="0">
+            <a:spAutoFit/>
+          </a:bodyPr>
+          <a:lstStyle/>
+          <a:p>
+            <a:r>
+              <a:rPr lang="en-US" dirty="0" smtClean="0"/>
+              <a:t>HTTP</a:t>
+            </a:r>
+            <a:endParaRPr lang="en-US" dirty="0"/>
+          </a:p>
+        </p:txBody>
+      </p:sp>
+      <p:sp>
+        <p:nvSpPr>
+          <p:cNvPr id="19" name="TextBox 18"/>
+          <p:cNvSpPr txBox="1"/>
+          <p:nvPr/>
+        </p:nvSpPr>
+        <p:spPr>
+          <a:xfrm>
+            <a:off x="5252760" y="3996597"/>
+            <a:ext cx="534185" cy="369332"/>
+          </a:xfrm>
+          <a:prstGeom prst="rect">
+            <a:avLst/>
+          </a:prstGeom>
+          <a:noFill/>
+        </p:spPr>
+        <p:txBody>
+          <a:bodyPr wrap="none" rtlCol="0">
+            <a:spAutoFit/>
+          </a:bodyPr>
+          <a:lstStyle/>
+          <a:p>
+            <a:r>
+              <a:rPr lang="en-US" dirty="0" smtClean="0"/>
+              <a:t>TCP</a:t>
+            </a:r>
+            <a:endParaRPr lang="en-US" dirty="0"/>
+          </a:p>
+        </p:txBody>
+      </p:sp>
+      <p:sp>
+        <p:nvSpPr>
+          <p:cNvPr id="20" name="TextBox 19"/>
+          <p:cNvSpPr txBox="1"/>
+          <p:nvPr/>
+        </p:nvSpPr>
+        <p:spPr>
+          <a:xfrm>
+            <a:off x="8599983" y="3996597"/>
+            <a:ext cx="442750" cy="369332"/>
+          </a:xfrm>
+          <a:prstGeom prst="rect">
+            <a:avLst/>
+          </a:prstGeom>
+          <a:noFill/>
+        </p:spPr>
+        <p:txBody>
+          <a:bodyPr wrap="none" rtlCol="0">
+            <a:spAutoFit/>
+          </a:bodyPr>
+          <a:lstStyle/>
+          <a:p>
+            <a:r>
+              <a:rPr lang="en-US" dirty="0" smtClean="0"/>
+              <a:t>OS</a:t>
+            </a:r>
+            <a:endParaRPr lang="en-US" dirty="0"/>
           </a:p>
         </p:txBody>
       </p:sp>
     </p:spTree>
     <p:extLst>
       <p:ext uri="{BB962C8B-B14F-4D97-AF65-F5344CB8AC3E}">
-        <p14:creationId xmlns:p14="http://schemas.microsoft.com/office/powerpoint/2010/main" val="2884338859"/>
+        <p14:creationId xmlns:p14="http://schemas.microsoft.com/office/powerpoint/2010/main" val="1010506100"/>
       </p:ext>
     </p:extLst>
   </p:cSld>
@@ -4901,9 +5197,10 @@
           <a:lstStyle/>
           <a:p>
             <a:r>
-              <a:rPr lang="en-US" dirty="0"/>
-              <a:t>Links</a:t>
-            </a:r>
+              <a:rPr lang="en-US" dirty="0" smtClean="0"/>
+              <a:t>Ordering</a:t>
+            </a:r>
+            <a:endParaRPr lang="en-US" dirty="0"/>
           </a:p>
         </p:txBody>
       </p:sp>
@@ -4919,58 +5216,659 @@
         </p:nvSpPr>
         <p:spPr>
           <a:xfrm>
-            <a:off x="444843" y="1825625"/>
-            <a:ext cx="11500022" cy="4822310"/>
-          </a:xfrm>
-        </p:spPr>
-        <p:txBody>
-          <a:bodyPr/>
-          <a:lstStyle/>
-          <a:p>
-            <a:r>
-              <a:rPr lang="en-US" dirty="0"/>
-              <a:t>To access the next/previous pages, can compute the needed offsets/limits</a:t>
-            </a:r>
-          </a:p>
-          <a:p>
-            <a:r>
-              <a:rPr lang="en-US" dirty="0"/>
-              <a:t>Or, we could just provide valid URLs in the JSON responses with “</a:t>
-            </a:r>
-            <a:r>
-              <a:rPr lang="en-US" i="1" dirty="0"/>
-              <a:t>links</a:t>
-            </a:r>
-            <a:r>
-              <a:rPr lang="en-US" dirty="0"/>
-              <a:t>” to those pages</a:t>
-            </a:r>
-          </a:p>
-          <a:p>
-            <a:r>
-              <a:rPr lang="en-US" dirty="0"/>
-              <a:t>This is an instance of HATEOAS</a:t>
+            <a:off x="278721" y="1618538"/>
+            <a:ext cx="11706276" cy="1804350"/>
+          </a:xfrm>
+        </p:spPr>
+        <p:txBody>
+          <a:bodyPr>
+            <a:normAutofit fontScale="92500" lnSpcReduction="20000"/>
+          </a:bodyPr>
+          <a:lstStyle/>
+          <a:p>
+            <a:r>
+              <a:rPr lang="en-US" dirty="0" smtClean="0"/>
+              <a:t>To iterate over collection of data in deterministic order, data must be sorted, </a:t>
+            </a:r>
+            <a:r>
+              <a:rPr lang="en-US" dirty="0" err="1" smtClean="0"/>
+              <a:t>eg</a:t>
+            </a:r>
+            <a:r>
+              <a:rPr lang="en-US" dirty="0" smtClean="0"/>
+              <a:t> with ORDER BY in SQL</a:t>
+            </a:r>
+          </a:p>
+          <a:p>
+            <a:r>
+              <a:rPr lang="en-US" dirty="0" smtClean="0"/>
+              <a:t>Sorting MUST be done on database, and NOT in the application</a:t>
             </a:r>
           </a:p>
           <a:p>
             <a:pPr lvl="1"/>
             <a:r>
-              <a:rPr lang="en-US" i="1" dirty="0"/>
-              <a:t>Hypermedia as the Engine of Application State</a:t>
-            </a:r>
-          </a:p>
-          <a:p>
-            <a:r>
-              <a:rPr lang="en-US" dirty="0"/>
-              <a:t>Easier to navigate</a:t>
-            </a:r>
-          </a:p>
-        </p:txBody>
-      </p:sp>
+              <a:rPr lang="en-US" dirty="0" smtClean="0"/>
+              <a:t>otherwise need to send all data to the application</a:t>
+            </a:r>
+            <a:endParaRPr lang="en-US" dirty="0"/>
+          </a:p>
+        </p:txBody>
+      </p:sp>
+      <p:sp>
+        <p:nvSpPr>
+          <p:cNvPr id="4" name="Rounded Rectangle 3"/>
+          <p:cNvSpPr/>
+          <p:nvPr/>
+        </p:nvSpPr>
+        <p:spPr>
+          <a:xfrm>
+            <a:off x="157200" y="4365929"/>
+            <a:ext cx="1628450" cy="914400"/>
+          </a:xfrm>
+          <a:prstGeom prst="roundRect">
+            <a:avLst/>
+          </a:prstGeom>
+        </p:spPr>
+        <p:style>
+          <a:lnRef idx="2">
+            <a:schemeClr val="accent1">
+              <a:shade val="50000"/>
+            </a:schemeClr>
+          </a:lnRef>
+          <a:fillRef idx="1">
+            <a:schemeClr val="accent1"/>
+          </a:fillRef>
+          <a:effectRef idx="0">
+            <a:schemeClr val="accent1"/>
+          </a:effectRef>
+          <a:fontRef idx="minor">
+            <a:schemeClr val="lt1"/>
+          </a:fontRef>
+        </p:style>
+        <p:txBody>
+          <a:bodyPr rtlCol="0" anchor="ctr"/>
+          <a:lstStyle/>
+          <a:p>
+            <a:pPr algn="ctr"/>
+            <a:r>
+              <a:rPr lang="en-US" dirty="0" smtClean="0"/>
+              <a:t>Client</a:t>
+            </a:r>
+          </a:p>
+          <a:p>
+            <a:pPr algn="ctr"/>
+            <a:r>
+              <a:rPr lang="en-US" dirty="0" smtClean="0"/>
+              <a:t>(</a:t>
+            </a:r>
+            <a:r>
+              <a:rPr lang="en-US" dirty="0" err="1" smtClean="0"/>
+              <a:t>eg</a:t>
+            </a:r>
+            <a:r>
+              <a:rPr lang="en-US" dirty="0" smtClean="0"/>
+              <a:t>, browser)</a:t>
+            </a:r>
+            <a:endParaRPr lang="en-US" dirty="0"/>
+          </a:p>
+        </p:txBody>
+      </p:sp>
+      <p:sp>
+        <p:nvSpPr>
+          <p:cNvPr id="5" name="Rounded Rectangle 4"/>
+          <p:cNvSpPr/>
+          <p:nvPr/>
+        </p:nvSpPr>
+        <p:spPr>
+          <a:xfrm>
+            <a:off x="3056889" y="4365929"/>
+            <a:ext cx="1793116" cy="914400"/>
+          </a:xfrm>
+          <a:prstGeom prst="roundRect">
+            <a:avLst/>
+          </a:prstGeom>
+        </p:spPr>
+        <p:style>
+          <a:lnRef idx="2">
+            <a:schemeClr val="accent4">
+              <a:shade val="50000"/>
+            </a:schemeClr>
+          </a:lnRef>
+          <a:fillRef idx="1">
+            <a:schemeClr val="accent4"/>
+          </a:fillRef>
+          <a:effectRef idx="0">
+            <a:schemeClr val="accent4"/>
+          </a:effectRef>
+          <a:fontRef idx="minor">
+            <a:schemeClr val="lt1"/>
+          </a:fontRef>
+        </p:style>
+        <p:txBody>
+          <a:bodyPr rtlCol="0" anchor="ctr"/>
+          <a:lstStyle/>
+          <a:p>
+            <a:pPr algn="ctr"/>
+            <a:r>
+              <a:rPr lang="en-US" dirty="0" smtClean="0"/>
+              <a:t>Your Application</a:t>
+            </a:r>
+          </a:p>
+          <a:p>
+            <a:pPr algn="ctr"/>
+            <a:r>
+              <a:rPr lang="en-US" dirty="0" smtClean="0"/>
+              <a:t>(</a:t>
+            </a:r>
+            <a:r>
+              <a:rPr lang="en-US" dirty="0" err="1" smtClean="0"/>
+              <a:t>eg</a:t>
+            </a:r>
+            <a:r>
+              <a:rPr lang="en-US" dirty="0" smtClean="0"/>
+              <a:t>, </a:t>
+            </a:r>
+            <a:r>
+              <a:rPr lang="en-US" dirty="0" err="1" smtClean="0"/>
+              <a:t>SpringBoot</a:t>
+            </a:r>
+            <a:r>
+              <a:rPr lang="en-US" dirty="0" smtClean="0"/>
+              <a:t>)</a:t>
+            </a:r>
+            <a:endParaRPr lang="en-US" dirty="0"/>
+          </a:p>
+        </p:txBody>
+      </p:sp>
+      <p:sp>
+        <p:nvSpPr>
+          <p:cNvPr id="6" name="Rounded Rectangle 5"/>
+          <p:cNvSpPr/>
+          <p:nvPr/>
+        </p:nvSpPr>
+        <p:spPr>
+          <a:xfrm>
+            <a:off x="6121244" y="4365929"/>
+            <a:ext cx="2030266" cy="914400"/>
+          </a:xfrm>
+          <a:prstGeom prst="roundRect">
+            <a:avLst/>
+          </a:prstGeom>
+        </p:spPr>
+        <p:style>
+          <a:lnRef idx="2">
+            <a:schemeClr val="accent4">
+              <a:shade val="50000"/>
+            </a:schemeClr>
+          </a:lnRef>
+          <a:fillRef idx="1">
+            <a:schemeClr val="accent4"/>
+          </a:fillRef>
+          <a:effectRef idx="0">
+            <a:schemeClr val="accent4"/>
+          </a:effectRef>
+          <a:fontRef idx="minor">
+            <a:schemeClr val="lt1"/>
+          </a:fontRef>
+        </p:style>
+        <p:txBody>
+          <a:bodyPr rtlCol="0" anchor="ctr"/>
+          <a:lstStyle/>
+          <a:p>
+            <a:pPr algn="ctr"/>
+            <a:r>
+              <a:rPr lang="en-US" dirty="0" smtClean="0"/>
+              <a:t>Database Process</a:t>
+            </a:r>
+          </a:p>
+          <a:p>
+            <a:pPr algn="ctr"/>
+            <a:r>
+              <a:rPr lang="en-US" dirty="0" smtClean="0"/>
+              <a:t>(</a:t>
+            </a:r>
+            <a:r>
+              <a:rPr lang="en-US" dirty="0" err="1" smtClean="0"/>
+              <a:t>eg</a:t>
+            </a:r>
+            <a:r>
+              <a:rPr lang="en-US" dirty="0" smtClean="0"/>
+              <a:t> </a:t>
+            </a:r>
+            <a:r>
+              <a:rPr lang="en-US" dirty="0" err="1" smtClean="0"/>
+              <a:t>Postgress</a:t>
+            </a:r>
+            <a:r>
+              <a:rPr lang="en-US" dirty="0" smtClean="0"/>
+              <a:t>)</a:t>
+            </a:r>
+            <a:endParaRPr lang="en-US" dirty="0"/>
+          </a:p>
+        </p:txBody>
+      </p:sp>
+      <p:sp>
+        <p:nvSpPr>
+          <p:cNvPr id="7" name="Rounded Rectangle 6"/>
+          <p:cNvSpPr/>
+          <p:nvPr/>
+        </p:nvSpPr>
+        <p:spPr>
+          <a:xfrm>
+            <a:off x="9422749" y="4365929"/>
+            <a:ext cx="2260724" cy="914400"/>
+          </a:xfrm>
+          <a:prstGeom prst="roundRect">
+            <a:avLst/>
+          </a:prstGeom>
+        </p:spPr>
+        <p:style>
+          <a:lnRef idx="2">
+            <a:schemeClr val="accent6">
+              <a:shade val="50000"/>
+            </a:schemeClr>
+          </a:lnRef>
+          <a:fillRef idx="1">
+            <a:schemeClr val="accent6"/>
+          </a:fillRef>
+          <a:effectRef idx="0">
+            <a:schemeClr val="accent6"/>
+          </a:effectRef>
+          <a:fontRef idx="minor">
+            <a:schemeClr val="lt1"/>
+          </a:fontRef>
+        </p:style>
+        <p:txBody>
+          <a:bodyPr rtlCol="0" anchor="ctr"/>
+          <a:lstStyle/>
+          <a:p>
+            <a:pPr algn="ctr"/>
+            <a:r>
+              <a:rPr lang="en-US" dirty="0" smtClean="0"/>
+              <a:t>Permanent Storage</a:t>
+            </a:r>
+          </a:p>
+          <a:p>
+            <a:pPr algn="ctr"/>
+            <a:r>
+              <a:rPr lang="en-US" dirty="0" smtClean="0"/>
+              <a:t>(</a:t>
+            </a:r>
+            <a:r>
+              <a:rPr lang="en-US" dirty="0" err="1" smtClean="0"/>
+              <a:t>eg</a:t>
+            </a:r>
+            <a:r>
+              <a:rPr lang="en-US" dirty="0" smtClean="0"/>
+              <a:t>, hard-drive)</a:t>
+            </a:r>
+            <a:endParaRPr lang="en-US" dirty="0"/>
+          </a:p>
+        </p:txBody>
+      </p:sp>
+      <p:cxnSp>
+        <p:nvCxnSpPr>
+          <p:cNvPr id="8" name="Straight Arrow Connector 7"/>
+          <p:cNvCxnSpPr>
+            <a:stCxn id="4" idx="3"/>
+            <a:endCxn id="5" idx="1"/>
+          </p:cNvCxnSpPr>
+          <p:nvPr/>
+        </p:nvCxnSpPr>
+        <p:spPr>
+          <a:xfrm>
+            <a:off x="1785650" y="4823129"/>
+            <a:ext cx="1271239" cy="0"/>
+          </a:xfrm>
+          <a:prstGeom prst="straightConnector1">
+            <a:avLst/>
+          </a:prstGeom>
+          <a:ln w="44450">
+            <a:headEnd type="triangle"/>
+            <a:tailEnd type="triangle"/>
+          </a:ln>
+        </p:spPr>
+        <p:style>
+          <a:lnRef idx="1">
+            <a:schemeClr val="dk1"/>
+          </a:lnRef>
+          <a:fillRef idx="0">
+            <a:schemeClr val="dk1"/>
+          </a:fillRef>
+          <a:effectRef idx="0">
+            <a:schemeClr val="dk1"/>
+          </a:effectRef>
+          <a:fontRef idx="minor">
+            <a:schemeClr val="tx1"/>
+          </a:fontRef>
+        </p:style>
+      </p:cxnSp>
+      <p:cxnSp>
+        <p:nvCxnSpPr>
+          <p:cNvPr id="9" name="Straight Arrow Connector 8"/>
+          <p:cNvCxnSpPr>
+            <a:stCxn id="6" idx="3"/>
+            <a:endCxn id="7" idx="1"/>
+          </p:cNvCxnSpPr>
+          <p:nvPr/>
+        </p:nvCxnSpPr>
+        <p:spPr>
+          <a:xfrm>
+            <a:off x="8151510" y="4823129"/>
+            <a:ext cx="1271239" cy="0"/>
+          </a:xfrm>
+          <a:prstGeom prst="straightConnector1">
+            <a:avLst/>
+          </a:prstGeom>
+          <a:ln w="44450">
+            <a:headEnd type="triangle"/>
+            <a:tailEnd type="triangle"/>
+          </a:ln>
+        </p:spPr>
+        <p:style>
+          <a:lnRef idx="1">
+            <a:schemeClr val="dk1"/>
+          </a:lnRef>
+          <a:fillRef idx="0">
+            <a:schemeClr val="dk1"/>
+          </a:fillRef>
+          <a:effectRef idx="0">
+            <a:schemeClr val="dk1"/>
+          </a:effectRef>
+          <a:fontRef idx="minor">
+            <a:schemeClr val="tx1"/>
+          </a:fontRef>
+        </p:style>
+      </p:cxnSp>
+      <p:cxnSp>
+        <p:nvCxnSpPr>
+          <p:cNvPr id="10" name="Straight Arrow Connector 9"/>
+          <p:cNvCxnSpPr>
+            <a:stCxn id="5" idx="3"/>
+            <a:endCxn id="6" idx="1"/>
+          </p:cNvCxnSpPr>
+          <p:nvPr/>
+        </p:nvCxnSpPr>
+        <p:spPr>
+          <a:xfrm>
+            <a:off x="4850005" y="4823129"/>
+            <a:ext cx="1271239" cy="0"/>
+          </a:xfrm>
+          <a:prstGeom prst="straightConnector1">
+            <a:avLst/>
+          </a:prstGeom>
+          <a:ln w="44450">
+            <a:headEnd type="triangle"/>
+            <a:tailEnd type="triangle"/>
+          </a:ln>
+        </p:spPr>
+        <p:style>
+          <a:lnRef idx="1">
+            <a:schemeClr val="dk1"/>
+          </a:lnRef>
+          <a:fillRef idx="0">
+            <a:schemeClr val="dk1"/>
+          </a:fillRef>
+          <a:effectRef idx="0">
+            <a:schemeClr val="dk1"/>
+          </a:effectRef>
+          <a:fontRef idx="minor">
+            <a:schemeClr val="tx1"/>
+          </a:fontRef>
+        </p:style>
+      </p:cxnSp>
+      <p:sp>
+        <p:nvSpPr>
+          <p:cNvPr id="11" name="TextBox 10"/>
+          <p:cNvSpPr txBox="1"/>
+          <p:nvPr/>
+        </p:nvSpPr>
+        <p:spPr>
+          <a:xfrm>
+            <a:off x="2083708" y="4365929"/>
+            <a:ext cx="675121" cy="369332"/>
+          </a:xfrm>
+          <a:prstGeom prst="rect">
+            <a:avLst/>
+          </a:prstGeom>
+          <a:noFill/>
+        </p:spPr>
+        <p:txBody>
+          <a:bodyPr wrap="none" rtlCol="0">
+            <a:spAutoFit/>
+          </a:bodyPr>
+          <a:lstStyle/>
+          <a:p>
+            <a:r>
+              <a:rPr lang="en-US" dirty="0" smtClean="0"/>
+              <a:t>HTTP</a:t>
+            </a:r>
+            <a:endParaRPr lang="en-US" dirty="0"/>
+          </a:p>
+        </p:txBody>
+      </p:sp>
+      <p:sp>
+        <p:nvSpPr>
+          <p:cNvPr id="12" name="TextBox 11"/>
+          <p:cNvSpPr txBox="1"/>
+          <p:nvPr/>
+        </p:nvSpPr>
+        <p:spPr>
+          <a:xfrm>
+            <a:off x="5218531" y="4365929"/>
+            <a:ext cx="534185" cy="369332"/>
+          </a:xfrm>
+          <a:prstGeom prst="rect">
+            <a:avLst/>
+          </a:prstGeom>
+          <a:noFill/>
+        </p:spPr>
+        <p:txBody>
+          <a:bodyPr wrap="none" rtlCol="0">
+            <a:spAutoFit/>
+          </a:bodyPr>
+          <a:lstStyle/>
+          <a:p>
+            <a:r>
+              <a:rPr lang="en-US" dirty="0" smtClean="0"/>
+              <a:t>TCP</a:t>
+            </a:r>
+            <a:endParaRPr lang="en-US" dirty="0"/>
+          </a:p>
+        </p:txBody>
+      </p:sp>
+      <p:sp>
+        <p:nvSpPr>
+          <p:cNvPr id="13" name="TextBox 12"/>
+          <p:cNvSpPr txBox="1"/>
+          <p:nvPr/>
+        </p:nvSpPr>
+        <p:spPr>
+          <a:xfrm>
+            <a:off x="8565754" y="4365929"/>
+            <a:ext cx="442750" cy="369332"/>
+          </a:xfrm>
+          <a:prstGeom prst="rect">
+            <a:avLst/>
+          </a:prstGeom>
+          <a:noFill/>
+        </p:spPr>
+        <p:txBody>
+          <a:bodyPr wrap="none" rtlCol="0">
+            <a:spAutoFit/>
+          </a:bodyPr>
+          <a:lstStyle/>
+          <a:p>
+            <a:r>
+              <a:rPr lang="en-US" dirty="0" smtClean="0"/>
+              <a:t>OS</a:t>
+            </a:r>
+            <a:endParaRPr lang="en-US" dirty="0"/>
+          </a:p>
+        </p:txBody>
+      </p:sp>
+      <p:sp>
+        <p:nvSpPr>
+          <p:cNvPr id="14" name="TextBox 13"/>
+          <p:cNvSpPr txBox="1"/>
+          <p:nvPr/>
+        </p:nvSpPr>
+        <p:spPr>
+          <a:xfrm>
+            <a:off x="2129152" y="4961628"/>
+            <a:ext cx="495649" cy="461665"/>
+          </a:xfrm>
+          <a:prstGeom prst="rect">
+            <a:avLst/>
+          </a:prstGeom>
+          <a:noFill/>
+        </p:spPr>
+        <p:txBody>
+          <a:bodyPr wrap="none" rtlCol="0">
+            <a:spAutoFit/>
+          </a:bodyPr>
+          <a:lstStyle/>
+          <a:p>
+            <a:r>
+              <a:rPr lang="en-US" sz="2400" dirty="0" smtClean="0"/>
+              <a:t>20</a:t>
+            </a:r>
+            <a:endParaRPr lang="en-US" sz="2400" dirty="0"/>
+          </a:p>
+        </p:txBody>
+      </p:sp>
+      <p:sp>
+        <p:nvSpPr>
+          <p:cNvPr id="15" name="TextBox 14"/>
+          <p:cNvSpPr txBox="1"/>
+          <p:nvPr/>
+        </p:nvSpPr>
+        <p:spPr>
+          <a:xfrm>
+            <a:off x="5193507" y="4967953"/>
+            <a:ext cx="495649" cy="461665"/>
+          </a:xfrm>
+          <a:prstGeom prst="rect">
+            <a:avLst/>
+          </a:prstGeom>
+          <a:noFill/>
+        </p:spPr>
+        <p:txBody>
+          <a:bodyPr wrap="none" rtlCol="0">
+            <a:spAutoFit/>
+          </a:bodyPr>
+          <a:lstStyle/>
+          <a:p>
+            <a:r>
+              <a:rPr lang="en-US" sz="2400" dirty="0" smtClean="0"/>
+              <a:t>20</a:t>
+            </a:r>
+            <a:endParaRPr lang="en-US" sz="2400" dirty="0"/>
+          </a:p>
+        </p:txBody>
+      </p:sp>
+      <p:sp>
+        <p:nvSpPr>
+          <p:cNvPr id="16" name="TextBox 15"/>
+          <p:cNvSpPr txBox="1"/>
+          <p:nvPr/>
+        </p:nvSpPr>
+        <p:spPr>
+          <a:xfrm>
+            <a:off x="8330113" y="4967953"/>
+            <a:ext cx="914033" cy="461665"/>
+          </a:xfrm>
+          <a:prstGeom prst="rect">
+            <a:avLst/>
+          </a:prstGeom>
+          <a:noFill/>
+        </p:spPr>
+        <p:txBody>
+          <a:bodyPr wrap="none" rtlCol="0">
+            <a:spAutoFit/>
+          </a:bodyPr>
+          <a:lstStyle/>
+          <a:p>
+            <a:r>
+              <a:rPr lang="en-US" sz="2400" dirty="0" smtClean="0"/>
+              <a:t>100M</a:t>
+            </a:r>
+            <a:endParaRPr lang="en-US" sz="2400" dirty="0"/>
+          </a:p>
+        </p:txBody>
+      </p:sp>
+      <p:sp>
+        <p:nvSpPr>
+          <p:cNvPr id="17" name="TextBox 16"/>
+          <p:cNvSpPr txBox="1"/>
+          <p:nvPr/>
+        </p:nvSpPr>
+        <p:spPr>
+          <a:xfrm>
+            <a:off x="6479690" y="5877588"/>
+            <a:ext cx="1313373" cy="461665"/>
+          </a:xfrm>
+          <a:prstGeom prst="rect">
+            <a:avLst/>
+          </a:prstGeom>
+          <a:noFill/>
+        </p:spPr>
+        <p:txBody>
+          <a:bodyPr wrap="none" rtlCol="0">
+            <a:spAutoFit/>
+          </a:bodyPr>
+          <a:lstStyle/>
+          <a:p>
+            <a:r>
+              <a:rPr lang="en-US" sz="2400" dirty="0" smtClean="0"/>
+              <a:t>SORTING</a:t>
+            </a:r>
+            <a:endParaRPr lang="en-US" sz="2400" dirty="0"/>
+          </a:p>
+        </p:txBody>
+      </p:sp>
+      <p:cxnSp>
+        <p:nvCxnSpPr>
+          <p:cNvPr id="18" name="Straight Arrow Connector 17"/>
+          <p:cNvCxnSpPr>
+            <a:stCxn id="17" idx="0"/>
+            <a:endCxn id="6" idx="2"/>
+          </p:cNvCxnSpPr>
+          <p:nvPr/>
+        </p:nvCxnSpPr>
+        <p:spPr>
+          <a:xfrm flipV="1">
+            <a:off x="7136377" y="5280329"/>
+            <a:ext cx="0" cy="597259"/>
+          </a:xfrm>
+          <a:prstGeom prst="straightConnector1">
+            <a:avLst/>
+          </a:prstGeom>
+          <a:ln w="44450">
+            <a:headEnd type="none"/>
+            <a:tailEnd type="triangle"/>
+          </a:ln>
+        </p:spPr>
+        <p:style>
+          <a:lnRef idx="1">
+            <a:schemeClr val="dk1"/>
+          </a:lnRef>
+          <a:fillRef idx="0">
+            <a:schemeClr val="dk1"/>
+          </a:fillRef>
+          <a:effectRef idx="0">
+            <a:schemeClr val="dk1"/>
+          </a:effectRef>
+          <a:fontRef idx="minor">
+            <a:schemeClr val="tx1"/>
+          </a:fontRef>
+        </p:style>
+      </p:cxnSp>
     </p:spTree>
     <p:extLst>
       <p:ext uri="{BB962C8B-B14F-4D97-AF65-F5344CB8AC3E}">
-        <p14:creationId xmlns:p14="http://schemas.microsoft.com/office/powerpoint/2010/main" val="767827934"/>
+        <p14:creationId xmlns:p14="http://schemas.microsoft.com/office/powerpoint/2010/main" val="3138364704"/>
       </p:ext>
     </p:extLst>
   </p:cSld>
@@ -5294,7 +6192,7 @@
       </p:grpSpPr>
       <p:sp>
         <p:nvSpPr>
-          <p:cNvPr id="2" name="Title 1"/>
+          <p:cNvPr id="4" name="Title 3"/>
           <p:cNvSpPr>
             <a:spLocks noGrp="1"/>
           </p:cNvSpPr>
@@ -5308,52 +6206,17 @@
           <a:lstStyle/>
           <a:p>
             <a:r>
-              <a:rPr lang="en-US" dirty="0"/>
-              <a:t>Standard</a:t>
-            </a:r>
-          </a:p>
-        </p:txBody>
-      </p:sp>
-      <p:sp>
-        <p:nvSpPr>
-          <p:cNvPr id="3" name="Content Placeholder 2"/>
-          <p:cNvSpPr>
-            <a:spLocks noGrp="1"/>
-          </p:cNvSpPr>
-          <p:nvPr>
-            <p:ph idx="1"/>
-          </p:nvPr>
-        </p:nvSpPr>
-        <p:spPr>
-          <a:xfrm>
-            <a:off x="337751" y="1825624"/>
-            <a:ext cx="11574163" cy="4764645"/>
-          </a:xfrm>
-        </p:spPr>
-        <p:txBody>
-          <a:bodyPr/>
-          <a:lstStyle/>
-          <a:p>
-            <a:r>
-              <a:rPr lang="en-US" dirty="0"/>
-              <a:t>There is no official standard to define pages and links</a:t>
-            </a:r>
-          </a:p>
-          <a:p>
+              <a:rPr lang="en-US" dirty="0" smtClean="0"/>
+              <a:t>Offset Pagination</a:t>
+            </a:r>
             <a:endParaRPr lang="en-US" dirty="0"/>
-          </a:p>
-          <a:p>
-            <a:r>
-              <a:rPr lang="en-US" dirty="0"/>
-              <a:t>In the past, there were some attempts like HAL, but they look like abandoned</a:t>
-            </a:r>
           </a:p>
         </p:txBody>
       </p:sp>
     </p:spTree>
     <p:extLst>
       <p:ext uri="{BB962C8B-B14F-4D97-AF65-F5344CB8AC3E}">
-        <p14:creationId xmlns:p14="http://schemas.microsoft.com/office/powerpoint/2010/main" val="489897762"/>
+        <p14:creationId xmlns:p14="http://schemas.microsoft.com/office/powerpoint/2010/main" val="600840496"/>
       </p:ext>
     </p:extLst>
   </p:cSld>
@@ -5382,7 +6245,7 @@
       </p:grpSpPr>
       <p:sp>
         <p:nvSpPr>
-          <p:cNvPr id="4" name="Title 3"/>
+          <p:cNvPr id="2" name="Title 1"/>
           <p:cNvSpPr>
             <a:spLocks noGrp="1"/>
           </p:cNvSpPr>
@@ -5396,17 +6259,103 @@
           <a:lstStyle/>
           <a:p>
             <a:r>
-              <a:rPr lang="en-US" dirty="0" smtClean="0"/>
-              <a:t>Data Expansion</a:t>
+              <a:rPr lang="en-US" dirty="0"/>
+              <a:t>Offset/Limit</a:t>
+            </a:r>
+          </a:p>
+        </p:txBody>
+      </p:sp>
+      <p:sp>
+        <p:nvSpPr>
+          <p:cNvPr id="3" name="Content Placeholder 2"/>
+          <p:cNvSpPr>
+            <a:spLocks noGrp="1"/>
+          </p:cNvSpPr>
+          <p:nvPr>
+            <p:ph idx="1"/>
+          </p:nvPr>
+        </p:nvSpPr>
+        <p:spPr>
+          <a:xfrm>
+            <a:off x="321276" y="1825625"/>
+            <a:ext cx="11648302" cy="4838786"/>
+          </a:xfrm>
+        </p:spPr>
+        <p:txBody>
+          <a:bodyPr/>
+          <a:lstStyle/>
+          <a:p>
+            <a:r>
+              <a:rPr lang="en-US" dirty="0"/>
+              <a:t>When dealing with large collections, need a way to specify the boundaries of a </a:t>
+            </a:r>
+            <a:r>
+              <a:rPr lang="en-US" i="1" dirty="0"/>
+              <a:t>Page</a:t>
+            </a:r>
+          </a:p>
+          <a:p>
+            <a:r>
+              <a:rPr lang="en-US" dirty="0"/>
+              <a:t>Example: </a:t>
+            </a:r>
+            <a:r>
+              <a:rPr lang="en-US" i="1" dirty="0"/>
+              <a:t>GET /</a:t>
+            </a:r>
+            <a:r>
+              <a:rPr lang="en-US" i="1" dirty="0" err="1"/>
+              <a:t>news?</a:t>
+            </a:r>
+            <a:r>
+              <a:rPr lang="en-US" b="1" i="1" dirty="0" err="1"/>
+              <a:t>offset</a:t>
+            </a:r>
+            <a:r>
+              <a:rPr lang="en-US" i="1" dirty="0"/>
+              <a:t>=40&amp;</a:t>
+            </a:r>
+            <a:r>
+              <a:rPr lang="en-US" b="1" i="1" dirty="0"/>
+              <a:t>limit</a:t>
+            </a:r>
+            <a:r>
+              <a:rPr lang="en-US" i="1" dirty="0"/>
+              <a:t>=10</a:t>
             </a:r>
             <a:endParaRPr lang="en-US" dirty="0"/>
+          </a:p>
+          <a:p>
+            <a:r>
+              <a:rPr lang="en-US" i="1" dirty="0"/>
+              <a:t>Offset</a:t>
+            </a:r>
+            <a:r>
+              <a:rPr lang="en-US" dirty="0"/>
+              <a:t>: given the collection sorted like an array, this would be the starting index </a:t>
+            </a:r>
+            <a:r>
+              <a:rPr lang="en-US" i="1" dirty="0"/>
+              <a:t>i</a:t>
+            </a:r>
+          </a:p>
+          <a:p>
+            <a:r>
+              <a:rPr lang="en-US" i="1" dirty="0"/>
+              <a:t>Limit: </a:t>
+            </a:r>
+            <a:r>
+              <a:rPr lang="en-US" dirty="0"/>
+              <a:t>starting from the offset, how many elements to return</a:t>
+            </a:r>
+            <a:endParaRPr lang="en-US" i="1" dirty="0"/>
           </a:p>
         </p:txBody>
       </p:sp>
     </p:spTree>
     <p:extLst>
       <p:ext uri="{BB962C8B-B14F-4D97-AF65-F5344CB8AC3E}">
-        <p14:creationId xmlns:p14="http://schemas.microsoft.com/office/powerpoint/2010/main" val="2247111827"/>
+        <p14:creationId xmlns:p14="http://schemas.microsoft.com/office/powerpoint/2010/main" val="2884338859"/>
       </p:ext>
     </p:extLst>
   </p:cSld>
@@ -5449,9 +6398,10 @@
           <a:lstStyle/>
           <a:p>
             <a:r>
-              <a:rPr lang="en-US" dirty="0"/>
-              <a:t>Expansion</a:t>
-            </a:r>
+              <a:rPr lang="en-US" dirty="0" smtClean="0"/>
+              <a:t>Offset in SQL</a:t>
+            </a:r>
+            <a:endParaRPr lang="en-US" dirty="0"/>
           </a:p>
         </p:txBody>
       </p:sp>
@@ -5467,111 +6417,172 @@
         </p:nvSpPr>
         <p:spPr>
           <a:xfrm>
-            <a:off x="98855" y="1825624"/>
-            <a:ext cx="11796584" cy="4855261"/>
+            <a:off x="273831" y="1825624"/>
+            <a:ext cx="11584030" cy="4785439"/>
           </a:xfrm>
         </p:spPr>
         <p:txBody>
           <a:bodyPr>
-            <a:normAutofit/>
+            <a:normAutofit lnSpcReduction="10000"/>
           </a:bodyPr>
           <a:lstStyle/>
           <a:p>
             <a:r>
-              <a:rPr lang="en-US" dirty="0"/>
-              <a:t>A “news” might have a </a:t>
+              <a:rPr lang="en-US" dirty="0" smtClean="0"/>
+              <a:t>SQL has direct support for OFFSET and LIMIT</a:t>
+            </a:r>
+          </a:p>
+          <a:p>
+            <a:r>
+              <a:rPr lang="en-US" dirty="0" err="1" smtClean="0"/>
+              <a:t>Eg</a:t>
+            </a:r>
+            <a:r>
+              <a:rPr lang="en-US" dirty="0"/>
+              <a:t>: </a:t>
             </a:r>
             <a:r>
               <a:rPr lang="en-US" i="1" dirty="0"/>
-              <a:t>list</a:t>
-            </a:r>
-            <a:r>
-              <a:rPr lang="en-US" dirty="0"/>
-              <a:t> of “comments”</a:t>
-            </a:r>
-          </a:p>
-          <a:p>
-            <a:r>
-              <a:rPr lang="en-US" dirty="0"/>
-              <a:t>A “news” might also have a </a:t>
+              <a:t>select * from lead </a:t>
+            </a:r>
+            <a:r>
+              <a:rPr lang="en-US" b="1" i="1" dirty="0" smtClean="0"/>
+              <a:t>ORDER BY </a:t>
+            </a:r>
+            <a:r>
+              <a:rPr lang="en-US" i="1" dirty="0" smtClean="0"/>
+              <a:t>id </a:t>
+            </a:r>
+            <a:r>
+              <a:rPr lang="en-US" i="1" dirty="0" err="1"/>
+              <a:t>desc</a:t>
             </a:r>
             <a:r>
               <a:rPr lang="en-US" i="1" dirty="0"/>
-              <a:t>list</a:t>
-            </a:r>
-            <a:r>
-              <a:rPr lang="en-US" dirty="0"/>
-              <a:t> of “</a:t>
+              <a:t> </a:t>
+            </a:r>
+            <a:r>
+              <a:rPr lang="en-US" b="1" i="1" dirty="0"/>
+              <a:t>LIMIT</a:t>
             </a:r>
             <a:r>
               <a:rPr lang="en-US" i="1" dirty="0"/>
-              <a:t>users</a:t>
-            </a:r>
-            <a:r>
-              <a:rPr lang="en-US" dirty="0"/>
-              <a:t>” that liked it </a:t>
-            </a:r>
-          </a:p>
-          <a:p>
-            <a:r>
-              <a:rPr lang="en-US" dirty="0"/>
-              <a:t>When retrieving a single item, might not want to download as well the hundreds/thousands of other items related to it</a:t>
-            </a:r>
-          </a:p>
-          <a:p>
-            <a:r>
-              <a:rPr lang="en-US" dirty="0"/>
-              <a:t>As returning those lists can be very expensive, can have special query parameters to choose if downloaded or not</a:t>
-            </a:r>
-          </a:p>
-          <a:p>
-            <a:r>
-              <a:rPr lang="en-US" dirty="0" err="1"/>
-              <a:t>Eg</a:t>
-            </a:r>
-            <a:r>
-              <a:rPr lang="en-US" dirty="0"/>
-              <a:t>.: GET /</a:t>
-            </a:r>
-            <a:r>
-              <a:rPr lang="en-US" dirty="0" err="1"/>
-              <a:t>news?</a:t>
-            </a:r>
-            <a:r>
-              <a:rPr lang="en-US" b="1" dirty="0" err="1"/>
-              <a:t>expand</a:t>
-            </a:r>
-            <a:r>
-              <a:rPr lang="en-US" dirty="0"/>
-              <a:t>=NONE   (no lists)</a:t>
-            </a:r>
-          </a:p>
-          <a:p>
-            <a:r>
-              <a:rPr lang="en-US" dirty="0" err="1"/>
-              <a:t>Eg</a:t>
-            </a:r>
-            <a:r>
-              <a:rPr lang="en-US" dirty="0"/>
-              <a:t>.: GET /</a:t>
-            </a:r>
-            <a:r>
-              <a:rPr lang="en-US" dirty="0" err="1"/>
-              <a:t>news?</a:t>
-            </a:r>
-            <a:r>
-              <a:rPr lang="en-US" b="1" dirty="0" err="1"/>
-              <a:t>expand</a:t>
-            </a:r>
-            <a:r>
-              <a:rPr lang="en-US" dirty="0"/>
-              <a:t>=COMMENTS   (include comments)</a:t>
-            </a:r>
-          </a:p>
-          <a:p>
+              <a:t> </a:t>
+            </a:r>
+            <a:r>
+              <a:rPr lang="en-US" i="1" dirty="0" smtClean="0"/>
+              <a:t>20 </a:t>
+            </a:r>
+            <a:r>
+              <a:rPr lang="en-US" b="1" i="1" dirty="0"/>
+              <a:t>OFFSET</a:t>
+            </a:r>
+            <a:r>
+              <a:rPr lang="en-US" i="1" dirty="0"/>
+              <a:t> </a:t>
+            </a:r>
+            <a:r>
+              <a:rPr lang="en-US" i="1" dirty="0" smtClean="0"/>
+              <a:t>0</a:t>
+            </a:r>
+          </a:p>
+          <a:p>
+            <a:r>
+              <a:rPr lang="en-US" dirty="0" smtClean="0"/>
+              <a:t>LIMIT: how many rows to return</a:t>
+            </a:r>
+          </a:p>
+          <a:p>
+            <a:r>
+              <a:rPr lang="en-US" dirty="0" smtClean="0"/>
+              <a:t>OFFSET: how many rows to skip before returning data</a:t>
+            </a:r>
+          </a:p>
+          <a:p>
+            <a:r>
+              <a:rPr lang="en-US" dirty="0" smtClean="0"/>
+              <a:t>Page: defined by OFFSET and LIMIT</a:t>
+            </a:r>
+          </a:p>
+          <a:p>
+            <a:pPr lvl="1"/>
+            <a:r>
+              <a:rPr lang="en-US" dirty="0" smtClean="0"/>
+              <a:t>1</a:t>
+            </a:r>
+            <a:r>
+              <a:rPr lang="en-US" baseline="30000" dirty="0" smtClean="0"/>
+              <a:t>st</a:t>
+            </a:r>
+            <a:r>
+              <a:rPr lang="en-US" dirty="0" smtClean="0"/>
+              <a:t> page: </a:t>
+            </a:r>
+            <a:r>
+              <a:rPr lang="en-US" i="1" dirty="0"/>
+              <a:t>LIMIT 20 OFFSET 0</a:t>
+            </a:r>
+          </a:p>
+          <a:p>
+            <a:pPr lvl="1"/>
+            <a:r>
+              <a:rPr lang="en-US" dirty="0" smtClean="0"/>
+              <a:t>2</a:t>
+            </a:r>
+            <a:r>
+              <a:rPr lang="en-US" baseline="30000" dirty="0" smtClean="0"/>
+              <a:t>nd</a:t>
+            </a:r>
+            <a:r>
+              <a:rPr lang="en-US" dirty="0" smtClean="0"/>
+              <a:t> page: </a:t>
+            </a:r>
+            <a:r>
+              <a:rPr lang="en-US" i="1" dirty="0"/>
+              <a:t>LIMIT 20 OFFSET </a:t>
+            </a:r>
+            <a:r>
+              <a:rPr lang="en-US" i="1" dirty="0" smtClean="0"/>
+              <a:t>20</a:t>
+            </a:r>
+          </a:p>
+          <a:p>
+            <a:pPr lvl="1"/>
+            <a:r>
+              <a:rPr lang="en-US" dirty="0" smtClean="0"/>
+              <a:t>3</a:t>
+            </a:r>
+            <a:r>
+              <a:rPr lang="en-US" baseline="30000" dirty="0" smtClean="0"/>
+              <a:t>rd</a:t>
+            </a:r>
+            <a:r>
+              <a:rPr lang="en-US" dirty="0" smtClean="0"/>
+              <a:t> page: </a:t>
+            </a:r>
+            <a:r>
+              <a:rPr lang="en-US" i="1" dirty="0"/>
+              <a:t>LIMIT 20 OFFSET </a:t>
+            </a:r>
+            <a:r>
+              <a:rPr lang="en-US" i="1" dirty="0" smtClean="0"/>
+              <a:t>40</a:t>
+            </a:r>
+          </a:p>
+          <a:p>
+            <a:pPr lvl="1"/>
+            <a:r>
+              <a:rPr lang="en-US" i="1" dirty="0" smtClean="0"/>
+              <a:t>etc.</a:t>
+            </a:r>
+            <a:endParaRPr lang="en-US" i="1" dirty="0"/>
+          </a:p>
+          <a:p>
+            <a:pPr lvl="1"/>
             <a:endParaRPr lang="en-US" dirty="0"/>
           </a:p>
           <a:p>
+            <a:pPr lvl="1"/>
             <a:endParaRPr lang="en-US" dirty="0"/>
           </a:p>
         </p:txBody>
@@ -5579,7 +6590,7 @@
     </p:spTree>
     <p:extLst>
       <p:ext uri="{BB962C8B-B14F-4D97-AF65-F5344CB8AC3E}">
-        <p14:creationId xmlns:p14="http://schemas.microsoft.com/office/powerpoint/2010/main" val="1152359187"/>
+        <p14:creationId xmlns:p14="http://schemas.microsoft.com/office/powerpoint/2010/main" val="1876205707"/>
       </p:ext>
     </p:extLst>
   </p:cSld>
@@ -5616,15 +6627,21 @@
             <p:ph type="title"/>
           </p:nvPr>
         </p:nvSpPr>
-        <p:spPr/>
+        <p:spPr>
+          <a:xfrm>
+            <a:off x="181332" y="301656"/>
+            <a:ext cx="5914668" cy="1325563"/>
+          </a:xfrm>
+        </p:spPr>
         <p:txBody>
           <a:bodyPr/>
           <a:lstStyle/>
           <a:p>
             <a:r>
-              <a:rPr lang="en-US" dirty="0"/>
-              <a:t>Tradeoff</a:t>
-            </a:r>
+              <a:rPr lang="en-US" dirty="0" smtClean="0"/>
+              <a:t>Why Inefficient?</a:t>
+            </a:r>
+            <a:endParaRPr lang="en-US" dirty="0"/>
           </a:p>
         </p:txBody>
       </p:sp>
@@ -5640,8 +6657,8 @@
         </p:nvSpPr>
         <p:spPr>
           <a:xfrm>
-            <a:off x="255373" y="1825624"/>
-            <a:ext cx="11755395" cy="4847025"/>
+            <a:off x="244491" y="1736724"/>
+            <a:ext cx="11750285" cy="4893897"/>
           </a:xfrm>
         </p:spPr>
         <p:txBody>
@@ -5649,80 +6666,273 @@
           <a:lstStyle/>
           <a:p>
             <a:r>
-              <a:rPr lang="en-US" dirty="0"/>
-              <a:t>Option 1: never return those lists</a:t>
+              <a:rPr lang="en-US" dirty="0" smtClean="0"/>
+              <a:t>To read page N, need to know the previous N-1 pages to skip</a:t>
+            </a:r>
+          </a:p>
+          <a:p>
+            <a:r>
+              <a:rPr lang="en-US" dirty="0" smtClean="0"/>
+              <a:t>To be able to sort, database has to keep a buffer of size OFFSET+LIMIT (which represent all pages till N)</a:t>
+            </a:r>
+          </a:p>
+          <a:p>
+            <a:r>
+              <a:rPr lang="en-US" dirty="0" smtClean="0"/>
+              <a:t>Have to read all data (</a:t>
+            </a:r>
+            <a:r>
+              <a:rPr lang="en-US" dirty="0" err="1" smtClean="0"/>
+              <a:t>eg</a:t>
+            </a:r>
+            <a:r>
+              <a:rPr lang="en-US" dirty="0" smtClean="0"/>
+              <a:t> 100M rows), but for sorting no need to keep in RAM all of that, as at most returning LIMIT rows</a:t>
+            </a:r>
+          </a:p>
+          <a:p>
+            <a:r>
+              <a:rPr lang="en-US" dirty="0" smtClean="0"/>
+              <a:t>If sorting on descending ID, only need to keep track of highest K=OFFSET+LIMIT ids</a:t>
             </a:r>
           </a:p>
           <a:p>
             <a:pPr lvl="1"/>
             <a:r>
-              <a:rPr lang="en-US" dirty="0"/>
-              <a:t>But, then, need further HTTP calls to retrieve those lists if needed</a:t>
-            </a:r>
-          </a:p>
-          <a:p>
-            <a:r>
-              <a:rPr lang="en-US" dirty="0"/>
-              <a:t>Option 2: create “</a:t>
-            </a:r>
-            <a:r>
-              <a:rPr lang="en-US" i="1" dirty="0"/>
-              <a:t>expand</a:t>
-            </a:r>
-            <a:r>
-              <a:rPr lang="en-US" dirty="0"/>
-              <a:t>” query parameters to control what returned</a:t>
-            </a:r>
-          </a:p>
-          <a:p>
-            <a:pPr lvl="1"/>
-            <a:r>
-              <a:rPr lang="en-US" dirty="0"/>
-              <a:t>Good: can return everything needed in a single HTTP request</a:t>
-            </a:r>
-          </a:p>
-          <a:p>
-            <a:pPr lvl="1"/>
-            <a:r>
-              <a:rPr lang="en-US" dirty="0"/>
-              <a:t>Bad: needs to implement all the needed cases </a:t>
-            </a:r>
-            <a:r>
-              <a:rPr lang="en-US" i="1" dirty="0"/>
-              <a:t>manually</a:t>
-            </a:r>
-          </a:p>
-          <a:p>
-            <a:r>
-              <a:rPr lang="en-US" i="1" dirty="0" err="1"/>
-              <a:t>GraphQL</a:t>
-            </a:r>
-            <a:r>
-              <a:rPr lang="en-US" dirty="0"/>
-              <a:t>: a selling point compared to REST is its ability to exactly specify what to return</a:t>
-            </a:r>
-          </a:p>
-          <a:p>
-            <a:pPr lvl="1"/>
-            <a:r>
-              <a:rPr lang="en-US" dirty="0"/>
-              <a:t>we will see </a:t>
-            </a:r>
-            <a:r>
-              <a:rPr lang="en-US" dirty="0" err="1"/>
-              <a:t>GraphQL</a:t>
-            </a:r>
-            <a:r>
-              <a:rPr lang="en-US" dirty="0"/>
-              <a:t> later in the course</a:t>
-            </a:r>
+              <a:rPr lang="en-US" dirty="0" smtClean="0"/>
+              <a:t>if when reading new row out of 100m, no need to store it in RAM if id smaller than the smallest in current K buffer</a:t>
+            </a:r>
+            <a:endParaRPr lang="en-US" dirty="0"/>
+          </a:p>
+        </p:txBody>
+      </p:sp>
+      <p:sp>
+        <p:nvSpPr>
+          <p:cNvPr id="4" name="Rounded Rectangle 3"/>
+          <p:cNvSpPr/>
+          <p:nvPr/>
+        </p:nvSpPr>
+        <p:spPr>
+          <a:xfrm>
+            <a:off x="6468423" y="365125"/>
+            <a:ext cx="2030266" cy="914400"/>
+          </a:xfrm>
+          <a:prstGeom prst="roundRect">
+            <a:avLst/>
+          </a:prstGeom>
+        </p:spPr>
+        <p:style>
+          <a:lnRef idx="2">
+            <a:schemeClr val="accent4">
+              <a:shade val="50000"/>
+            </a:schemeClr>
+          </a:lnRef>
+          <a:fillRef idx="1">
+            <a:schemeClr val="accent4"/>
+          </a:fillRef>
+          <a:effectRef idx="0">
+            <a:schemeClr val="accent4"/>
+          </a:effectRef>
+          <a:fontRef idx="minor">
+            <a:schemeClr val="lt1"/>
+          </a:fontRef>
+        </p:style>
+        <p:txBody>
+          <a:bodyPr rtlCol="0" anchor="ctr"/>
+          <a:lstStyle/>
+          <a:p>
+            <a:pPr algn="ctr"/>
+            <a:r>
+              <a:rPr lang="en-US" dirty="0" smtClean="0"/>
+              <a:t>Database Process</a:t>
+            </a:r>
+          </a:p>
+          <a:p>
+            <a:pPr algn="ctr"/>
+            <a:r>
+              <a:rPr lang="en-US" dirty="0" smtClean="0"/>
+              <a:t>(</a:t>
+            </a:r>
+            <a:r>
+              <a:rPr lang="en-US" dirty="0" err="1" smtClean="0"/>
+              <a:t>eg</a:t>
+            </a:r>
+            <a:r>
+              <a:rPr lang="en-US" dirty="0" smtClean="0"/>
+              <a:t> </a:t>
+            </a:r>
+            <a:r>
+              <a:rPr lang="en-US" dirty="0" err="1" smtClean="0"/>
+              <a:t>Postgress</a:t>
+            </a:r>
+            <a:r>
+              <a:rPr lang="en-US" dirty="0" smtClean="0"/>
+              <a:t>)</a:t>
+            </a:r>
+            <a:endParaRPr lang="en-US" dirty="0"/>
+          </a:p>
+        </p:txBody>
+      </p:sp>
+      <p:sp>
+        <p:nvSpPr>
+          <p:cNvPr id="5" name="Rounded Rectangle 4"/>
+          <p:cNvSpPr/>
+          <p:nvPr/>
+        </p:nvSpPr>
+        <p:spPr>
+          <a:xfrm>
+            <a:off x="9769928" y="365125"/>
+            <a:ext cx="2260724" cy="914400"/>
+          </a:xfrm>
+          <a:prstGeom prst="roundRect">
+            <a:avLst/>
+          </a:prstGeom>
+        </p:spPr>
+        <p:style>
+          <a:lnRef idx="2">
+            <a:schemeClr val="accent6">
+              <a:shade val="50000"/>
+            </a:schemeClr>
+          </a:lnRef>
+          <a:fillRef idx="1">
+            <a:schemeClr val="accent6"/>
+          </a:fillRef>
+          <a:effectRef idx="0">
+            <a:schemeClr val="accent6"/>
+          </a:effectRef>
+          <a:fontRef idx="minor">
+            <a:schemeClr val="lt1"/>
+          </a:fontRef>
+        </p:style>
+        <p:txBody>
+          <a:bodyPr rtlCol="0" anchor="ctr"/>
+          <a:lstStyle/>
+          <a:p>
+            <a:pPr algn="ctr"/>
+            <a:r>
+              <a:rPr lang="en-US" dirty="0" smtClean="0"/>
+              <a:t>Permanent Storage</a:t>
+            </a:r>
+          </a:p>
+          <a:p>
+            <a:pPr algn="ctr"/>
+            <a:r>
+              <a:rPr lang="en-US" dirty="0" smtClean="0"/>
+              <a:t>(</a:t>
+            </a:r>
+            <a:r>
+              <a:rPr lang="en-US" dirty="0" err="1" smtClean="0"/>
+              <a:t>eg</a:t>
+            </a:r>
+            <a:r>
+              <a:rPr lang="en-US" dirty="0" smtClean="0"/>
+              <a:t>, hard-drive)</a:t>
+            </a:r>
+            <a:endParaRPr lang="en-US" dirty="0"/>
+          </a:p>
+        </p:txBody>
+      </p:sp>
+      <p:cxnSp>
+        <p:nvCxnSpPr>
+          <p:cNvPr id="6" name="Straight Arrow Connector 5"/>
+          <p:cNvCxnSpPr>
+            <a:stCxn id="4" idx="3"/>
+            <a:endCxn id="5" idx="1"/>
+          </p:cNvCxnSpPr>
+          <p:nvPr/>
+        </p:nvCxnSpPr>
+        <p:spPr>
+          <a:xfrm>
+            <a:off x="8498689" y="822325"/>
+            <a:ext cx="1271239" cy="0"/>
+          </a:xfrm>
+          <a:prstGeom prst="straightConnector1">
+            <a:avLst/>
+          </a:prstGeom>
+          <a:ln w="44450">
+            <a:headEnd type="triangle"/>
+            <a:tailEnd type="triangle"/>
+          </a:ln>
+        </p:spPr>
+        <p:style>
+          <a:lnRef idx="1">
+            <a:schemeClr val="dk1"/>
+          </a:lnRef>
+          <a:fillRef idx="0">
+            <a:schemeClr val="dk1"/>
+          </a:fillRef>
+          <a:effectRef idx="0">
+            <a:schemeClr val="dk1"/>
+          </a:effectRef>
+          <a:fontRef idx="minor">
+            <a:schemeClr val="tx1"/>
+          </a:fontRef>
+        </p:style>
+      </p:cxnSp>
+      <p:sp>
+        <p:nvSpPr>
+          <p:cNvPr id="7" name="TextBox 6"/>
+          <p:cNvSpPr txBox="1"/>
+          <p:nvPr/>
+        </p:nvSpPr>
+        <p:spPr>
+          <a:xfrm>
+            <a:off x="8912933" y="365125"/>
+            <a:ext cx="442750" cy="369332"/>
+          </a:xfrm>
+          <a:prstGeom prst="rect">
+            <a:avLst/>
+          </a:prstGeom>
+          <a:noFill/>
+        </p:spPr>
+        <p:txBody>
+          <a:bodyPr wrap="none" rtlCol="0">
+            <a:spAutoFit/>
+          </a:bodyPr>
+          <a:lstStyle/>
+          <a:p>
+            <a:r>
+              <a:rPr lang="en-US" dirty="0" smtClean="0"/>
+              <a:t>OS</a:t>
+            </a:r>
+            <a:endParaRPr lang="en-US" dirty="0"/>
+          </a:p>
+        </p:txBody>
+      </p:sp>
+      <p:sp>
+        <p:nvSpPr>
+          <p:cNvPr id="8" name="TextBox 7"/>
+          <p:cNvSpPr txBox="1"/>
+          <p:nvPr/>
+        </p:nvSpPr>
+        <p:spPr>
+          <a:xfrm>
+            <a:off x="8677292" y="967149"/>
+            <a:ext cx="914033" cy="461665"/>
+          </a:xfrm>
+          <a:prstGeom prst="rect">
+            <a:avLst/>
+          </a:prstGeom>
+          <a:noFill/>
+        </p:spPr>
+        <p:txBody>
+          <a:bodyPr wrap="none" rtlCol="0">
+            <a:spAutoFit/>
+          </a:bodyPr>
+          <a:lstStyle/>
+          <a:p>
+            <a:r>
+              <a:rPr lang="en-US" sz="2400" dirty="0" smtClean="0"/>
+              <a:t>100M</a:t>
+            </a:r>
+            <a:endParaRPr lang="en-US" sz="2400" dirty="0"/>
           </a:p>
         </p:txBody>
       </p:sp>
     </p:spTree>
     <p:extLst>
       <p:ext uri="{BB962C8B-B14F-4D97-AF65-F5344CB8AC3E}">
-        <p14:creationId xmlns:p14="http://schemas.microsoft.com/office/powerpoint/2010/main" val="728222810"/>
+        <p14:creationId xmlns:p14="http://schemas.microsoft.com/office/powerpoint/2010/main" val="176284513"/>
       </p:ext>
     </p:extLst>
   </p:cSld>
@@ -5751,7 +6961,7 @@
       </p:grpSpPr>
       <p:sp>
         <p:nvSpPr>
-          <p:cNvPr id="4" name="Title 3"/>
+          <p:cNvPr id="2" name="Title 1"/>
           <p:cNvSpPr>
             <a:spLocks noGrp="1"/>
           </p:cNvSpPr>
@@ -5765,19 +6975,16 @@
           <a:lstStyle/>
           <a:p>
             <a:r>
-              <a:rPr lang="en-US" dirty="0" err="1"/>
-              <a:t>Git</a:t>
-            </a:r>
-            <a:r>
-              <a:rPr lang="en-US" dirty="0"/>
-              <a:t> Repository Modules</a:t>
-            </a:r>
-          </a:p>
-        </p:txBody>
-      </p:sp>
-      <p:sp>
-        <p:nvSpPr>
-          <p:cNvPr id="5" name="Content Placeholder 4"/>
+              <a:rPr lang="en-US" dirty="0" smtClean="0"/>
+              <a:t>Reading Pages</a:t>
+            </a:r>
+            <a:endParaRPr lang="en-US" dirty="0"/>
+          </a:p>
+        </p:txBody>
+      </p:sp>
+      <p:sp>
+        <p:nvSpPr>
+          <p:cNvPr id="3" name="Content Placeholder 2"/>
           <p:cNvSpPr>
             <a:spLocks noGrp="1"/>
           </p:cNvSpPr>
@@ -5787,8 +6994,195 @@
         </p:nvSpPr>
         <p:spPr>
           <a:xfrm>
-            <a:off x="296561" y="1825625"/>
-            <a:ext cx="11532973" cy="4972740"/>
+            <a:off x="312949" y="1825625"/>
+            <a:ext cx="11603589" cy="4785438"/>
+          </a:xfrm>
+        </p:spPr>
+        <p:txBody>
+          <a:bodyPr>
+            <a:normAutofit fontScale="92500" lnSpcReduction="10000"/>
+          </a:bodyPr>
+          <a:lstStyle/>
+          <a:p>
+            <a:r>
+              <a:rPr lang="en-US" dirty="0" smtClean="0"/>
+              <a:t>First page is fast: only 20 rows in RAM, which are fast to sort</a:t>
+            </a:r>
+          </a:p>
+          <a:p>
+            <a:r>
+              <a:rPr lang="en-US" dirty="0"/>
+              <a:t>N</a:t>
+            </a:r>
+            <a:r>
+              <a:rPr lang="en-US" i="1" dirty="0" smtClean="0"/>
+              <a:t>th</a:t>
+            </a:r>
+            <a:r>
+              <a:rPr lang="en-US" dirty="0" smtClean="0"/>
+              <a:t> page requires a buffer of </a:t>
+            </a:r>
+            <a:r>
+              <a:rPr lang="en-US" i="1" dirty="0" smtClean="0"/>
+              <a:t>20*N</a:t>
+            </a:r>
+            <a:r>
+              <a:rPr lang="en-US" dirty="0" smtClean="0"/>
+              <a:t>, which needs to be sorted to determine the first </a:t>
+            </a:r>
+            <a:r>
+              <a:rPr lang="en-US" i="1" dirty="0"/>
+              <a:t>N</a:t>
+            </a:r>
+            <a:r>
+              <a:rPr lang="en-US" i="1" dirty="0" smtClean="0"/>
+              <a:t>-1</a:t>
+            </a:r>
+            <a:r>
+              <a:rPr lang="en-US" dirty="0" smtClean="0"/>
+              <a:t> pages to skip</a:t>
+            </a:r>
+          </a:p>
+          <a:p>
+            <a:pPr lvl="1"/>
+            <a:r>
+              <a:rPr lang="en-US" dirty="0" smtClean="0"/>
+              <a:t>recall that sorting has complexity </a:t>
+            </a:r>
+            <a:r>
+              <a:rPr lang="en-US" i="1" dirty="0" smtClean="0"/>
+              <a:t>O(n log n)</a:t>
+            </a:r>
+          </a:p>
+          <a:p>
+            <a:r>
+              <a:rPr lang="en-US" dirty="0" smtClean="0"/>
+              <a:t>Last page? Database (</a:t>
+            </a:r>
+            <a:r>
+              <a:rPr lang="en-US" dirty="0" err="1" smtClean="0"/>
+              <a:t>eg</a:t>
+            </a:r>
+            <a:r>
+              <a:rPr lang="en-US" dirty="0" smtClean="0"/>
+              <a:t> </a:t>
+            </a:r>
+            <a:r>
+              <a:rPr lang="en-US" dirty="0" err="1" smtClean="0"/>
+              <a:t>Postgres</a:t>
+            </a:r>
+            <a:r>
+              <a:rPr lang="en-US" dirty="0" smtClean="0"/>
+              <a:t>) has to keep in RAM 100m rows, and sort them, to decide which are the first </a:t>
+            </a:r>
+            <a:r>
+              <a:rPr lang="en-US" i="1" dirty="0" smtClean="0"/>
+              <a:t>n-1</a:t>
+            </a:r>
+            <a:r>
+              <a:rPr lang="en-US" dirty="0" smtClean="0"/>
+              <a:t> pages to skip</a:t>
+            </a:r>
+          </a:p>
+          <a:p>
+            <a:pPr lvl="1"/>
+            <a:r>
+              <a:rPr lang="en-US" dirty="0" smtClean="0"/>
+              <a:t>if reading first page could take just a few </a:t>
+            </a:r>
+            <a:r>
+              <a:rPr lang="en-US" i="1" dirty="0" smtClean="0"/>
+              <a:t>milliseconds</a:t>
+            </a:r>
+            <a:r>
+              <a:rPr lang="en-US" dirty="0" smtClean="0"/>
+              <a:t>, reading last page could take </a:t>
+            </a:r>
+            <a:r>
+              <a:rPr lang="en-US" i="1" dirty="0" smtClean="0"/>
+              <a:t>minutes</a:t>
+            </a:r>
+            <a:r>
+              <a:rPr lang="en-US" dirty="0" smtClean="0"/>
+              <a:t>…</a:t>
+            </a:r>
+          </a:p>
+          <a:p>
+            <a:r>
+              <a:rPr lang="en-US" b="1" dirty="0" smtClean="0"/>
+              <a:t>The higher the page number, the slower it will be</a:t>
+            </a:r>
+            <a:endParaRPr lang="en-US" b="1" dirty="0"/>
+          </a:p>
+        </p:txBody>
+      </p:sp>
+    </p:spTree>
+    <p:extLst>
+      <p:ext uri="{BB962C8B-B14F-4D97-AF65-F5344CB8AC3E}">
+        <p14:creationId xmlns:p14="http://schemas.microsoft.com/office/powerpoint/2010/main" val="1543020696"/>
+      </p:ext>
+    </p:extLst>
+  </p:cSld>
+  <p:clrMapOvr>
+    <a:masterClrMapping/>
+  </p:clrMapOvr>
+</p:sld>
+</file>
+
+<file path=ppt/slides/slide25.xml><?xml version="1.0" encoding="utf-8"?>
+<p:sld xmlns:a="http://schemas.openxmlformats.org/drawingml/2006/main" xmlns:r="http://schemas.openxmlformats.org/officeDocument/2006/relationships" xmlns:p="http://schemas.openxmlformats.org/presentationml/2006/main">
+  <p:cSld>
+    <p:spTree>
+      <p:nvGrpSpPr>
+        <p:cNvPr id="1" name=""/>
+        <p:cNvGrpSpPr/>
+        <p:nvPr/>
+      </p:nvGrpSpPr>
+      <p:grpSpPr>
+        <a:xfrm>
+          <a:off x="0" y="0"/>
+          <a:ext cx="0" cy="0"/>
+          <a:chOff x="0" y="0"/>
+          <a:chExt cx="0" cy="0"/>
+        </a:xfrm>
+      </p:grpSpPr>
+      <p:sp>
+        <p:nvSpPr>
+          <p:cNvPr id="2" name="Title 1"/>
+          <p:cNvSpPr>
+            <a:spLocks noGrp="1"/>
+          </p:cNvSpPr>
+          <p:nvPr>
+            <p:ph type="title"/>
+          </p:nvPr>
+        </p:nvSpPr>
+        <p:spPr/>
+        <p:txBody>
+          <a:bodyPr/>
+          <a:lstStyle/>
+          <a:p>
+            <a:r>
+              <a:rPr lang="en-US" dirty="0" smtClean="0"/>
+              <a:t>Ex. Reading Page 3</a:t>
+            </a:r>
+            <a:endParaRPr lang="en-US" dirty="0"/>
+          </a:p>
+        </p:txBody>
+      </p:sp>
+      <p:sp>
+        <p:nvSpPr>
+          <p:cNvPr id="3" name="Content Placeholder 2"/>
+          <p:cNvSpPr>
+            <a:spLocks noGrp="1"/>
+          </p:cNvSpPr>
+          <p:nvPr>
+            <p:ph idx="1"/>
+          </p:nvPr>
+        </p:nvSpPr>
+        <p:spPr>
+          <a:xfrm>
+            <a:off x="264051" y="1825624"/>
+            <a:ext cx="5403273" cy="4888125"/>
           </a:xfrm>
         </p:spPr>
         <p:txBody>
@@ -5798,76 +7192,1261 @@
           <a:lstStyle/>
           <a:p>
             <a:r>
-              <a:rPr lang="en-US" i="1" dirty="0"/>
-              <a:t>NOTE: most of the explanations will be directly in the code as comments, and not here in the slides</a:t>
-            </a:r>
-            <a:endParaRPr lang="en-US" b="1" dirty="0"/>
-          </a:p>
-          <a:p>
-            <a:r>
-              <a:rPr lang="en-US" b="1" dirty="0"/>
-              <a:t>advanced/rest/wrapper</a:t>
-            </a:r>
-          </a:p>
-          <a:p>
-            <a:r>
-              <a:rPr lang="en-US" b="1" dirty="0"/>
-              <a:t>advanced/rest/rest-</a:t>
-            </a:r>
-            <a:r>
-              <a:rPr lang="en-US" b="1" dirty="0" err="1"/>
-              <a:t>dto</a:t>
-            </a:r>
-            <a:endParaRPr lang="en-US" b="1" dirty="0"/>
-          </a:p>
-          <a:p>
-            <a:r>
-              <a:rPr lang="en-US" b="1" dirty="0" smtClean="0"/>
-              <a:t>advanced/rest/exception-handling</a:t>
-            </a:r>
-            <a:endParaRPr lang="en-US" b="1" dirty="0"/>
-          </a:p>
-          <a:p>
-            <a:r>
-              <a:rPr lang="en-US" b="1" dirty="0" smtClean="0"/>
-              <a:t>advanced/rest/rest-exception</a:t>
-            </a:r>
-          </a:p>
-          <a:p>
-            <a:r>
-              <a:rPr lang="en-US" b="1" dirty="0" smtClean="0"/>
-              <a:t>advanced/rest/pagination</a:t>
-            </a:r>
-          </a:p>
-          <a:p>
-            <a:r>
-              <a:rPr lang="en-US" b="1" dirty="0" smtClean="0"/>
-              <a:t>advanced/rest/gui-v2</a:t>
-            </a:r>
-            <a:endParaRPr lang="en-US" b="1" dirty="0"/>
-          </a:p>
-          <a:p>
-            <a:r>
-              <a:rPr lang="en-US" dirty="0"/>
-              <a:t>Study relevant sections in </a:t>
-            </a:r>
-            <a:r>
-              <a:rPr lang="en-US" i="1" dirty="0"/>
-              <a:t>RESTful Service Best Practices</a:t>
-            </a:r>
-          </a:p>
-          <a:p>
-            <a:r>
-              <a:rPr lang="en-US" dirty="0"/>
-              <a:t>Study relevant sections in RFC-7230 and RFC-7231 </a:t>
-            </a:r>
+              <a:rPr lang="en-US" dirty="0" smtClean="0"/>
+              <a:t>OFFSET=40, LIMIT=20</a:t>
+            </a:r>
+          </a:p>
+          <a:p>
+            <a:r>
+              <a:rPr lang="en-US" dirty="0" smtClean="0"/>
+              <a:t>Only need a buffer </a:t>
+            </a:r>
+            <a:r>
+              <a:rPr lang="en-US" i="1" dirty="0" smtClean="0"/>
+              <a:t>B</a:t>
+            </a:r>
+            <a:r>
+              <a:rPr lang="en-US" dirty="0" smtClean="0"/>
+              <a:t> of size 60, and sort 60 elements</a:t>
+            </a:r>
+          </a:p>
+          <a:p>
+            <a:r>
+              <a:rPr lang="en-US" dirty="0" smtClean="0"/>
+              <a:t>If in current </a:t>
+            </a:r>
+            <a:r>
+              <a:rPr lang="en-US" i="1" dirty="0" smtClean="0"/>
+              <a:t>B</a:t>
+            </a:r>
+            <a:r>
+              <a:rPr lang="en-US" dirty="0" smtClean="0"/>
+              <a:t> the lowest id is X, then ignore all elements read from storage with id lower than X, as anyway impossible it will be part of the top 60</a:t>
+            </a:r>
+          </a:p>
+          <a:p>
+            <a:r>
+              <a:rPr lang="en-US" dirty="0" smtClean="0"/>
+              <a:t>Even if returning top 40-59, still need to determine which are the top 0-39 </a:t>
+            </a:r>
+            <a:r>
+              <a:rPr lang="en-US" dirty="0" smtClean="0">
+                <a:sym typeface="Wingdings" panose="05000000000000000000" pitchFamily="2" charset="2"/>
+              </a:rPr>
+              <a:t></a:t>
+            </a:r>
+            <a:endParaRPr lang="en-US" dirty="0"/>
+          </a:p>
+        </p:txBody>
+      </p:sp>
+      <p:sp>
+        <p:nvSpPr>
+          <p:cNvPr id="4" name="Rounded Rectangle 3"/>
+          <p:cNvSpPr/>
+          <p:nvPr/>
+        </p:nvSpPr>
+        <p:spPr>
+          <a:xfrm>
+            <a:off x="5791571" y="2203705"/>
+            <a:ext cx="2030266" cy="914400"/>
+          </a:xfrm>
+          <a:prstGeom prst="roundRect">
+            <a:avLst/>
+          </a:prstGeom>
+        </p:spPr>
+        <p:style>
+          <a:lnRef idx="2">
+            <a:schemeClr val="accent4">
+              <a:shade val="50000"/>
+            </a:schemeClr>
+          </a:lnRef>
+          <a:fillRef idx="1">
+            <a:schemeClr val="accent4"/>
+          </a:fillRef>
+          <a:effectRef idx="0">
+            <a:schemeClr val="accent4"/>
+          </a:effectRef>
+          <a:fontRef idx="minor">
+            <a:schemeClr val="lt1"/>
+          </a:fontRef>
+        </p:style>
+        <p:txBody>
+          <a:bodyPr rtlCol="0" anchor="ctr"/>
+          <a:lstStyle/>
+          <a:p>
+            <a:pPr algn="ctr"/>
+            <a:r>
+              <a:rPr lang="en-US" dirty="0" smtClean="0"/>
+              <a:t>Database Process</a:t>
+            </a:r>
+          </a:p>
+          <a:p>
+            <a:pPr algn="ctr"/>
+            <a:r>
+              <a:rPr lang="en-US" dirty="0" smtClean="0"/>
+              <a:t>(</a:t>
+            </a:r>
+            <a:r>
+              <a:rPr lang="en-US" dirty="0" err="1" smtClean="0"/>
+              <a:t>eg</a:t>
+            </a:r>
+            <a:r>
+              <a:rPr lang="en-US" dirty="0" smtClean="0"/>
+              <a:t> </a:t>
+            </a:r>
+            <a:r>
+              <a:rPr lang="en-US" dirty="0" err="1" smtClean="0"/>
+              <a:t>Postgress</a:t>
+            </a:r>
+            <a:r>
+              <a:rPr lang="en-US" dirty="0" smtClean="0"/>
+              <a:t>)</a:t>
+            </a:r>
+            <a:endParaRPr lang="en-US" dirty="0"/>
+          </a:p>
+        </p:txBody>
+      </p:sp>
+      <p:sp>
+        <p:nvSpPr>
+          <p:cNvPr id="5" name="Rounded Rectangle 4"/>
+          <p:cNvSpPr/>
+          <p:nvPr/>
+        </p:nvSpPr>
+        <p:spPr>
+          <a:xfrm>
+            <a:off x="9093076" y="2203705"/>
+            <a:ext cx="2260724" cy="914400"/>
+          </a:xfrm>
+          <a:prstGeom prst="roundRect">
+            <a:avLst/>
+          </a:prstGeom>
+        </p:spPr>
+        <p:style>
+          <a:lnRef idx="2">
+            <a:schemeClr val="accent6">
+              <a:shade val="50000"/>
+            </a:schemeClr>
+          </a:lnRef>
+          <a:fillRef idx="1">
+            <a:schemeClr val="accent6"/>
+          </a:fillRef>
+          <a:effectRef idx="0">
+            <a:schemeClr val="accent6"/>
+          </a:effectRef>
+          <a:fontRef idx="minor">
+            <a:schemeClr val="lt1"/>
+          </a:fontRef>
+        </p:style>
+        <p:txBody>
+          <a:bodyPr rtlCol="0" anchor="ctr"/>
+          <a:lstStyle/>
+          <a:p>
+            <a:pPr algn="ctr"/>
+            <a:r>
+              <a:rPr lang="en-US" dirty="0" smtClean="0"/>
+              <a:t>Permanent Storage</a:t>
+            </a:r>
+          </a:p>
+          <a:p>
+            <a:pPr algn="ctr"/>
+            <a:r>
+              <a:rPr lang="en-US" dirty="0" smtClean="0"/>
+              <a:t>(</a:t>
+            </a:r>
+            <a:r>
+              <a:rPr lang="en-US" dirty="0" err="1" smtClean="0"/>
+              <a:t>eg</a:t>
+            </a:r>
+            <a:r>
+              <a:rPr lang="en-US" dirty="0" smtClean="0"/>
+              <a:t>, hard-drive)</a:t>
+            </a:r>
+            <a:endParaRPr lang="en-US" dirty="0"/>
+          </a:p>
+        </p:txBody>
+      </p:sp>
+      <p:cxnSp>
+        <p:nvCxnSpPr>
+          <p:cNvPr id="6" name="Straight Arrow Connector 5"/>
+          <p:cNvCxnSpPr>
+            <a:stCxn id="4" idx="3"/>
+            <a:endCxn id="5" idx="1"/>
+          </p:cNvCxnSpPr>
+          <p:nvPr/>
+        </p:nvCxnSpPr>
+        <p:spPr>
+          <a:xfrm>
+            <a:off x="7821837" y="2660905"/>
+            <a:ext cx="1271239" cy="0"/>
+          </a:xfrm>
+          <a:prstGeom prst="straightConnector1">
+            <a:avLst/>
+          </a:prstGeom>
+          <a:ln w="44450">
+            <a:headEnd type="triangle"/>
+            <a:tailEnd type="triangle"/>
+          </a:ln>
+        </p:spPr>
+        <p:style>
+          <a:lnRef idx="1">
+            <a:schemeClr val="dk1"/>
+          </a:lnRef>
+          <a:fillRef idx="0">
+            <a:schemeClr val="dk1"/>
+          </a:fillRef>
+          <a:effectRef idx="0">
+            <a:schemeClr val="dk1"/>
+          </a:effectRef>
+          <a:fontRef idx="minor">
+            <a:schemeClr val="tx1"/>
+          </a:fontRef>
+        </p:style>
+      </p:cxnSp>
+      <p:sp>
+        <p:nvSpPr>
+          <p:cNvPr id="7" name="TextBox 6"/>
+          <p:cNvSpPr txBox="1"/>
+          <p:nvPr/>
+        </p:nvSpPr>
+        <p:spPr>
+          <a:xfrm>
+            <a:off x="8236081" y="2203705"/>
+            <a:ext cx="442750" cy="369332"/>
+          </a:xfrm>
+          <a:prstGeom prst="rect">
+            <a:avLst/>
+          </a:prstGeom>
+          <a:noFill/>
+        </p:spPr>
+        <p:txBody>
+          <a:bodyPr wrap="none" rtlCol="0">
+            <a:spAutoFit/>
+          </a:bodyPr>
+          <a:lstStyle/>
+          <a:p>
+            <a:r>
+              <a:rPr lang="en-US" dirty="0" smtClean="0"/>
+              <a:t>OS</a:t>
+            </a:r>
+            <a:endParaRPr lang="en-US" dirty="0"/>
+          </a:p>
+        </p:txBody>
+      </p:sp>
+      <p:sp>
+        <p:nvSpPr>
+          <p:cNvPr id="8" name="TextBox 7"/>
+          <p:cNvSpPr txBox="1"/>
+          <p:nvPr/>
+        </p:nvSpPr>
+        <p:spPr>
+          <a:xfrm>
+            <a:off x="8000440" y="2805729"/>
+            <a:ext cx="914033" cy="461665"/>
+          </a:xfrm>
+          <a:prstGeom prst="rect">
+            <a:avLst/>
+          </a:prstGeom>
+          <a:noFill/>
+        </p:spPr>
+        <p:txBody>
+          <a:bodyPr wrap="none" rtlCol="0">
+            <a:spAutoFit/>
+          </a:bodyPr>
+          <a:lstStyle/>
+          <a:p>
+            <a:r>
+              <a:rPr lang="en-US" sz="2400" dirty="0" smtClean="0"/>
+              <a:t>100M</a:t>
+            </a:r>
+            <a:endParaRPr lang="en-US" sz="2400" dirty="0"/>
+          </a:p>
+        </p:txBody>
+      </p:sp>
+      <p:graphicFrame>
+        <p:nvGraphicFramePr>
+          <p:cNvPr id="9" name="Table 8"/>
+          <p:cNvGraphicFramePr>
+            <a:graphicFrameLocks noGrp="1"/>
+          </p:cNvGraphicFramePr>
+          <p:nvPr>
+            <p:extLst>
+              <p:ext uri="{D42A27DB-BD31-4B8C-83A1-F6EECF244321}">
+                <p14:modId xmlns:p14="http://schemas.microsoft.com/office/powerpoint/2010/main" val="280406814"/>
+              </p:ext>
+            </p:extLst>
+          </p:nvPr>
+        </p:nvGraphicFramePr>
+        <p:xfrm>
+          <a:off x="6214185" y="3662489"/>
+          <a:ext cx="1185037" cy="2955894"/>
+        </p:xfrm>
+        <a:graphic>
+          <a:graphicData uri="http://schemas.openxmlformats.org/drawingml/2006/table">
+            <a:tbl>
+              <a:tblPr firstRow="1" bandRow="1">
+                <a:tableStyleId>{5C22544A-7EE6-4342-B048-85BDC9FD1C3A}</a:tableStyleId>
+              </a:tblPr>
+              <a:tblGrid>
+                <a:gridCol w="1185037">
+                  <a:extLst>
+                    <a:ext uri="{9D8B030D-6E8A-4147-A177-3AD203B41FA5}">
+                      <a16:colId xmlns:a16="http://schemas.microsoft.com/office/drawing/2014/main" val="1548635407"/>
+                    </a:ext>
+                  </a:extLst>
+                </a:gridCol>
+              </a:tblGrid>
+              <a:tr h="1995138">
+                <a:tc>
+                  <a:txBody>
+                    <a:bodyPr/>
+                    <a:lstStyle/>
+                    <a:p>
+                      <a:r>
+                        <a:rPr lang="en-US" dirty="0" smtClean="0"/>
+                        <a:t>Top 0-39 elements</a:t>
+                      </a:r>
+                    </a:p>
+                    <a:p>
+                      <a:r>
+                        <a:rPr lang="en-US" dirty="0" smtClean="0"/>
+                        <a:t>(</a:t>
+                      </a:r>
+                      <a:r>
+                        <a:rPr lang="en-US" dirty="0" err="1" smtClean="0"/>
+                        <a:t>ie</a:t>
+                      </a:r>
+                      <a:r>
+                        <a:rPr lang="en-US" dirty="0" smtClean="0"/>
+                        <a:t> page 1 and 2)</a:t>
+                      </a:r>
+                      <a:endParaRPr lang="en-US" dirty="0"/>
+                    </a:p>
+                  </a:txBody>
+                  <a:tcPr/>
+                </a:tc>
+                <a:extLst>
+                  <a:ext uri="{0D108BD9-81ED-4DB2-BD59-A6C34878D82A}">
+                    <a16:rowId xmlns:a16="http://schemas.microsoft.com/office/drawing/2014/main" val="1943435961"/>
+                  </a:ext>
+                </a:extLst>
+              </a:tr>
+              <a:tr h="960756">
+                <a:tc>
+                  <a:txBody>
+                    <a:bodyPr/>
+                    <a:lstStyle/>
+                    <a:p>
+                      <a:r>
+                        <a:rPr lang="en-US" dirty="0" smtClean="0"/>
+                        <a:t>Top 40-59 elements</a:t>
+                      </a:r>
+                    </a:p>
+                    <a:p>
+                      <a:r>
+                        <a:rPr lang="en-US" dirty="0" smtClean="0"/>
+                        <a:t>(</a:t>
+                      </a:r>
+                      <a:r>
+                        <a:rPr lang="en-US" dirty="0" err="1" smtClean="0"/>
+                        <a:t>ie</a:t>
+                      </a:r>
+                      <a:r>
+                        <a:rPr lang="en-US" dirty="0" smtClean="0"/>
+                        <a:t> page 3)</a:t>
+                      </a:r>
+                      <a:endParaRPr lang="en-US" dirty="0"/>
+                    </a:p>
+                  </a:txBody>
+                  <a:tcPr/>
+                </a:tc>
+                <a:extLst>
+                  <a:ext uri="{0D108BD9-81ED-4DB2-BD59-A6C34878D82A}">
+                    <a16:rowId xmlns:a16="http://schemas.microsoft.com/office/drawing/2014/main" val="1594789053"/>
+                  </a:ext>
+                </a:extLst>
+              </a:tr>
+            </a:tbl>
+          </a:graphicData>
+        </a:graphic>
+      </p:graphicFrame>
+      <p:cxnSp>
+        <p:nvCxnSpPr>
+          <p:cNvPr id="10" name="Straight Arrow Connector 9"/>
+          <p:cNvCxnSpPr>
+            <a:stCxn id="9" idx="0"/>
+            <a:endCxn id="4" idx="2"/>
+          </p:cNvCxnSpPr>
+          <p:nvPr/>
+        </p:nvCxnSpPr>
+        <p:spPr>
+          <a:xfrm flipV="1">
+            <a:off x="6806703" y="3118105"/>
+            <a:ext cx="1" cy="544384"/>
+          </a:xfrm>
+          <a:prstGeom prst="straightConnector1">
+            <a:avLst/>
+          </a:prstGeom>
+          <a:ln w="44450">
+            <a:headEnd type="none"/>
+            <a:tailEnd type="triangle"/>
+          </a:ln>
+        </p:spPr>
+        <p:style>
+          <a:lnRef idx="1">
+            <a:schemeClr val="dk1"/>
+          </a:lnRef>
+          <a:fillRef idx="0">
+            <a:schemeClr val="dk1"/>
+          </a:fillRef>
+          <a:effectRef idx="0">
+            <a:schemeClr val="dk1"/>
+          </a:effectRef>
+          <a:fontRef idx="minor">
+            <a:schemeClr val="tx1"/>
+          </a:fontRef>
+        </p:style>
+      </p:cxnSp>
+      <p:sp>
+        <p:nvSpPr>
+          <p:cNvPr id="19" name="TextBox 18"/>
+          <p:cNvSpPr txBox="1"/>
+          <p:nvPr/>
+        </p:nvSpPr>
+        <p:spPr>
+          <a:xfrm>
+            <a:off x="7454522" y="5011288"/>
+            <a:ext cx="639919" cy="369332"/>
+          </a:xfrm>
+          <a:prstGeom prst="rect">
+            <a:avLst/>
+          </a:prstGeom>
+          <a:noFill/>
+        </p:spPr>
+        <p:txBody>
+          <a:bodyPr wrap="none" rtlCol="0">
+            <a:spAutoFit/>
+          </a:bodyPr>
+          <a:lstStyle/>
+          <a:p>
+            <a:r>
+              <a:rPr lang="en-US" dirty="0" smtClean="0"/>
+              <a:t>RAM</a:t>
+            </a:r>
+            <a:endParaRPr lang="en-US" dirty="0"/>
           </a:p>
         </p:txBody>
       </p:sp>
     </p:spTree>
     <p:extLst>
       <p:ext uri="{BB962C8B-B14F-4D97-AF65-F5344CB8AC3E}">
-        <p14:creationId xmlns:p14="http://schemas.microsoft.com/office/powerpoint/2010/main" val="1023732187"/>
+        <p14:creationId xmlns:p14="http://schemas.microsoft.com/office/powerpoint/2010/main" val="2517817637"/>
+      </p:ext>
+    </p:extLst>
+  </p:cSld>
+  <p:clrMapOvr>
+    <a:masterClrMapping/>
+  </p:clrMapOvr>
+</p:sld>
+</file>
+
+<file path=ppt/slides/slide26.xml><?xml version="1.0" encoding="utf-8"?>
+<p:sld xmlns:a="http://schemas.openxmlformats.org/drawingml/2006/main" xmlns:r="http://schemas.openxmlformats.org/officeDocument/2006/relationships" xmlns:p="http://schemas.openxmlformats.org/presentationml/2006/main">
+  <p:cSld>
+    <p:spTree>
+      <p:nvGrpSpPr>
+        <p:cNvPr id="1" name=""/>
+        <p:cNvGrpSpPr/>
+        <p:nvPr/>
+      </p:nvGrpSpPr>
+      <p:grpSpPr>
+        <a:xfrm>
+          <a:off x="0" y="0"/>
+          <a:ext cx="0" cy="0"/>
+          <a:chOff x="0" y="0"/>
+          <a:chExt cx="0" cy="0"/>
+        </a:xfrm>
+      </p:grpSpPr>
+      <p:sp>
+        <p:nvSpPr>
+          <p:cNvPr id="2" name="Title 1"/>
+          <p:cNvSpPr>
+            <a:spLocks noGrp="1"/>
+          </p:cNvSpPr>
+          <p:nvPr>
+            <p:ph type="title"/>
+          </p:nvPr>
+        </p:nvSpPr>
+        <p:spPr/>
+        <p:txBody>
+          <a:bodyPr/>
+          <a:lstStyle/>
+          <a:p>
+            <a:r>
+              <a:rPr lang="en-US" dirty="0"/>
+              <a:t>Links</a:t>
+            </a:r>
+          </a:p>
+        </p:txBody>
+      </p:sp>
+      <p:sp>
+        <p:nvSpPr>
+          <p:cNvPr id="3" name="Content Placeholder 2"/>
+          <p:cNvSpPr>
+            <a:spLocks noGrp="1"/>
+          </p:cNvSpPr>
+          <p:nvPr>
+            <p:ph idx="1"/>
+          </p:nvPr>
+        </p:nvSpPr>
+        <p:spPr>
+          <a:xfrm>
+            <a:off x="444843" y="1825625"/>
+            <a:ext cx="11500022" cy="4822310"/>
+          </a:xfrm>
+        </p:spPr>
+        <p:txBody>
+          <a:bodyPr>
+            <a:normAutofit lnSpcReduction="10000"/>
+          </a:bodyPr>
+          <a:lstStyle/>
+          <a:p>
+            <a:r>
+              <a:rPr lang="en-US" dirty="0" smtClean="0"/>
+              <a:t>Database data will be converted into JSON, to send over HTTP to the client</a:t>
+            </a:r>
+          </a:p>
+          <a:p>
+            <a:r>
+              <a:rPr lang="en-US" dirty="0" smtClean="0"/>
+              <a:t>To </a:t>
+            </a:r>
+            <a:r>
+              <a:rPr lang="en-US" dirty="0"/>
+              <a:t>access the next/previous pages, </a:t>
+            </a:r>
+            <a:r>
+              <a:rPr lang="en-US" dirty="0" smtClean="0"/>
+              <a:t>client could </a:t>
+            </a:r>
+            <a:r>
+              <a:rPr lang="en-US" dirty="0"/>
+              <a:t>compute the needed offsets/limits</a:t>
+            </a:r>
+          </a:p>
+          <a:p>
+            <a:r>
+              <a:rPr lang="en-US" dirty="0"/>
+              <a:t>Or, we could just provide valid URLs in the JSON responses with “</a:t>
+            </a:r>
+            <a:r>
+              <a:rPr lang="en-US" i="1" dirty="0"/>
+              <a:t>links</a:t>
+            </a:r>
+            <a:r>
+              <a:rPr lang="en-US" dirty="0"/>
+              <a:t>” to those pages</a:t>
+            </a:r>
+          </a:p>
+          <a:p>
+            <a:r>
+              <a:rPr lang="en-US" dirty="0"/>
+              <a:t>This is an instance of HATEOAS</a:t>
+            </a:r>
+          </a:p>
+          <a:p>
+            <a:pPr lvl="1"/>
+            <a:r>
+              <a:rPr lang="en-US" i="1" dirty="0"/>
+              <a:t>Hypermedia as the Engine of Application State</a:t>
+            </a:r>
+          </a:p>
+          <a:p>
+            <a:r>
+              <a:rPr lang="en-US" dirty="0"/>
+              <a:t>Easier to navigate</a:t>
+            </a:r>
+          </a:p>
+        </p:txBody>
+      </p:sp>
+      <p:sp>
+        <p:nvSpPr>
+          <p:cNvPr id="4" name="Rounded Rectangle 3"/>
+          <p:cNvSpPr/>
+          <p:nvPr/>
+        </p:nvSpPr>
+        <p:spPr>
+          <a:xfrm>
+            <a:off x="7120331" y="429608"/>
+            <a:ext cx="1628450" cy="914400"/>
+          </a:xfrm>
+          <a:prstGeom prst="roundRect">
+            <a:avLst/>
+          </a:prstGeom>
+        </p:spPr>
+        <p:style>
+          <a:lnRef idx="2">
+            <a:schemeClr val="accent1">
+              <a:shade val="50000"/>
+            </a:schemeClr>
+          </a:lnRef>
+          <a:fillRef idx="1">
+            <a:schemeClr val="accent1"/>
+          </a:fillRef>
+          <a:effectRef idx="0">
+            <a:schemeClr val="accent1"/>
+          </a:effectRef>
+          <a:fontRef idx="minor">
+            <a:schemeClr val="lt1"/>
+          </a:fontRef>
+        </p:style>
+        <p:txBody>
+          <a:bodyPr rtlCol="0" anchor="ctr"/>
+          <a:lstStyle/>
+          <a:p>
+            <a:pPr algn="ctr"/>
+            <a:r>
+              <a:rPr lang="en-US" dirty="0" smtClean="0"/>
+              <a:t>Client</a:t>
+            </a:r>
+          </a:p>
+          <a:p>
+            <a:pPr algn="ctr"/>
+            <a:r>
+              <a:rPr lang="en-US" dirty="0" smtClean="0"/>
+              <a:t>(</a:t>
+            </a:r>
+            <a:r>
+              <a:rPr lang="en-US" dirty="0" err="1" smtClean="0"/>
+              <a:t>eg</a:t>
+            </a:r>
+            <a:r>
+              <a:rPr lang="en-US" dirty="0" smtClean="0"/>
+              <a:t>, browser)</a:t>
+            </a:r>
+            <a:endParaRPr lang="en-US" dirty="0"/>
+          </a:p>
+        </p:txBody>
+      </p:sp>
+      <p:sp>
+        <p:nvSpPr>
+          <p:cNvPr id="5" name="Rounded Rectangle 4"/>
+          <p:cNvSpPr/>
+          <p:nvPr/>
+        </p:nvSpPr>
+        <p:spPr>
+          <a:xfrm>
+            <a:off x="10020020" y="429608"/>
+            <a:ext cx="1793116" cy="914400"/>
+          </a:xfrm>
+          <a:prstGeom prst="roundRect">
+            <a:avLst/>
+          </a:prstGeom>
+        </p:spPr>
+        <p:style>
+          <a:lnRef idx="2">
+            <a:schemeClr val="accent4">
+              <a:shade val="50000"/>
+            </a:schemeClr>
+          </a:lnRef>
+          <a:fillRef idx="1">
+            <a:schemeClr val="accent4"/>
+          </a:fillRef>
+          <a:effectRef idx="0">
+            <a:schemeClr val="accent4"/>
+          </a:effectRef>
+          <a:fontRef idx="minor">
+            <a:schemeClr val="lt1"/>
+          </a:fontRef>
+        </p:style>
+        <p:txBody>
+          <a:bodyPr rtlCol="0" anchor="ctr"/>
+          <a:lstStyle/>
+          <a:p>
+            <a:pPr algn="ctr"/>
+            <a:r>
+              <a:rPr lang="en-US" dirty="0" smtClean="0"/>
+              <a:t>Your Application</a:t>
+            </a:r>
+          </a:p>
+          <a:p>
+            <a:pPr algn="ctr"/>
+            <a:r>
+              <a:rPr lang="en-US" dirty="0" smtClean="0"/>
+              <a:t>(</a:t>
+            </a:r>
+            <a:r>
+              <a:rPr lang="en-US" dirty="0" err="1" smtClean="0"/>
+              <a:t>eg</a:t>
+            </a:r>
+            <a:r>
+              <a:rPr lang="en-US" dirty="0" smtClean="0"/>
+              <a:t>, </a:t>
+            </a:r>
+            <a:r>
+              <a:rPr lang="en-US" dirty="0" err="1" smtClean="0"/>
+              <a:t>SpringBoot</a:t>
+            </a:r>
+            <a:r>
+              <a:rPr lang="en-US" dirty="0" smtClean="0"/>
+              <a:t>)</a:t>
+            </a:r>
+            <a:endParaRPr lang="en-US" dirty="0"/>
+          </a:p>
+        </p:txBody>
+      </p:sp>
+      <p:cxnSp>
+        <p:nvCxnSpPr>
+          <p:cNvPr id="6" name="Straight Arrow Connector 5"/>
+          <p:cNvCxnSpPr>
+            <a:stCxn id="4" idx="3"/>
+            <a:endCxn id="5" idx="1"/>
+          </p:cNvCxnSpPr>
+          <p:nvPr/>
+        </p:nvCxnSpPr>
+        <p:spPr>
+          <a:xfrm>
+            <a:off x="8748781" y="886808"/>
+            <a:ext cx="1271239" cy="0"/>
+          </a:xfrm>
+          <a:prstGeom prst="straightConnector1">
+            <a:avLst/>
+          </a:prstGeom>
+          <a:ln w="44450">
+            <a:headEnd type="triangle"/>
+            <a:tailEnd type="triangle"/>
+          </a:ln>
+        </p:spPr>
+        <p:style>
+          <a:lnRef idx="1">
+            <a:schemeClr val="dk1"/>
+          </a:lnRef>
+          <a:fillRef idx="0">
+            <a:schemeClr val="dk1"/>
+          </a:fillRef>
+          <a:effectRef idx="0">
+            <a:schemeClr val="dk1"/>
+          </a:effectRef>
+          <a:fontRef idx="minor">
+            <a:schemeClr val="tx1"/>
+          </a:fontRef>
+        </p:style>
+      </p:cxnSp>
+      <p:sp>
+        <p:nvSpPr>
+          <p:cNvPr id="7" name="TextBox 6"/>
+          <p:cNvSpPr txBox="1"/>
+          <p:nvPr/>
+        </p:nvSpPr>
+        <p:spPr>
+          <a:xfrm>
+            <a:off x="9046839" y="429608"/>
+            <a:ext cx="675121" cy="369332"/>
+          </a:xfrm>
+          <a:prstGeom prst="rect">
+            <a:avLst/>
+          </a:prstGeom>
+          <a:noFill/>
+        </p:spPr>
+        <p:txBody>
+          <a:bodyPr wrap="none" rtlCol="0">
+            <a:spAutoFit/>
+          </a:bodyPr>
+          <a:lstStyle/>
+          <a:p>
+            <a:r>
+              <a:rPr lang="en-US" dirty="0" smtClean="0"/>
+              <a:t>HTTP</a:t>
+            </a:r>
+            <a:endParaRPr lang="en-US" dirty="0"/>
+          </a:p>
+        </p:txBody>
+      </p:sp>
+      <p:sp>
+        <p:nvSpPr>
+          <p:cNvPr id="8" name="TextBox 7"/>
+          <p:cNvSpPr txBox="1"/>
+          <p:nvPr/>
+        </p:nvSpPr>
+        <p:spPr>
+          <a:xfrm>
+            <a:off x="9092283" y="1025307"/>
+            <a:ext cx="495649" cy="461665"/>
+          </a:xfrm>
+          <a:prstGeom prst="rect">
+            <a:avLst/>
+          </a:prstGeom>
+          <a:noFill/>
+        </p:spPr>
+        <p:txBody>
+          <a:bodyPr wrap="none" rtlCol="0">
+            <a:spAutoFit/>
+          </a:bodyPr>
+          <a:lstStyle/>
+          <a:p>
+            <a:r>
+              <a:rPr lang="en-US" sz="2400" dirty="0" smtClean="0"/>
+              <a:t>20</a:t>
+            </a:r>
+            <a:endParaRPr lang="en-US" sz="2400" dirty="0"/>
+          </a:p>
+        </p:txBody>
+      </p:sp>
+    </p:spTree>
+    <p:extLst>
+      <p:ext uri="{BB962C8B-B14F-4D97-AF65-F5344CB8AC3E}">
+        <p14:creationId xmlns:p14="http://schemas.microsoft.com/office/powerpoint/2010/main" val="767827934"/>
+      </p:ext>
+    </p:extLst>
+  </p:cSld>
+  <p:clrMapOvr>
+    <a:masterClrMapping/>
+  </p:clrMapOvr>
+</p:sld>
+</file>
+
+<file path=ppt/slides/slide27.xml><?xml version="1.0" encoding="utf-8"?>
+<p:sld xmlns:a="http://schemas.openxmlformats.org/drawingml/2006/main" xmlns:r="http://schemas.openxmlformats.org/officeDocument/2006/relationships" xmlns:p="http://schemas.openxmlformats.org/presentationml/2006/main">
+  <p:cSld>
+    <p:spTree>
+      <p:nvGrpSpPr>
+        <p:cNvPr id="1" name=""/>
+        <p:cNvGrpSpPr/>
+        <p:nvPr/>
+      </p:nvGrpSpPr>
+      <p:grpSpPr>
+        <a:xfrm>
+          <a:off x="0" y="0"/>
+          <a:ext cx="0" cy="0"/>
+          <a:chOff x="0" y="0"/>
+          <a:chExt cx="0" cy="0"/>
+        </a:xfrm>
+      </p:grpSpPr>
+      <p:sp>
+        <p:nvSpPr>
+          <p:cNvPr id="3" name="Content Placeholder 2"/>
+          <p:cNvSpPr>
+            <a:spLocks noGrp="1"/>
+          </p:cNvSpPr>
+          <p:nvPr>
+            <p:ph idx="1"/>
+          </p:nvPr>
+        </p:nvSpPr>
+        <p:spPr>
+          <a:xfrm>
+            <a:off x="148281" y="156519"/>
+            <a:ext cx="11755395" cy="6507892"/>
+          </a:xfrm>
+        </p:spPr>
+        <p:txBody>
+          <a:bodyPr>
+            <a:normAutofit/>
+          </a:bodyPr>
+          <a:lstStyle/>
+          <a:p>
+            <a:pPr marL="0" indent="0">
+              <a:buNone/>
+            </a:pPr>
+            <a:r>
+              <a:rPr lang="en-US" dirty="0" err="1"/>
+              <a:t>dto</a:t>
+            </a:r>
+            <a:r>
+              <a:rPr lang="en-US" dirty="0"/>
+              <a:t> = {  “</a:t>
+            </a:r>
+            <a:r>
+              <a:rPr lang="en-US" b="1" dirty="0"/>
+              <a:t>list</a:t>
+            </a:r>
+            <a:r>
+              <a:rPr lang="en-US" dirty="0"/>
+              <a:t>”: [ … ],    </a:t>
+            </a:r>
+            <a:r>
+              <a:rPr lang="en-US" i="1" dirty="0"/>
+              <a:t>//the actual payload</a:t>
+            </a:r>
+          </a:p>
+          <a:p>
+            <a:pPr marL="0" indent="0">
+              <a:buNone/>
+            </a:pPr>
+            <a:r>
+              <a:rPr lang="en-US" i="1" dirty="0"/>
+              <a:t>   </a:t>
+            </a:r>
+            <a:r>
+              <a:rPr lang="en-US" dirty="0"/>
+              <a:t>           “</a:t>
+            </a:r>
+            <a:r>
+              <a:rPr lang="en-US" b="1" dirty="0" err="1"/>
+              <a:t>rangeMin</a:t>
+            </a:r>
+            <a:r>
+              <a:rPr lang="en-US" dirty="0"/>
+              <a:t>”: 40,</a:t>
+            </a:r>
+          </a:p>
+          <a:p>
+            <a:pPr marL="0" indent="0">
+              <a:buNone/>
+            </a:pPr>
+            <a:r>
+              <a:rPr lang="en-US" i="1" dirty="0"/>
+              <a:t>              </a:t>
+            </a:r>
+            <a:r>
+              <a:rPr lang="en-US" dirty="0"/>
+              <a:t>“</a:t>
+            </a:r>
+            <a:r>
+              <a:rPr lang="en-US" b="1" dirty="0" err="1"/>
+              <a:t>rangeMax</a:t>
+            </a:r>
+            <a:r>
+              <a:rPr lang="en-US" dirty="0"/>
+              <a:t>”: 49,   </a:t>
+            </a:r>
+            <a:r>
+              <a:rPr lang="en-US" i="1" dirty="0"/>
+              <a:t>//so, 10 element pages</a:t>
+            </a:r>
+          </a:p>
+          <a:p>
+            <a:pPr marL="0" indent="0">
+              <a:buNone/>
+            </a:pPr>
+            <a:r>
+              <a:rPr lang="en-US" i="1" dirty="0"/>
+              <a:t>              “</a:t>
+            </a:r>
+            <a:r>
+              <a:rPr lang="en-US" b="1" i="1" dirty="0" err="1"/>
+              <a:t>totalSize</a:t>
+            </a:r>
+            <a:r>
+              <a:rPr lang="en-US" i="1" dirty="0"/>
+              <a:t>”: 66400000, </a:t>
+            </a:r>
+          </a:p>
+          <a:p>
+            <a:pPr marL="0" indent="0">
+              <a:buNone/>
+            </a:pPr>
+            <a:r>
+              <a:rPr lang="en-US" i="1" dirty="0"/>
+              <a:t>              “</a:t>
+            </a:r>
+            <a:r>
+              <a:rPr lang="en-US" b="1" i="1" dirty="0"/>
+              <a:t>_links</a:t>
+            </a:r>
+            <a:r>
+              <a:rPr lang="en-US" i="1" dirty="0"/>
+              <a:t>”:[</a:t>
+            </a:r>
+          </a:p>
+          <a:p>
+            <a:pPr marL="0" indent="0">
+              <a:buNone/>
+            </a:pPr>
+            <a:r>
+              <a:rPr lang="en-US" i="1" dirty="0"/>
+              <a:t>                   “</a:t>
+            </a:r>
+            <a:r>
+              <a:rPr lang="en-US" b="1" i="1" dirty="0"/>
+              <a:t>next</a:t>
+            </a:r>
+            <a:r>
+              <a:rPr lang="en-US" i="1" dirty="0"/>
+              <a:t>”: {“</a:t>
+            </a:r>
+            <a:r>
+              <a:rPr lang="en-US" i="1" dirty="0" err="1"/>
+              <a:t>href</a:t>
+            </a:r>
+            <a:r>
+              <a:rPr lang="en-US" i="1" dirty="0"/>
+              <a:t>”: “/</a:t>
+            </a:r>
+            <a:r>
+              <a:rPr lang="en-US" i="1" dirty="0" err="1"/>
+              <a:t>news?</a:t>
+            </a:r>
+            <a:r>
+              <a:rPr lang="en-US" b="1" i="1" dirty="0" err="1"/>
+              <a:t>offset</a:t>
+            </a:r>
+            <a:r>
+              <a:rPr lang="en-US" i="1" dirty="0"/>
+              <a:t>=50&amp;</a:t>
+            </a:r>
+            <a:r>
+              <a:rPr lang="en-US" b="1" i="1" dirty="0"/>
+              <a:t>limit</a:t>
+            </a:r>
+            <a:r>
+              <a:rPr lang="en-US" i="1" dirty="0"/>
+              <a:t>=10”},</a:t>
+            </a:r>
+          </a:p>
+          <a:p>
+            <a:pPr marL="0" indent="0">
+              <a:buNone/>
+            </a:pPr>
+            <a:r>
+              <a:rPr lang="en-US" i="1" dirty="0"/>
+              <a:t>                   “</a:t>
+            </a:r>
+            <a:r>
+              <a:rPr lang="en-US" b="1" i="1" dirty="0"/>
+              <a:t>self</a:t>
+            </a:r>
+            <a:r>
+              <a:rPr lang="en-US" i="1" dirty="0"/>
+              <a:t>”: {“</a:t>
+            </a:r>
+            <a:r>
+              <a:rPr lang="en-US" i="1" dirty="0" err="1"/>
+              <a:t>href</a:t>
+            </a:r>
+            <a:r>
+              <a:rPr lang="en-US" i="1" dirty="0"/>
+              <a:t>”: “/</a:t>
+            </a:r>
+            <a:r>
+              <a:rPr lang="en-US" i="1" dirty="0" err="1"/>
+              <a:t>news?</a:t>
+            </a:r>
+            <a:r>
+              <a:rPr lang="en-US" b="1" i="1" dirty="0" err="1"/>
+              <a:t>offset</a:t>
+            </a:r>
+            <a:r>
+              <a:rPr lang="en-US" i="1" dirty="0"/>
+              <a:t>=40&amp;</a:t>
+            </a:r>
+            <a:r>
+              <a:rPr lang="en-US" b="1" i="1" dirty="0"/>
+              <a:t>limit</a:t>
+            </a:r>
+            <a:r>
+              <a:rPr lang="en-US" i="1" dirty="0"/>
+              <a:t>=10”},</a:t>
+            </a:r>
+          </a:p>
+          <a:p>
+            <a:pPr marL="0" indent="0">
+              <a:buNone/>
+            </a:pPr>
+            <a:r>
+              <a:rPr lang="en-US" i="1" dirty="0"/>
+              <a:t>                   “</a:t>
+            </a:r>
+            <a:r>
+              <a:rPr lang="en-US" b="1" i="1" dirty="0"/>
+              <a:t>previous</a:t>
+            </a:r>
+            <a:r>
+              <a:rPr lang="en-US" i="1" dirty="0"/>
+              <a:t>” : {“</a:t>
+            </a:r>
+            <a:r>
+              <a:rPr lang="en-US" i="1" dirty="0" err="1"/>
+              <a:t>href</a:t>
+            </a:r>
+            <a:r>
+              <a:rPr lang="en-US" i="1" dirty="0"/>
+              <a:t>”: “/</a:t>
+            </a:r>
+            <a:r>
+              <a:rPr lang="en-US" i="1" dirty="0" err="1"/>
+              <a:t>news?</a:t>
+            </a:r>
+            <a:r>
+              <a:rPr lang="en-US" b="1" i="1" dirty="0" err="1"/>
+              <a:t>offset</a:t>
+            </a:r>
+            <a:r>
+              <a:rPr lang="en-US" i="1" dirty="0"/>
+              <a:t>=30&amp;</a:t>
+            </a:r>
+            <a:r>
+              <a:rPr lang="en-US" b="1" i="1" dirty="0"/>
+              <a:t>limit</a:t>
+            </a:r>
+            <a:r>
+              <a:rPr lang="en-US" i="1" dirty="0"/>
+              <a:t>=10”},</a:t>
+            </a:r>
+          </a:p>
+          <a:p>
+            <a:pPr marL="0" indent="0">
+              <a:buNone/>
+            </a:pPr>
+            <a:r>
+              <a:rPr lang="en-US" i="1" dirty="0"/>
+              <a:t>              ]</a:t>
+            </a:r>
+          </a:p>
+          <a:p>
+            <a:pPr marL="0" indent="0">
+              <a:buNone/>
+            </a:pPr>
+            <a:r>
+              <a:rPr lang="en-US" i="1" dirty="0"/>
+              <a:t>          }</a:t>
+            </a:r>
+          </a:p>
+        </p:txBody>
+      </p:sp>
+    </p:spTree>
+    <p:extLst>
+      <p:ext uri="{BB962C8B-B14F-4D97-AF65-F5344CB8AC3E}">
+        <p14:creationId xmlns:p14="http://schemas.microsoft.com/office/powerpoint/2010/main" val="1914574474"/>
+      </p:ext>
+    </p:extLst>
+  </p:cSld>
+  <p:clrMapOvr>
+    <a:masterClrMapping/>
+  </p:clrMapOvr>
+</p:sld>
+</file>
+
+<file path=ppt/slides/slide28.xml><?xml version="1.0" encoding="utf-8"?>
+<p:sld xmlns:a="http://schemas.openxmlformats.org/drawingml/2006/main" xmlns:r="http://schemas.openxmlformats.org/officeDocument/2006/relationships" xmlns:p="http://schemas.openxmlformats.org/presentationml/2006/main">
+  <p:cSld>
+    <p:spTree>
+      <p:nvGrpSpPr>
+        <p:cNvPr id="1" name=""/>
+        <p:cNvGrpSpPr/>
+        <p:nvPr/>
+      </p:nvGrpSpPr>
+      <p:grpSpPr>
+        <a:xfrm>
+          <a:off x="0" y="0"/>
+          <a:ext cx="0" cy="0"/>
+          <a:chOff x="0" y="0"/>
+          <a:chExt cx="0" cy="0"/>
+        </a:xfrm>
+      </p:grpSpPr>
+      <p:sp>
+        <p:nvSpPr>
+          <p:cNvPr id="2" name="Title 1"/>
+          <p:cNvSpPr>
+            <a:spLocks noGrp="1"/>
+          </p:cNvSpPr>
+          <p:nvPr>
+            <p:ph type="title"/>
+          </p:nvPr>
+        </p:nvSpPr>
+        <p:spPr/>
+        <p:txBody>
+          <a:bodyPr/>
+          <a:lstStyle/>
+          <a:p>
+            <a:r>
+              <a:rPr lang="en-US" dirty="0"/>
+              <a:t>Standard</a:t>
+            </a:r>
+          </a:p>
+        </p:txBody>
+      </p:sp>
+      <p:sp>
+        <p:nvSpPr>
+          <p:cNvPr id="3" name="Content Placeholder 2"/>
+          <p:cNvSpPr>
+            <a:spLocks noGrp="1"/>
+          </p:cNvSpPr>
+          <p:nvPr>
+            <p:ph idx="1"/>
+          </p:nvPr>
+        </p:nvSpPr>
+        <p:spPr>
+          <a:xfrm>
+            <a:off x="337751" y="1825624"/>
+            <a:ext cx="11574163" cy="4764645"/>
+          </a:xfrm>
+        </p:spPr>
+        <p:txBody>
+          <a:bodyPr/>
+          <a:lstStyle/>
+          <a:p>
+            <a:r>
+              <a:rPr lang="en-US" dirty="0"/>
+              <a:t>There is no official standard to define pages and links</a:t>
+            </a:r>
+          </a:p>
+          <a:p>
+            <a:endParaRPr lang="en-US" dirty="0"/>
+          </a:p>
+          <a:p>
+            <a:r>
+              <a:rPr lang="en-US" dirty="0"/>
+              <a:t>In the past, there were some attempts like HAL, but they look like abandoned</a:t>
+            </a:r>
+          </a:p>
+        </p:txBody>
+      </p:sp>
+    </p:spTree>
+    <p:extLst>
+      <p:ext uri="{BB962C8B-B14F-4D97-AF65-F5344CB8AC3E}">
+        <p14:creationId xmlns:p14="http://schemas.microsoft.com/office/powerpoint/2010/main" val="489897762"/>
+      </p:ext>
+    </p:extLst>
+  </p:cSld>
+  <p:clrMapOvr>
+    <a:masterClrMapping/>
+  </p:clrMapOvr>
+</p:sld>
+</file>
+
+<file path=ppt/slides/slide29.xml><?xml version="1.0" encoding="utf-8"?>
+<p:sld xmlns:a="http://schemas.openxmlformats.org/drawingml/2006/main" xmlns:r="http://schemas.openxmlformats.org/officeDocument/2006/relationships" xmlns:p="http://schemas.openxmlformats.org/presentationml/2006/main">
+  <p:cSld>
+    <p:spTree>
+      <p:nvGrpSpPr>
+        <p:cNvPr id="1" name=""/>
+        <p:cNvGrpSpPr/>
+        <p:nvPr/>
+      </p:nvGrpSpPr>
+      <p:grpSpPr>
+        <a:xfrm>
+          <a:off x="0" y="0"/>
+          <a:ext cx="0" cy="0"/>
+          <a:chOff x="0" y="0"/>
+          <a:chExt cx="0" cy="0"/>
+        </a:xfrm>
+      </p:grpSpPr>
+      <p:sp>
+        <p:nvSpPr>
+          <p:cNvPr id="4" name="Title 3"/>
+          <p:cNvSpPr>
+            <a:spLocks noGrp="1"/>
+          </p:cNvSpPr>
+          <p:nvPr>
+            <p:ph type="title"/>
+          </p:nvPr>
+        </p:nvSpPr>
+        <p:spPr/>
+        <p:txBody>
+          <a:bodyPr/>
+          <a:lstStyle/>
+          <a:p>
+            <a:r>
+              <a:rPr lang="en-US" dirty="0" smtClean="0"/>
+              <a:t>Keyset Pagination</a:t>
+            </a:r>
+            <a:endParaRPr lang="en-US" dirty="0"/>
+          </a:p>
+        </p:txBody>
+      </p:sp>
+    </p:spTree>
+    <p:extLst>
+      <p:ext uri="{BB962C8B-B14F-4D97-AF65-F5344CB8AC3E}">
+        <p14:creationId xmlns:p14="http://schemas.microsoft.com/office/powerpoint/2010/main" val="2980041314"/>
       </p:ext>
     </p:extLst>
   </p:cSld>
@@ -5920,6 +8499,628 @@
     <p:extLst>
       <p:ext uri="{BB962C8B-B14F-4D97-AF65-F5344CB8AC3E}">
         <p14:creationId xmlns:p14="http://schemas.microsoft.com/office/powerpoint/2010/main" val="786422261"/>
+      </p:ext>
+    </p:extLst>
+  </p:cSld>
+  <p:clrMapOvr>
+    <a:masterClrMapping/>
+  </p:clrMapOvr>
+</p:sld>
+</file>
+
+<file path=ppt/slides/slide30.xml><?xml version="1.0" encoding="utf-8"?>
+<p:sld xmlns:a="http://schemas.openxmlformats.org/drawingml/2006/main" xmlns:r="http://schemas.openxmlformats.org/officeDocument/2006/relationships" xmlns:p="http://schemas.openxmlformats.org/presentationml/2006/main">
+  <p:cSld>
+    <p:spTree>
+      <p:nvGrpSpPr>
+        <p:cNvPr id="1" name=""/>
+        <p:cNvGrpSpPr/>
+        <p:nvPr/>
+      </p:nvGrpSpPr>
+      <p:grpSpPr>
+        <a:xfrm>
+          <a:off x="0" y="0"/>
+          <a:ext cx="0" cy="0"/>
+          <a:chOff x="0" y="0"/>
+          <a:chExt cx="0" cy="0"/>
+        </a:xfrm>
+      </p:grpSpPr>
+      <p:sp>
+        <p:nvSpPr>
+          <p:cNvPr id="2" name="Title 1"/>
+          <p:cNvSpPr>
+            <a:spLocks noGrp="1"/>
+          </p:cNvSpPr>
+          <p:nvPr>
+            <p:ph type="title"/>
+          </p:nvPr>
+        </p:nvSpPr>
+        <p:spPr/>
+        <p:txBody>
+          <a:bodyPr/>
+          <a:lstStyle/>
+          <a:p>
+            <a:endParaRPr lang="en-US"/>
+          </a:p>
+        </p:txBody>
+      </p:sp>
+      <p:sp>
+        <p:nvSpPr>
+          <p:cNvPr id="3" name="Content Placeholder 2"/>
+          <p:cNvSpPr>
+            <a:spLocks noGrp="1"/>
+          </p:cNvSpPr>
+          <p:nvPr>
+            <p:ph idx="1"/>
+          </p:nvPr>
+        </p:nvSpPr>
+        <p:spPr/>
+        <p:txBody>
+          <a:bodyPr/>
+          <a:lstStyle/>
+          <a:p>
+            <a:endParaRPr lang="en-US"/>
+          </a:p>
+        </p:txBody>
+      </p:sp>
+    </p:spTree>
+    <p:extLst>
+      <p:ext uri="{BB962C8B-B14F-4D97-AF65-F5344CB8AC3E}">
+        <p14:creationId xmlns:p14="http://schemas.microsoft.com/office/powerpoint/2010/main" val="1932408957"/>
+      </p:ext>
+    </p:extLst>
+  </p:cSld>
+  <p:clrMapOvr>
+    <a:masterClrMapping/>
+  </p:clrMapOvr>
+</p:sld>
+</file>
+
+<file path=ppt/slides/slide31.xml><?xml version="1.0" encoding="utf-8"?>
+<p:sld xmlns:a="http://schemas.openxmlformats.org/drawingml/2006/main" xmlns:r="http://schemas.openxmlformats.org/officeDocument/2006/relationships" xmlns:p="http://schemas.openxmlformats.org/presentationml/2006/main">
+  <p:cSld>
+    <p:spTree>
+      <p:nvGrpSpPr>
+        <p:cNvPr id="1" name=""/>
+        <p:cNvGrpSpPr/>
+        <p:nvPr/>
+      </p:nvGrpSpPr>
+      <p:grpSpPr>
+        <a:xfrm>
+          <a:off x="0" y="0"/>
+          <a:ext cx="0" cy="0"/>
+          <a:chOff x="0" y="0"/>
+          <a:chExt cx="0" cy="0"/>
+        </a:xfrm>
+      </p:grpSpPr>
+      <p:sp>
+        <p:nvSpPr>
+          <p:cNvPr id="4" name="Title 3"/>
+          <p:cNvSpPr>
+            <a:spLocks noGrp="1"/>
+          </p:cNvSpPr>
+          <p:nvPr>
+            <p:ph type="title"/>
+          </p:nvPr>
+        </p:nvSpPr>
+        <p:spPr/>
+        <p:txBody>
+          <a:bodyPr/>
+          <a:lstStyle/>
+          <a:p>
+            <a:r>
+              <a:rPr lang="en-US" dirty="0" smtClean="0"/>
+              <a:t>Data Expansion</a:t>
+            </a:r>
+            <a:endParaRPr lang="en-US" dirty="0"/>
+          </a:p>
+        </p:txBody>
+      </p:sp>
+    </p:spTree>
+    <p:extLst>
+      <p:ext uri="{BB962C8B-B14F-4D97-AF65-F5344CB8AC3E}">
+        <p14:creationId xmlns:p14="http://schemas.microsoft.com/office/powerpoint/2010/main" val="2247111827"/>
+      </p:ext>
+    </p:extLst>
+  </p:cSld>
+  <p:clrMapOvr>
+    <a:masterClrMapping/>
+  </p:clrMapOvr>
+</p:sld>
+</file>
+
+<file path=ppt/slides/slide32.xml><?xml version="1.0" encoding="utf-8"?>
+<p:sld xmlns:a="http://schemas.openxmlformats.org/drawingml/2006/main" xmlns:r="http://schemas.openxmlformats.org/officeDocument/2006/relationships" xmlns:p="http://schemas.openxmlformats.org/presentationml/2006/main">
+  <p:cSld>
+    <p:spTree>
+      <p:nvGrpSpPr>
+        <p:cNvPr id="1" name=""/>
+        <p:cNvGrpSpPr/>
+        <p:nvPr/>
+      </p:nvGrpSpPr>
+      <p:grpSpPr>
+        <a:xfrm>
+          <a:off x="0" y="0"/>
+          <a:ext cx="0" cy="0"/>
+          <a:chOff x="0" y="0"/>
+          <a:chExt cx="0" cy="0"/>
+        </a:xfrm>
+      </p:grpSpPr>
+      <p:sp>
+        <p:nvSpPr>
+          <p:cNvPr id="2" name="Title 1"/>
+          <p:cNvSpPr>
+            <a:spLocks noGrp="1"/>
+          </p:cNvSpPr>
+          <p:nvPr>
+            <p:ph type="title"/>
+          </p:nvPr>
+        </p:nvSpPr>
+        <p:spPr/>
+        <p:txBody>
+          <a:bodyPr/>
+          <a:lstStyle/>
+          <a:p>
+            <a:r>
+              <a:rPr lang="en-US" dirty="0"/>
+              <a:t>Expansion</a:t>
+            </a:r>
+          </a:p>
+        </p:txBody>
+      </p:sp>
+      <p:sp>
+        <p:nvSpPr>
+          <p:cNvPr id="3" name="Content Placeholder 2"/>
+          <p:cNvSpPr>
+            <a:spLocks noGrp="1"/>
+          </p:cNvSpPr>
+          <p:nvPr>
+            <p:ph idx="1"/>
+          </p:nvPr>
+        </p:nvSpPr>
+        <p:spPr>
+          <a:xfrm>
+            <a:off x="98855" y="1825624"/>
+            <a:ext cx="11796584" cy="4855261"/>
+          </a:xfrm>
+        </p:spPr>
+        <p:txBody>
+          <a:bodyPr>
+            <a:normAutofit/>
+          </a:bodyPr>
+          <a:lstStyle/>
+          <a:p>
+            <a:r>
+              <a:rPr lang="en-US" dirty="0"/>
+              <a:t>A “</a:t>
+            </a:r>
+            <a:r>
+              <a:rPr lang="en-US" i="1" dirty="0"/>
+              <a:t>news</a:t>
+            </a:r>
+            <a:r>
+              <a:rPr lang="en-US" dirty="0"/>
+              <a:t>” might have a </a:t>
+            </a:r>
+            <a:r>
+              <a:rPr lang="en-US" i="1" dirty="0"/>
+              <a:t>list</a:t>
+            </a:r>
+            <a:r>
+              <a:rPr lang="en-US" dirty="0"/>
+              <a:t> of “</a:t>
+            </a:r>
+            <a:r>
+              <a:rPr lang="en-US" i="1" dirty="0"/>
+              <a:t>comments</a:t>
+            </a:r>
+            <a:r>
+              <a:rPr lang="en-US" dirty="0"/>
+              <a:t>”</a:t>
+            </a:r>
+          </a:p>
+          <a:p>
+            <a:r>
+              <a:rPr lang="en-US" dirty="0"/>
+              <a:t>A “</a:t>
+            </a:r>
+            <a:r>
+              <a:rPr lang="en-US" i="1" dirty="0"/>
+              <a:t>news</a:t>
+            </a:r>
+            <a:r>
+              <a:rPr lang="en-US" dirty="0"/>
+              <a:t>” might also have a </a:t>
+            </a:r>
+            <a:r>
+              <a:rPr lang="en-US" i="1" dirty="0"/>
+              <a:t>list</a:t>
+            </a:r>
+            <a:r>
+              <a:rPr lang="en-US" dirty="0"/>
+              <a:t> of “</a:t>
+            </a:r>
+            <a:r>
+              <a:rPr lang="en-US" i="1" dirty="0"/>
+              <a:t>users</a:t>
+            </a:r>
+            <a:r>
+              <a:rPr lang="en-US" dirty="0"/>
+              <a:t>” that liked it </a:t>
+            </a:r>
+          </a:p>
+          <a:p>
+            <a:r>
+              <a:rPr lang="en-US" dirty="0"/>
+              <a:t>When retrieving a single item, might not want to download as well the hundreds/thousands of other items related to it</a:t>
+            </a:r>
+          </a:p>
+          <a:p>
+            <a:r>
+              <a:rPr lang="en-US" dirty="0"/>
+              <a:t>As returning those lists can be very expensive, can have special query parameters to choose if downloaded or not</a:t>
+            </a:r>
+          </a:p>
+          <a:p>
+            <a:r>
+              <a:rPr lang="en-US" dirty="0" err="1"/>
+              <a:t>Eg</a:t>
+            </a:r>
+            <a:r>
+              <a:rPr lang="en-US" dirty="0"/>
+              <a:t>.: </a:t>
+            </a:r>
+            <a:r>
+              <a:rPr lang="en-US" i="1" dirty="0"/>
+              <a:t>GET /</a:t>
+            </a:r>
+            <a:r>
+              <a:rPr lang="en-US" i="1" dirty="0" err="1"/>
+              <a:t>news?</a:t>
+            </a:r>
+            <a:r>
+              <a:rPr lang="en-US" b="1" i="1" dirty="0" err="1"/>
+              <a:t>expand</a:t>
+            </a:r>
+            <a:r>
+              <a:rPr lang="en-US" i="1" dirty="0"/>
+              <a:t>=NONE   </a:t>
+            </a:r>
+            <a:r>
+              <a:rPr lang="en-US" dirty="0"/>
+              <a:t>(no lists)</a:t>
+            </a:r>
+          </a:p>
+          <a:p>
+            <a:r>
+              <a:rPr lang="en-US" dirty="0" err="1"/>
+              <a:t>Eg</a:t>
+            </a:r>
+            <a:r>
+              <a:rPr lang="en-US" dirty="0"/>
+              <a:t>.: </a:t>
+            </a:r>
+            <a:r>
+              <a:rPr lang="en-US" i="1" dirty="0"/>
+              <a:t>GET /</a:t>
+            </a:r>
+            <a:r>
+              <a:rPr lang="en-US" i="1" dirty="0" err="1"/>
+              <a:t>news?</a:t>
+            </a:r>
+            <a:r>
+              <a:rPr lang="en-US" b="1" i="1" dirty="0" err="1"/>
+              <a:t>expand</a:t>
+            </a:r>
+            <a:r>
+              <a:rPr lang="en-US" i="1" dirty="0"/>
+              <a:t>=COMMENTS   </a:t>
+            </a:r>
+            <a:r>
+              <a:rPr lang="en-US" dirty="0"/>
+              <a:t>(include comments)</a:t>
+            </a:r>
+          </a:p>
+          <a:p>
+            <a:endParaRPr lang="en-US" dirty="0"/>
+          </a:p>
+          <a:p>
+            <a:endParaRPr lang="en-US" dirty="0"/>
+          </a:p>
+        </p:txBody>
+      </p:sp>
+    </p:spTree>
+    <p:extLst>
+      <p:ext uri="{BB962C8B-B14F-4D97-AF65-F5344CB8AC3E}">
+        <p14:creationId xmlns:p14="http://schemas.microsoft.com/office/powerpoint/2010/main" val="1152359187"/>
+      </p:ext>
+    </p:extLst>
+  </p:cSld>
+  <p:clrMapOvr>
+    <a:masterClrMapping/>
+  </p:clrMapOvr>
+</p:sld>
+</file>
+
+<file path=ppt/slides/slide33.xml><?xml version="1.0" encoding="utf-8"?>
+<p:sld xmlns:a="http://schemas.openxmlformats.org/drawingml/2006/main" xmlns:r="http://schemas.openxmlformats.org/officeDocument/2006/relationships" xmlns:p="http://schemas.openxmlformats.org/presentationml/2006/main">
+  <p:cSld>
+    <p:spTree>
+      <p:nvGrpSpPr>
+        <p:cNvPr id="1" name=""/>
+        <p:cNvGrpSpPr/>
+        <p:nvPr/>
+      </p:nvGrpSpPr>
+      <p:grpSpPr>
+        <a:xfrm>
+          <a:off x="0" y="0"/>
+          <a:ext cx="0" cy="0"/>
+          <a:chOff x="0" y="0"/>
+          <a:chExt cx="0" cy="0"/>
+        </a:xfrm>
+      </p:grpSpPr>
+      <p:sp>
+        <p:nvSpPr>
+          <p:cNvPr id="2" name="Title 1"/>
+          <p:cNvSpPr>
+            <a:spLocks noGrp="1"/>
+          </p:cNvSpPr>
+          <p:nvPr>
+            <p:ph type="title"/>
+          </p:nvPr>
+        </p:nvSpPr>
+        <p:spPr/>
+        <p:txBody>
+          <a:bodyPr/>
+          <a:lstStyle/>
+          <a:p>
+            <a:r>
+              <a:rPr lang="en-US" dirty="0"/>
+              <a:t>Tradeoff</a:t>
+            </a:r>
+          </a:p>
+        </p:txBody>
+      </p:sp>
+      <p:sp>
+        <p:nvSpPr>
+          <p:cNvPr id="3" name="Content Placeholder 2"/>
+          <p:cNvSpPr>
+            <a:spLocks noGrp="1"/>
+          </p:cNvSpPr>
+          <p:nvPr>
+            <p:ph idx="1"/>
+          </p:nvPr>
+        </p:nvSpPr>
+        <p:spPr>
+          <a:xfrm>
+            <a:off x="255373" y="1825624"/>
+            <a:ext cx="11755395" cy="4847025"/>
+          </a:xfrm>
+        </p:spPr>
+        <p:txBody>
+          <a:bodyPr/>
+          <a:lstStyle/>
+          <a:p>
+            <a:r>
+              <a:rPr lang="en-US" dirty="0"/>
+              <a:t>Option 1: never return those lists</a:t>
+            </a:r>
+          </a:p>
+          <a:p>
+            <a:pPr lvl="1"/>
+            <a:r>
+              <a:rPr lang="en-US" dirty="0"/>
+              <a:t>But, then, need further HTTP calls to retrieve those lists if needed</a:t>
+            </a:r>
+          </a:p>
+          <a:p>
+            <a:r>
+              <a:rPr lang="en-US" dirty="0"/>
+              <a:t>Option 2: create “</a:t>
+            </a:r>
+            <a:r>
+              <a:rPr lang="en-US" i="1" dirty="0"/>
+              <a:t>expand</a:t>
+            </a:r>
+            <a:r>
+              <a:rPr lang="en-US" dirty="0"/>
+              <a:t>” query parameters to control what returned</a:t>
+            </a:r>
+          </a:p>
+          <a:p>
+            <a:pPr lvl="1"/>
+            <a:r>
+              <a:rPr lang="en-US" dirty="0"/>
+              <a:t>Good: can return everything needed in a single HTTP request</a:t>
+            </a:r>
+          </a:p>
+          <a:p>
+            <a:pPr lvl="1"/>
+            <a:r>
+              <a:rPr lang="en-US" dirty="0"/>
+              <a:t>Bad: needs to implement all the needed cases </a:t>
+            </a:r>
+            <a:r>
+              <a:rPr lang="en-US" i="1" dirty="0"/>
+              <a:t>manually</a:t>
+            </a:r>
+          </a:p>
+          <a:p>
+            <a:r>
+              <a:rPr lang="en-US" i="1" dirty="0" err="1"/>
+              <a:t>GraphQL</a:t>
+            </a:r>
+            <a:r>
+              <a:rPr lang="en-US" dirty="0"/>
+              <a:t>: a selling point compared to REST is its ability to exactly specify what to return</a:t>
+            </a:r>
+          </a:p>
+          <a:p>
+            <a:pPr lvl="1"/>
+            <a:r>
+              <a:rPr lang="en-US" dirty="0"/>
+              <a:t>we will see </a:t>
+            </a:r>
+            <a:r>
+              <a:rPr lang="en-US" dirty="0" err="1"/>
+              <a:t>GraphQL</a:t>
+            </a:r>
+            <a:r>
+              <a:rPr lang="en-US" dirty="0"/>
+              <a:t> later in the course</a:t>
+            </a:r>
+          </a:p>
+        </p:txBody>
+      </p:sp>
+    </p:spTree>
+    <p:extLst>
+      <p:ext uri="{BB962C8B-B14F-4D97-AF65-F5344CB8AC3E}">
+        <p14:creationId xmlns:p14="http://schemas.microsoft.com/office/powerpoint/2010/main" val="728222810"/>
+      </p:ext>
+    </p:extLst>
+  </p:cSld>
+  <p:clrMapOvr>
+    <a:masterClrMapping/>
+  </p:clrMapOvr>
+</p:sld>
+</file>
+
+<file path=ppt/slides/slide34.xml><?xml version="1.0" encoding="utf-8"?>
+<p:sld xmlns:a="http://schemas.openxmlformats.org/drawingml/2006/main" xmlns:r="http://schemas.openxmlformats.org/officeDocument/2006/relationships" xmlns:p="http://schemas.openxmlformats.org/presentationml/2006/main">
+  <p:cSld>
+    <p:spTree>
+      <p:nvGrpSpPr>
+        <p:cNvPr id="1" name=""/>
+        <p:cNvGrpSpPr/>
+        <p:nvPr/>
+      </p:nvGrpSpPr>
+      <p:grpSpPr>
+        <a:xfrm>
+          <a:off x="0" y="0"/>
+          <a:ext cx="0" cy="0"/>
+          <a:chOff x="0" y="0"/>
+          <a:chExt cx="0" cy="0"/>
+        </a:xfrm>
+      </p:grpSpPr>
+      <p:sp>
+        <p:nvSpPr>
+          <p:cNvPr id="4" name="Title 3"/>
+          <p:cNvSpPr>
+            <a:spLocks noGrp="1"/>
+          </p:cNvSpPr>
+          <p:nvPr>
+            <p:ph type="title"/>
+          </p:nvPr>
+        </p:nvSpPr>
+        <p:spPr/>
+        <p:txBody>
+          <a:bodyPr/>
+          <a:lstStyle/>
+          <a:p>
+            <a:r>
+              <a:rPr lang="en-US" dirty="0" err="1"/>
+              <a:t>Git</a:t>
+            </a:r>
+            <a:r>
+              <a:rPr lang="en-US" dirty="0"/>
+              <a:t> Repository Modules</a:t>
+            </a:r>
+          </a:p>
+        </p:txBody>
+      </p:sp>
+      <p:sp>
+        <p:nvSpPr>
+          <p:cNvPr id="5" name="Content Placeholder 4"/>
+          <p:cNvSpPr>
+            <a:spLocks noGrp="1"/>
+          </p:cNvSpPr>
+          <p:nvPr>
+            <p:ph idx="1"/>
+          </p:nvPr>
+        </p:nvSpPr>
+        <p:spPr>
+          <a:xfrm>
+            <a:off x="296561" y="1825625"/>
+            <a:ext cx="11532973" cy="4972740"/>
+          </a:xfrm>
+        </p:spPr>
+        <p:txBody>
+          <a:bodyPr>
+            <a:normAutofit fontScale="92500" lnSpcReduction="20000"/>
+          </a:bodyPr>
+          <a:lstStyle/>
+          <a:p>
+            <a:r>
+              <a:rPr lang="en-US" i="1" dirty="0"/>
+              <a:t>NOTE: most of the explanations will be directly in the code as comments, and not here in the slides</a:t>
+            </a:r>
+            <a:endParaRPr lang="en-US" b="1" dirty="0"/>
+          </a:p>
+          <a:p>
+            <a:r>
+              <a:rPr lang="en-US" b="1" dirty="0"/>
+              <a:t>advanced/rest/wrapper</a:t>
+            </a:r>
+          </a:p>
+          <a:p>
+            <a:r>
+              <a:rPr lang="en-US" b="1" dirty="0"/>
+              <a:t>advanced/rest/rest-</a:t>
+            </a:r>
+            <a:r>
+              <a:rPr lang="en-US" b="1" dirty="0" err="1"/>
+              <a:t>dto</a:t>
+            </a:r>
+            <a:endParaRPr lang="en-US" b="1" dirty="0"/>
+          </a:p>
+          <a:p>
+            <a:r>
+              <a:rPr lang="en-US" b="1" dirty="0" smtClean="0"/>
+              <a:t>advanced/rest/exception-handling</a:t>
+            </a:r>
+            <a:endParaRPr lang="en-US" b="1" dirty="0"/>
+          </a:p>
+          <a:p>
+            <a:r>
+              <a:rPr lang="en-US" b="1" dirty="0" smtClean="0"/>
+              <a:t>advanced/rest/rest-exception</a:t>
+            </a:r>
+          </a:p>
+          <a:p>
+            <a:r>
+              <a:rPr lang="en-US" b="1" dirty="0" smtClean="0"/>
+              <a:t>advanced/rest/pagination</a:t>
+            </a:r>
+          </a:p>
+          <a:p>
+            <a:r>
+              <a:rPr lang="en-US" b="1" dirty="0" smtClean="0"/>
+              <a:t>advanced/rest/gui-v2</a:t>
+            </a:r>
+            <a:endParaRPr lang="en-US" b="1" dirty="0"/>
+          </a:p>
+          <a:p>
+            <a:r>
+              <a:rPr lang="en-US" dirty="0"/>
+              <a:t>Study relevant sections in </a:t>
+            </a:r>
+            <a:r>
+              <a:rPr lang="en-US" i="1" dirty="0"/>
+              <a:t>RESTful Service Best Practices</a:t>
+            </a:r>
+          </a:p>
+          <a:p>
+            <a:r>
+              <a:rPr lang="en-US" dirty="0"/>
+              <a:t>Study relevant sections in RFC-7230 and RFC-7231 </a:t>
+            </a:r>
+          </a:p>
+        </p:txBody>
+      </p:sp>
+    </p:spTree>
+    <p:extLst>
+      <p:ext uri="{BB962C8B-B14F-4D97-AF65-F5344CB8AC3E}">
+        <p14:creationId xmlns:p14="http://schemas.microsoft.com/office/powerpoint/2010/main" val="1023732187"/>
       </p:ext>
     </p:extLst>
   </p:cSld>

</xml_diff>

<commit_message>
renamed pagination modules to avoid confusion between Keyset and Offset
</commit_message>
<xml_diff>
--- a/doc/advanced/slides/lesson_04.pptx
+++ b/doc/advanced/slides/lesson_04.pptx
@@ -241,7 +241,7 @@
           <a:p>
             <a:fld id="{9B5B52BA-3295-0343-9E28-A260A811DD10}" type="datetimeFigureOut">
               <a:rPr lang="en-US" smtClean="0"/>
-              <a:t>13-Aug-19</a:t>
+              <a:t>8/6/20</a:t>
             </a:fld>
             <a:endParaRPr lang="en-US"/>
           </a:p>
@@ -721,7 +721,7 @@
           <a:p>
             <a:fld id="{04F1D4A2-813C-F741-B481-C92B3A596030}" type="datetimeFigureOut">
               <a:rPr lang="en-US" smtClean="0"/>
-              <a:t>13-Aug-19</a:t>
+              <a:t>8/6/20</a:t>
             </a:fld>
             <a:endParaRPr lang="en-US"/>
           </a:p>
@@ -889,7 +889,7 @@
           <a:p>
             <a:fld id="{04F1D4A2-813C-F741-B481-C92B3A596030}" type="datetimeFigureOut">
               <a:rPr lang="en-US" smtClean="0"/>
-              <a:t>13-Aug-19</a:t>
+              <a:t>8/6/20</a:t>
             </a:fld>
             <a:endParaRPr lang="en-US"/>
           </a:p>
@@ -1067,7 +1067,7 @@
           <a:p>
             <a:fld id="{04F1D4A2-813C-F741-B481-C92B3A596030}" type="datetimeFigureOut">
               <a:rPr lang="en-US" smtClean="0"/>
-              <a:t>13-Aug-19</a:t>
+              <a:t>8/6/20</a:t>
             </a:fld>
             <a:endParaRPr lang="en-US"/>
           </a:p>
@@ -1246,7 +1246,7 @@
           <a:p>
             <a:fld id="{04F1D4A2-813C-F741-B481-C92B3A596030}" type="datetimeFigureOut">
               <a:rPr lang="en-US" smtClean="0"/>
-              <a:t>13-Aug-19</a:t>
+              <a:t>8/6/20</a:t>
             </a:fld>
             <a:endParaRPr lang="en-US"/>
           </a:p>
@@ -1491,7 +1491,7 @@
           <a:p>
             <a:fld id="{04F1D4A2-813C-F741-B481-C92B3A596030}" type="datetimeFigureOut">
               <a:rPr lang="en-US" smtClean="0"/>
-              <a:t>13-Aug-19</a:t>
+              <a:t>8/6/20</a:t>
             </a:fld>
             <a:endParaRPr lang="en-US"/>
           </a:p>
@@ -1720,7 +1720,7 @@
           <a:p>
             <a:fld id="{04F1D4A2-813C-F741-B481-C92B3A596030}" type="datetimeFigureOut">
               <a:rPr lang="en-US" smtClean="0"/>
-              <a:t>13-Aug-19</a:t>
+              <a:t>8/6/20</a:t>
             </a:fld>
             <a:endParaRPr lang="en-US"/>
           </a:p>
@@ -2084,7 +2084,7 @@
           <a:p>
             <a:fld id="{04F1D4A2-813C-F741-B481-C92B3A596030}" type="datetimeFigureOut">
               <a:rPr lang="en-US" smtClean="0"/>
-              <a:t>13-Aug-19</a:t>
+              <a:t>8/6/20</a:t>
             </a:fld>
             <a:endParaRPr lang="en-US"/>
           </a:p>
@@ -2201,7 +2201,7 @@
           <a:p>
             <a:fld id="{04F1D4A2-813C-F741-B481-C92B3A596030}" type="datetimeFigureOut">
               <a:rPr lang="en-US" smtClean="0"/>
-              <a:t>13-Aug-19</a:t>
+              <a:t>8/6/20</a:t>
             </a:fld>
             <a:endParaRPr lang="en-US"/>
           </a:p>
@@ -2296,7 +2296,7 @@
           <a:p>
             <a:fld id="{04F1D4A2-813C-F741-B481-C92B3A596030}" type="datetimeFigureOut">
               <a:rPr lang="en-US" smtClean="0"/>
-              <a:t>13-Aug-19</a:t>
+              <a:t>8/6/20</a:t>
             </a:fld>
             <a:endParaRPr lang="en-US"/>
           </a:p>
@@ -2571,7 +2571,7 @@
           <a:p>
             <a:fld id="{04F1D4A2-813C-F741-B481-C92B3A596030}" type="datetimeFigureOut">
               <a:rPr lang="en-US" smtClean="0"/>
-              <a:t>13-Aug-19</a:t>
+              <a:t>8/6/20</a:t>
             </a:fld>
             <a:endParaRPr lang="en-US"/>
           </a:p>
@@ -2823,7 +2823,7 @@
           <a:p>
             <a:fld id="{04F1D4A2-813C-F741-B481-C92B3A596030}" type="datetimeFigureOut">
               <a:rPr lang="en-US" smtClean="0"/>
-              <a:t>13-Aug-19</a:t>
+              <a:t>8/6/20</a:t>
             </a:fld>
             <a:endParaRPr lang="en-US"/>
           </a:p>
@@ -3034,7 +3034,7 @@
           <a:p>
             <a:fld id="{04F1D4A2-813C-F741-B481-C92B3A596030}" type="datetimeFigureOut">
               <a:rPr lang="en-US" smtClean="0"/>
-              <a:t>13-Aug-19</a:t>
+              <a:t>8/6/20</a:t>
             </a:fld>
             <a:endParaRPr lang="en-US"/>
           </a:p>
@@ -3477,24 +3477,12 @@
             <a:br>
               <a:rPr lang="en-US" dirty="0"/>
             </a:br>
-            <a:r>
-              <a:rPr lang="en-US" dirty="0"/>
-              <a:t/>
-            </a:r>
             <a:br>
               <a:rPr lang="en-US" dirty="0"/>
             </a:br>
             <a:r>
               <a:rPr lang="en-US" dirty="0"/>
-              <a:t>Lesson 04: </a:t>
-            </a:r>
-            <a:r>
-              <a:rPr lang="en-US" dirty="0" smtClean="0"/>
-              <a:t>Wrapped </a:t>
-            </a:r>
-            <a:r>
-              <a:rPr lang="en-US" dirty="0"/>
-              <a:t>Responses, Errors and Pagination</a:t>
+              <a:t>Lesson 04: Wrapped Responses, Errors and Pagination</a:t>
             </a:r>
           </a:p>
         </p:txBody>
@@ -3728,20 +3716,15 @@
           <a:p>
             <a:r>
               <a:rPr lang="en-US" dirty="0"/>
-              <a:t>When an exception is thrown and not caught, Spring creates a 500 HTTP </a:t>
-            </a:r>
-            <a:r>
-              <a:rPr lang="en-US" dirty="0" smtClean="0"/>
-              <a:t>response</a:t>
+              <a:t>When an exception is thrown and not caught, Spring creates a 500 HTTP response</a:t>
             </a:r>
           </a:p>
           <a:p>
             <a:pPr lvl="1"/>
             <a:r>
-              <a:rPr lang="en-US" dirty="0" smtClean="0"/>
+              <a:rPr lang="en-US" dirty="0"/>
               <a:t>exceptions in your code will not crash the whole server…</a:t>
             </a:r>
-            <a:endParaRPr lang="en-US" dirty="0"/>
           </a:p>
           <a:p>
             <a:r>
@@ -4472,10 +4455,9 @@
           <a:lstStyle/>
           <a:p>
             <a:r>
-              <a:rPr lang="en-US" dirty="0" smtClean="0"/>
+              <a:rPr lang="en-US" dirty="0"/>
               <a:t>Two Types of Pagination</a:t>
             </a:r>
-            <a:endParaRPr lang="en-US" dirty="0"/>
           </a:p>
         </p:txBody>
       </p:sp>
@@ -4500,85 +4482,85 @@
           <a:lstStyle/>
           <a:p>
             <a:r>
-              <a:rPr lang="en-US" b="1" dirty="0" smtClean="0"/>
+              <a:rPr lang="en-US" b="1" dirty="0"/>
               <a:t>Offset Pagination</a:t>
             </a:r>
           </a:p>
           <a:p>
             <a:pPr lvl="1"/>
             <a:r>
-              <a:rPr lang="en-US" dirty="0" smtClean="0"/>
+              <a:rPr lang="en-US" dirty="0"/>
               <a:t>likely the most common</a:t>
             </a:r>
           </a:p>
           <a:p>
             <a:pPr lvl="1"/>
             <a:r>
-              <a:rPr lang="en-US" dirty="0" smtClean="0"/>
+              <a:rPr lang="en-US" dirty="0"/>
               <a:t>can jump directly to a specific page</a:t>
             </a:r>
           </a:p>
           <a:p>
             <a:pPr lvl="1"/>
             <a:r>
-              <a:rPr lang="en-US" dirty="0" smtClean="0"/>
+              <a:rPr lang="en-US" dirty="0"/>
               <a:t>VERY INEFFICIENT, unless limited to read only a few pages from start </a:t>
             </a:r>
           </a:p>
           <a:p>
             <a:pPr lvl="1"/>
             <a:r>
-              <a:rPr lang="en-US" dirty="0" smtClean="0"/>
+              <a:rPr lang="en-US" dirty="0"/>
               <a:t>issues when database is manipulated while iterating over it</a:t>
             </a:r>
           </a:p>
           <a:p>
             <a:r>
-              <a:rPr lang="en-US" b="1" dirty="0" smtClean="0"/>
+              <a:rPr lang="en-US" b="1" dirty="0"/>
               <a:t>Keyset Pagination</a:t>
             </a:r>
           </a:p>
           <a:p>
             <a:pPr lvl="1"/>
             <a:r>
-              <a:rPr lang="en-US" dirty="0" smtClean="0"/>
+              <a:rPr lang="en-US" dirty="0"/>
               <a:t>most efficient</a:t>
             </a:r>
           </a:p>
           <a:p>
             <a:pPr lvl="1"/>
             <a:r>
-              <a:rPr lang="en-US" dirty="0" smtClean="0"/>
+              <a:rPr lang="en-US" dirty="0"/>
               <a:t>bit more complex to implement</a:t>
             </a:r>
           </a:p>
           <a:p>
             <a:pPr lvl="1"/>
             <a:r>
-              <a:rPr lang="en-US" dirty="0" smtClean="0"/>
+              <a:rPr lang="en-US" dirty="0"/>
               <a:t>can’t jump directly to a specific page, without reading previous pages</a:t>
             </a:r>
           </a:p>
           <a:p>
             <a:pPr lvl="2"/>
             <a:r>
-              <a:rPr lang="en-US" dirty="0" smtClean="0"/>
+              <a:rPr lang="en-US" dirty="0"/>
               <a:t>not a problem if we just care of “</a:t>
             </a:r>
             <a:r>
-              <a:rPr lang="en-US" i="1" dirty="0" smtClean="0"/>
+              <a:rPr lang="en-US" i="1" dirty="0"/>
               <a:t>next</a:t>
             </a:r>
             <a:r>
-              <a:rPr lang="en-US" dirty="0" smtClean="0"/>
+              <a:rPr lang="en-US" dirty="0"/>
               <a:t>” page, or jumps ahead of only few pages (</a:t>
             </a:r>
             <a:r>
-              <a:rPr lang="en-US" dirty="0" err="1" smtClean="0"/>
+              <a:rPr lang="en-US" dirty="0" err="1"/>
               <a:t>eg</a:t>
             </a:r>
             <a:r>
-              <a:rPr lang="en-US" dirty="0" smtClean="0"/>
+              <a:rPr lang="en-US" dirty="0"/>
               <a:t> 5-10)</a:t>
             </a:r>
           </a:p>
@@ -4640,10 +4622,9 @@
           <a:lstStyle/>
           <a:p>
             <a:r>
-              <a:rPr lang="en-US" dirty="0" smtClean="0"/>
+              <a:rPr lang="en-US" dirty="0"/>
               <a:t>Efficiency</a:t>
             </a:r>
-            <a:endParaRPr lang="en-US" dirty="0"/>
           </a:p>
         </p:txBody>
       </p:sp>
@@ -4670,42 +4651,41 @@
           <a:lstStyle/>
           <a:p>
             <a:r>
-              <a:rPr lang="en-US" dirty="0" smtClean="0"/>
+              <a:rPr lang="en-US" dirty="0"/>
               <a:t>Assume for example </a:t>
             </a:r>
             <a:r>
-              <a:rPr lang="en-US" i="1" dirty="0" smtClean="0"/>
+              <a:rPr lang="en-US" i="1" dirty="0"/>
               <a:t>100 millions </a:t>
             </a:r>
             <a:r>
-              <a:rPr lang="en-US" dirty="0" smtClean="0"/>
+              <a:rPr lang="en-US" dirty="0"/>
               <a:t>items in database</a:t>
             </a:r>
           </a:p>
           <a:p>
             <a:r>
-              <a:rPr lang="en-US" dirty="0" smtClean="0"/>
+              <a:rPr lang="en-US" dirty="0"/>
               <a:t>Pages of small fixed size, </a:t>
             </a:r>
             <a:r>
-              <a:rPr lang="en-US" dirty="0" err="1" smtClean="0"/>
+              <a:rPr lang="en-US" dirty="0" err="1"/>
               <a:t>eg</a:t>
             </a:r>
             <a:r>
-              <a:rPr lang="en-US" dirty="0" smtClean="0"/>
+              <a:rPr lang="en-US" dirty="0"/>
               <a:t> </a:t>
             </a:r>
             <a:r>
-              <a:rPr lang="en-US" i="1" dirty="0" smtClean="0"/>
+              <a:rPr lang="en-US" i="1" dirty="0"/>
               <a:t>n=20</a:t>
             </a:r>
           </a:p>
           <a:p>
             <a:r>
-              <a:rPr lang="en-US" dirty="0" smtClean="0"/>
+              <a:rPr lang="en-US" dirty="0"/>
               <a:t>Data is sent through 3 steps</a:t>
             </a:r>
-            <a:endParaRPr lang="en-US" dirty="0"/>
           </a:p>
         </p:txBody>
       </p:sp>
@@ -4746,25 +4726,24 @@
           <a:p>
             <a:pPr algn="ctr"/>
             <a:r>
-              <a:rPr lang="en-US" dirty="0" smtClean="0"/>
+              <a:rPr lang="en-US" dirty="0"/>
               <a:t>Client</a:t>
             </a:r>
           </a:p>
           <a:p>
             <a:pPr algn="ctr"/>
             <a:r>
-              <a:rPr lang="en-US" dirty="0" smtClean="0"/>
+              <a:rPr lang="en-US" dirty="0"/>
               <a:t>(</a:t>
             </a:r>
             <a:r>
-              <a:rPr lang="en-US" dirty="0" err="1" smtClean="0"/>
+              <a:rPr lang="en-US" dirty="0" err="1"/>
               <a:t>eg</a:t>
             </a:r>
             <a:r>
-              <a:rPr lang="en-US" dirty="0" smtClean="0"/>
+              <a:rPr lang="en-US" dirty="0"/>
               <a:t>, browser)</a:t>
             </a:r>
-            <a:endParaRPr lang="en-US" dirty="0"/>
           </a:p>
         </p:txBody>
       </p:sp>
@@ -4805,33 +4784,32 @@
           <a:p>
             <a:pPr algn="ctr"/>
             <a:r>
-              <a:rPr lang="en-US" dirty="0" smtClean="0"/>
+              <a:rPr lang="en-US" dirty="0"/>
               <a:t>Your Application</a:t>
             </a:r>
           </a:p>
           <a:p>
             <a:pPr algn="ctr"/>
             <a:r>
-              <a:rPr lang="en-US" dirty="0" smtClean="0"/>
+              <a:rPr lang="en-US" dirty="0"/>
               <a:t>(</a:t>
             </a:r>
             <a:r>
-              <a:rPr lang="en-US" dirty="0" err="1" smtClean="0"/>
+              <a:rPr lang="en-US" dirty="0" err="1"/>
               <a:t>eg</a:t>
             </a:r>
             <a:r>
-              <a:rPr lang="en-US" dirty="0" smtClean="0"/>
+              <a:rPr lang="en-US" dirty="0"/>
               <a:t>, </a:t>
             </a:r>
             <a:r>
-              <a:rPr lang="en-US" dirty="0" err="1" smtClean="0"/>
+              <a:rPr lang="en-US" dirty="0" err="1"/>
               <a:t>SpringBoot</a:t>
             </a:r>
             <a:r>
-              <a:rPr lang="en-US" dirty="0" smtClean="0"/>
+              <a:rPr lang="en-US" dirty="0"/>
               <a:t>)</a:t>
             </a:r>
-            <a:endParaRPr lang="en-US" dirty="0"/>
           </a:p>
         </p:txBody>
       </p:sp>
@@ -4872,33 +4850,32 @@
           <a:p>
             <a:pPr algn="ctr"/>
             <a:r>
-              <a:rPr lang="en-US" dirty="0" smtClean="0"/>
+              <a:rPr lang="en-US" dirty="0"/>
               <a:t>Database Process</a:t>
             </a:r>
           </a:p>
           <a:p>
             <a:pPr algn="ctr"/>
             <a:r>
-              <a:rPr lang="en-US" dirty="0" smtClean="0"/>
+              <a:rPr lang="en-US" dirty="0"/>
               <a:t>(</a:t>
             </a:r>
             <a:r>
-              <a:rPr lang="en-US" dirty="0" err="1" smtClean="0"/>
+              <a:rPr lang="en-US" dirty="0" err="1"/>
               <a:t>eg</a:t>
             </a:r>
             <a:r>
-              <a:rPr lang="en-US" dirty="0" smtClean="0"/>
+              <a:rPr lang="en-US" dirty="0"/>
               <a:t> </a:t>
             </a:r>
             <a:r>
-              <a:rPr lang="en-US" dirty="0" err="1" smtClean="0"/>
+              <a:rPr lang="en-US" dirty="0" err="1"/>
               <a:t>Postgress</a:t>
             </a:r>
             <a:r>
-              <a:rPr lang="en-US" dirty="0" smtClean="0"/>
+              <a:rPr lang="en-US" dirty="0"/>
               <a:t>)</a:t>
             </a:r>
-            <a:endParaRPr lang="en-US" dirty="0"/>
           </a:p>
         </p:txBody>
       </p:sp>
@@ -4939,25 +4916,24 @@
           <a:p>
             <a:pPr algn="ctr"/>
             <a:r>
-              <a:rPr lang="en-US" dirty="0" smtClean="0"/>
+              <a:rPr lang="en-US" dirty="0"/>
               <a:t>Permanent Storage</a:t>
             </a:r>
           </a:p>
           <a:p>
             <a:pPr algn="ctr"/>
             <a:r>
-              <a:rPr lang="en-US" dirty="0" smtClean="0"/>
+              <a:rPr lang="en-US" dirty="0"/>
               <a:t>(</a:t>
             </a:r>
             <a:r>
-              <a:rPr lang="en-US" dirty="0" err="1" smtClean="0"/>
+              <a:rPr lang="en-US" dirty="0" err="1"/>
               <a:t>eg</a:t>
             </a:r>
             <a:r>
-              <a:rPr lang="en-US" dirty="0" smtClean="0"/>
+              <a:rPr lang="en-US" dirty="0"/>
               <a:t>, hard-drive)</a:t>
             </a:r>
-            <a:endParaRPr lang="en-US" dirty="0"/>
           </a:p>
         </p:txBody>
       </p:sp>
@@ -5095,10 +5071,9 @@
           <a:lstStyle/>
           <a:p>
             <a:r>
-              <a:rPr lang="en-US" dirty="0" smtClean="0"/>
+              <a:rPr lang="en-US" dirty="0"/>
               <a:t>HTTP</a:t>
             </a:r>
-            <a:endParaRPr lang="en-US" dirty="0"/>
           </a:p>
         </p:txBody>
       </p:sp>
@@ -5125,10 +5100,9 @@
           <a:lstStyle/>
           <a:p>
             <a:r>
-              <a:rPr lang="en-US" dirty="0" smtClean="0"/>
+              <a:rPr lang="en-US" dirty="0"/>
               <a:t>TCP</a:t>
             </a:r>
-            <a:endParaRPr lang="en-US" dirty="0"/>
           </a:p>
         </p:txBody>
       </p:sp>
@@ -5155,10 +5129,9 @@
           <a:lstStyle/>
           <a:p>
             <a:r>
-              <a:rPr lang="en-US" dirty="0" smtClean="0"/>
+              <a:rPr lang="en-US" dirty="0"/>
               <a:t>OS</a:t>
             </a:r>
-            <a:endParaRPr lang="en-US" dirty="0"/>
           </a:p>
         </p:txBody>
       </p:sp>
@@ -5208,10 +5181,9 @@
           <a:lstStyle/>
           <a:p>
             <a:r>
-              <a:rPr lang="en-US" dirty="0" smtClean="0"/>
+              <a:rPr lang="en-US" dirty="0"/>
               <a:t>Ordering</a:t>
             </a:r>
-            <a:endParaRPr lang="en-US" dirty="0"/>
           </a:p>
         </p:txBody>
       </p:sp>
@@ -5238,31 +5210,30 @@
           <a:lstStyle/>
           <a:p>
             <a:r>
-              <a:rPr lang="en-US" dirty="0" smtClean="0"/>
+              <a:rPr lang="en-US" dirty="0"/>
               <a:t>To iterate over collection of data in deterministic order, data must be sorted, </a:t>
             </a:r>
             <a:r>
-              <a:rPr lang="en-US" dirty="0" err="1" smtClean="0"/>
+              <a:rPr lang="en-US" dirty="0" err="1"/>
               <a:t>eg</a:t>
             </a:r>
             <a:r>
-              <a:rPr lang="en-US" dirty="0" smtClean="0"/>
+              <a:rPr lang="en-US" dirty="0"/>
               <a:t> with ORDER BY in SQL</a:t>
             </a:r>
           </a:p>
           <a:p>
             <a:r>
-              <a:rPr lang="en-US" dirty="0" smtClean="0"/>
+              <a:rPr lang="en-US" dirty="0"/>
               <a:t>Sorting MUST be done on database, and NOT in the application</a:t>
             </a:r>
           </a:p>
           <a:p>
             <a:pPr lvl="1"/>
             <a:r>
-              <a:rPr lang="en-US" dirty="0" smtClean="0"/>
+              <a:rPr lang="en-US" dirty="0"/>
               <a:t>otherwise need to send all data to the application</a:t>
             </a:r>
-            <a:endParaRPr lang="en-US" dirty="0"/>
           </a:p>
         </p:txBody>
       </p:sp>
@@ -5303,25 +5274,24 @@
           <a:p>
             <a:pPr algn="ctr"/>
             <a:r>
-              <a:rPr lang="en-US" dirty="0" smtClean="0"/>
+              <a:rPr lang="en-US" dirty="0"/>
               <a:t>Client</a:t>
             </a:r>
           </a:p>
           <a:p>
             <a:pPr algn="ctr"/>
             <a:r>
-              <a:rPr lang="en-US" dirty="0" smtClean="0"/>
+              <a:rPr lang="en-US" dirty="0"/>
               <a:t>(</a:t>
             </a:r>
             <a:r>
-              <a:rPr lang="en-US" dirty="0" err="1" smtClean="0"/>
+              <a:rPr lang="en-US" dirty="0" err="1"/>
               <a:t>eg</a:t>
             </a:r>
             <a:r>
-              <a:rPr lang="en-US" dirty="0" smtClean="0"/>
+              <a:rPr lang="en-US" dirty="0"/>
               <a:t>, browser)</a:t>
             </a:r>
-            <a:endParaRPr lang="en-US" dirty="0"/>
           </a:p>
         </p:txBody>
       </p:sp>
@@ -5362,33 +5332,32 @@
           <a:p>
             <a:pPr algn="ctr"/>
             <a:r>
-              <a:rPr lang="en-US" dirty="0" smtClean="0"/>
+              <a:rPr lang="en-US" dirty="0"/>
               <a:t>Your Application</a:t>
             </a:r>
           </a:p>
           <a:p>
             <a:pPr algn="ctr"/>
             <a:r>
-              <a:rPr lang="en-US" dirty="0" smtClean="0"/>
+              <a:rPr lang="en-US" dirty="0"/>
               <a:t>(</a:t>
             </a:r>
             <a:r>
-              <a:rPr lang="en-US" dirty="0" err="1" smtClean="0"/>
+              <a:rPr lang="en-US" dirty="0" err="1"/>
               <a:t>eg</a:t>
             </a:r>
             <a:r>
-              <a:rPr lang="en-US" dirty="0" smtClean="0"/>
+              <a:rPr lang="en-US" dirty="0"/>
               <a:t>, </a:t>
             </a:r>
             <a:r>
-              <a:rPr lang="en-US" dirty="0" err="1" smtClean="0"/>
+              <a:rPr lang="en-US" dirty="0" err="1"/>
               <a:t>SpringBoot</a:t>
             </a:r>
             <a:r>
-              <a:rPr lang="en-US" dirty="0" smtClean="0"/>
+              <a:rPr lang="en-US" dirty="0"/>
               <a:t>)</a:t>
             </a:r>
-            <a:endParaRPr lang="en-US" dirty="0"/>
           </a:p>
         </p:txBody>
       </p:sp>
@@ -5429,33 +5398,32 @@
           <a:p>
             <a:pPr algn="ctr"/>
             <a:r>
-              <a:rPr lang="en-US" dirty="0" smtClean="0"/>
+              <a:rPr lang="en-US" dirty="0"/>
               <a:t>Database Process</a:t>
             </a:r>
           </a:p>
           <a:p>
             <a:pPr algn="ctr"/>
             <a:r>
-              <a:rPr lang="en-US" dirty="0" smtClean="0"/>
+              <a:rPr lang="en-US" dirty="0"/>
               <a:t>(</a:t>
             </a:r>
             <a:r>
-              <a:rPr lang="en-US" dirty="0" err="1" smtClean="0"/>
+              <a:rPr lang="en-US" dirty="0" err="1"/>
               <a:t>eg</a:t>
             </a:r>
             <a:r>
-              <a:rPr lang="en-US" dirty="0" smtClean="0"/>
+              <a:rPr lang="en-US" dirty="0"/>
               <a:t> </a:t>
             </a:r>
             <a:r>
-              <a:rPr lang="en-US" dirty="0" err="1" smtClean="0"/>
+              <a:rPr lang="en-US" dirty="0" err="1"/>
               <a:t>Postgress</a:t>
             </a:r>
             <a:r>
-              <a:rPr lang="en-US" dirty="0" smtClean="0"/>
+              <a:rPr lang="en-US" dirty="0"/>
               <a:t>)</a:t>
             </a:r>
-            <a:endParaRPr lang="en-US" dirty="0"/>
           </a:p>
         </p:txBody>
       </p:sp>
@@ -5496,25 +5464,24 @@
           <a:p>
             <a:pPr algn="ctr"/>
             <a:r>
-              <a:rPr lang="en-US" dirty="0" smtClean="0"/>
+              <a:rPr lang="en-US" dirty="0"/>
               <a:t>Permanent Storage</a:t>
             </a:r>
           </a:p>
           <a:p>
             <a:pPr algn="ctr"/>
             <a:r>
-              <a:rPr lang="en-US" dirty="0" smtClean="0"/>
+              <a:rPr lang="en-US" dirty="0"/>
               <a:t>(</a:t>
             </a:r>
             <a:r>
-              <a:rPr lang="en-US" dirty="0" err="1" smtClean="0"/>
+              <a:rPr lang="en-US" dirty="0" err="1"/>
               <a:t>eg</a:t>
             </a:r>
             <a:r>
-              <a:rPr lang="en-US" dirty="0" smtClean="0"/>
+              <a:rPr lang="en-US" dirty="0"/>
               <a:t>, hard-drive)</a:t>
             </a:r>
-            <a:endParaRPr lang="en-US" dirty="0"/>
           </a:p>
         </p:txBody>
       </p:sp>
@@ -5652,10 +5619,9 @@
           <a:lstStyle/>
           <a:p>
             <a:r>
-              <a:rPr lang="en-US" dirty="0" smtClean="0"/>
+              <a:rPr lang="en-US" dirty="0"/>
               <a:t>HTTP</a:t>
             </a:r>
-            <a:endParaRPr lang="en-US" dirty="0"/>
           </a:p>
         </p:txBody>
       </p:sp>
@@ -5682,10 +5648,9 @@
           <a:lstStyle/>
           <a:p>
             <a:r>
-              <a:rPr lang="en-US" dirty="0" smtClean="0"/>
+              <a:rPr lang="en-US" dirty="0"/>
               <a:t>TCP</a:t>
             </a:r>
-            <a:endParaRPr lang="en-US" dirty="0"/>
           </a:p>
         </p:txBody>
       </p:sp>
@@ -5712,10 +5677,9 @@
           <a:lstStyle/>
           <a:p>
             <a:r>
-              <a:rPr lang="en-US" dirty="0" smtClean="0"/>
+              <a:rPr lang="en-US" dirty="0"/>
               <a:t>OS</a:t>
             </a:r>
-            <a:endParaRPr lang="en-US" dirty="0"/>
           </a:p>
         </p:txBody>
       </p:sp>
@@ -5742,10 +5706,9 @@
           <a:lstStyle/>
           <a:p>
             <a:r>
-              <a:rPr lang="en-US" sz="2400" dirty="0" smtClean="0"/>
+              <a:rPr lang="en-US" sz="2400" dirty="0"/>
               <a:t>20</a:t>
             </a:r>
-            <a:endParaRPr lang="en-US" sz="2400" dirty="0"/>
           </a:p>
         </p:txBody>
       </p:sp>
@@ -5772,10 +5735,9 @@
           <a:lstStyle/>
           <a:p>
             <a:r>
-              <a:rPr lang="en-US" sz="2400" dirty="0" smtClean="0"/>
+              <a:rPr lang="en-US" sz="2400" dirty="0"/>
               <a:t>20</a:t>
             </a:r>
-            <a:endParaRPr lang="en-US" sz="2400" dirty="0"/>
           </a:p>
         </p:txBody>
       </p:sp>
@@ -5802,10 +5764,9 @@
           <a:lstStyle/>
           <a:p>
             <a:r>
-              <a:rPr lang="en-US" sz="2400" dirty="0" smtClean="0"/>
+              <a:rPr lang="en-US" sz="2400" dirty="0"/>
               <a:t>100M</a:t>
             </a:r>
-            <a:endParaRPr lang="en-US" sz="2400" dirty="0"/>
           </a:p>
         </p:txBody>
       </p:sp>
@@ -5832,10 +5793,9 @@
           <a:lstStyle/>
           <a:p>
             <a:r>
-              <a:rPr lang="en-US" sz="2400" dirty="0" smtClean="0"/>
+              <a:rPr lang="en-US" sz="2400" dirty="0"/>
               <a:t>SORTING</a:t>
             </a:r>
-            <a:endParaRPr lang="en-US" sz="2400" dirty="0"/>
           </a:p>
         </p:txBody>
       </p:sp>
@@ -5964,7 +5924,7 @@
             </a:r>
           </a:p>
           <a:p>
-            <a:endParaRPr lang="en-US" dirty="0" smtClean="0"/>
+            <a:endParaRPr lang="en-US" dirty="0"/>
           </a:p>
           <a:p>
             <a:r>
@@ -6217,10 +6177,9 @@
           <a:lstStyle/>
           <a:p>
             <a:r>
-              <a:rPr lang="en-US" dirty="0" smtClean="0"/>
+              <a:rPr lang="en-US" dirty="0"/>
               <a:t>Offset Pagination</a:t>
             </a:r>
-            <a:endParaRPr lang="en-US" dirty="0"/>
           </a:p>
         </p:txBody>
       </p:sp>
@@ -6409,10 +6368,9 @@
           <a:lstStyle/>
           <a:p>
             <a:r>
-              <a:rPr lang="en-US" dirty="0" smtClean="0"/>
+              <a:rPr lang="en-US" dirty="0"/>
               <a:t>Offset in SQL</a:t>
             </a:r>
-            <a:endParaRPr lang="en-US" dirty="0"/>
           </a:p>
         </p:txBody>
       </p:sp>
@@ -6439,13 +6397,13 @@
           <a:lstStyle/>
           <a:p>
             <a:r>
-              <a:rPr lang="en-US" dirty="0" smtClean="0"/>
+              <a:rPr lang="en-US" dirty="0"/>
               <a:t>SQL has direct support for OFFSET and LIMIT</a:t>
             </a:r>
           </a:p>
           <a:p>
             <a:r>
-              <a:rPr lang="en-US" dirty="0" err="1" smtClean="0"/>
+              <a:rPr lang="en-US" dirty="0" err="1"/>
               <a:t>Eg</a:t>
             </a:r>
             <a:r>
@@ -6454,18 +6412,14 @@
             </a:r>
             <a:r>
               <a:rPr lang="en-US" i="1" dirty="0"/>
-              <a:t>select * from </a:t>
-            </a:r>
-            <a:r>
-              <a:rPr lang="en-US" i="1" dirty="0" smtClean="0"/>
-              <a:t>News </a:t>
-            </a:r>
-            <a:r>
-              <a:rPr lang="en-US" b="1" i="1" dirty="0" smtClean="0"/>
+              <a:t>select * from News </a:t>
+            </a:r>
+            <a:r>
+              <a:rPr lang="en-US" b="1" i="1" dirty="0"/>
               <a:t>ORDER BY </a:t>
             </a:r>
             <a:r>
-              <a:rPr lang="en-US" i="1" dirty="0" smtClean="0"/>
+              <a:rPr lang="en-US" i="1" dirty="0"/>
               <a:t>id </a:t>
             </a:r>
             <a:r>
@@ -6482,11 +6436,7 @@
             </a:r>
             <a:r>
               <a:rPr lang="en-US" i="1" dirty="0"/>
-              <a:t> </a:t>
-            </a:r>
-            <a:r>
-              <a:rPr lang="en-US" i="1" dirty="0" smtClean="0"/>
-              <a:t>20 </a:t>
+              <a:t> 20 </a:t>
             </a:r>
             <a:r>
               <a:rPr lang="en-US" b="1" i="1" dirty="0"/>
@@ -6494,43 +6444,39 @@
             </a:r>
             <a:r>
               <a:rPr lang="en-US" i="1" dirty="0"/>
-              <a:t> </a:t>
-            </a:r>
-            <a:r>
-              <a:rPr lang="en-US" i="1" dirty="0" smtClean="0"/>
-              <a:t>0</a:t>
-            </a:r>
-          </a:p>
-          <a:p>
-            <a:r>
-              <a:rPr lang="en-US" dirty="0" smtClean="0"/>
+              <a:t> 0</a:t>
+            </a:r>
+          </a:p>
+          <a:p>
+            <a:r>
+              <a:rPr lang="en-US" dirty="0"/>
               <a:t>LIMIT: how many rows to return</a:t>
             </a:r>
           </a:p>
           <a:p>
             <a:r>
-              <a:rPr lang="en-US" dirty="0" smtClean="0"/>
+              <a:rPr lang="en-US" dirty="0"/>
               <a:t>OFFSET: how many rows to skip before returning data</a:t>
             </a:r>
           </a:p>
           <a:p>
             <a:r>
-              <a:rPr lang="en-US" dirty="0" smtClean="0"/>
+              <a:rPr lang="en-US" dirty="0"/>
               <a:t>Page: defined by OFFSET and LIMIT</a:t>
             </a:r>
           </a:p>
           <a:p>
             <a:pPr lvl="1"/>
             <a:r>
-              <a:rPr lang="en-US" dirty="0" smtClean="0"/>
+              <a:rPr lang="en-US" dirty="0"/>
               <a:t>1</a:t>
             </a:r>
             <a:r>
-              <a:rPr lang="en-US" baseline="30000" dirty="0" smtClean="0"/>
+              <a:rPr lang="en-US" baseline="30000" dirty="0"/>
               <a:t>st</a:t>
             </a:r>
             <a:r>
-              <a:rPr lang="en-US" dirty="0" smtClean="0"/>
+              <a:rPr lang="en-US" dirty="0"/>
               <a:t> page: </a:t>
             </a:r>
             <a:r>
@@ -6541,56 +6487,47 @@
           <a:p>
             <a:pPr lvl="1"/>
             <a:r>
-              <a:rPr lang="en-US" dirty="0" smtClean="0"/>
+              <a:rPr lang="en-US" dirty="0"/>
               <a:t>2</a:t>
             </a:r>
             <a:r>
-              <a:rPr lang="en-US" baseline="30000" dirty="0" smtClean="0"/>
+              <a:rPr lang="en-US" baseline="30000" dirty="0"/>
               <a:t>nd</a:t>
             </a:r>
             <a:r>
-              <a:rPr lang="en-US" dirty="0" smtClean="0"/>
+              <a:rPr lang="en-US" dirty="0"/>
               <a:t> page: </a:t>
             </a:r>
             <a:r>
               <a:rPr lang="en-US" i="1" dirty="0"/>
-              <a:t>LIMIT 20 OFFSET </a:t>
-            </a:r>
-            <a:r>
-              <a:rPr lang="en-US" i="1" dirty="0" smtClean="0"/>
-              <a:t>20</a:t>
+              <a:t>LIMIT 20 OFFSET 20</a:t>
             </a:r>
           </a:p>
           <a:p>
             <a:pPr lvl="1"/>
             <a:r>
-              <a:rPr lang="en-US" dirty="0" smtClean="0"/>
+              <a:rPr lang="en-US" dirty="0"/>
               <a:t>3</a:t>
             </a:r>
             <a:r>
-              <a:rPr lang="en-US" baseline="30000" dirty="0" smtClean="0"/>
+              <a:rPr lang="en-US" baseline="30000" dirty="0"/>
               <a:t>rd</a:t>
             </a:r>
             <a:r>
-              <a:rPr lang="en-US" dirty="0" smtClean="0"/>
+              <a:rPr lang="en-US" dirty="0"/>
               <a:t> page: </a:t>
             </a:r>
             <a:r>
               <a:rPr lang="en-US" i="1" dirty="0"/>
-              <a:t>LIMIT 20 OFFSET </a:t>
-            </a:r>
-            <a:r>
-              <a:rPr lang="en-US" i="1" dirty="0" smtClean="0"/>
-              <a:t>40</a:t>
+              <a:t>LIMIT 20 OFFSET 40</a:t>
             </a:r>
           </a:p>
           <a:p>
             <a:pPr lvl="1"/>
             <a:r>
-              <a:rPr lang="en-US" i="1" dirty="0" smtClean="0"/>
+              <a:rPr lang="en-US" i="1" dirty="0"/>
               <a:t>etc.</a:t>
             </a:r>
-            <a:endParaRPr lang="en-US" i="1" dirty="0"/>
           </a:p>
           <a:p>
             <a:pPr lvl="1"/>
@@ -6653,10 +6590,9 @@
           <a:lstStyle/>
           <a:p>
             <a:r>
-              <a:rPr lang="en-US" dirty="0" smtClean="0"/>
+              <a:rPr lang="en-US" dirty="0"/>
               <a:t>Why Inefficient?</a:t>
             </a:r>
-            <a:endParaRPr lang="en-US" dirty="0"/>
           </a:p>
         </p:txBody>
       </p:sp>
@@ -6681,43 +6617,42 @@
           <a:lstStyle/>
           <a:p>
             <a:r>
-              <a:rPr lang="en-US" dirty="0" smtClean="0"/>
+              <a:rPr lang="en-US" dirty="0"/>
               <a:t>To read page N, need to know the previous N-1 pages to skip</a:t>
             </a:r>
           </a:p>
           <a:p>
             <a:r>
-              <a:rPr lang="en-US" dirty="0" smtClean="0"/>
+              <a:rPr lang="en-US" dirty="0"/>
               <a:t>To be able to sort, database has to keep a buffer of size OFFSET+LIMIT (which represent all pages till N)</a:t>
             </a:r>
           </a:p>
           <a:p>
             <a:r>
-              <a:rPr lang="en-US" dirty="0" smtClean="0"/>
+              <a:rPr lang="en-US" dirty="0"/>
               <a:t>Have to read all data (</a:t>
             </a:r>
             <a:r>
-              <a:rPr lang="en-US" dirty="0" err="1" smtClean="0"/>
+              <a:rPr lang="en-US" dirty="0" err="1"/>
               <a:t>eg</a:t>
             </a:r>
             <a:r>
-              <a:rPr lang="en-US" dirty="0" smtClean="0"/>
+              <a:rPr lang="en-US" dirty="0"/>
               <a:t> 100M rows), but for sorting no need to keep in RAM all of that, as at most returning LIMIT rows</a:t>
             </a:r>
           </a:p>
           <a:p>
             <a:r>
-              <a:rPr lang="en-US" dirty="0" smtClean="0"/>
+              <a:rPr lang="en-US" dirty="0"/>
               <a:t>If sorting on descending ID, only need to keep track of highest K=OFFSET+LIMIT ids</a:t>
             </a:r>
           </a:p>
           <a:p>
             <a:pPr lvl="1"/>
             <a:r>
-              <a:rPr lang="en-US" dirty="0" smtClean="0"/>
+              <a:rPr lang="en-US" dirty="0"/>
               <a:t>if when reading new row out of 100m, no need to store it in RAM if id smaller than the smallest in current K buffer</a:t>
             </a:r>
-            <a:endParaRPr lang="en-US" dirty="0"/>
           </a:p>
         </p:txBody>
       </p:sp>
@@ -6758,33 +6693,32 @@
           <a:p>
             <a:pPr algn="ctr"/>
             <a:r>
-              <a:rPr lang="en-US" dirty="0" smtClean="0"/>
+              <a:rPr lang="en-US" dirty="0"/>
               <a:t>Database Process</a:t>
             </a:r>
           </a:p>
           <a:p>
             <a:pPr algn="ctr"/>
             <a:r>
-              <a:rPr lang="en-US" dirty="0" smtClean="0"/>
+              <a:rPr lang="en-US" dirty="0"/>
               <a:t>(</a:t>
             </a:r>
             <a:r>
-              <a:rPr lang="en-US" dirty="0" err="1" smtClean="0"/>
+              <a:rPr lang="en-US" dirty="0" err="1"/>
               <a:t>eg</a:t>
             </a:r>
             <a:r>
-              <a:rPr lang="en-US" dirty="0" smtClean="0"/>
+              <a:rPr lang="en-US" dirty="0"/>
               <a:t> </a:t>
             </a:r>
             <a:r>
-              <a:rPr lang="en-US" dirty="0" err="1" smtClean="0"/>
+              <a:rPr lang="en-US" dirty="0" err="1"/>
               <a:t>Postgress</a:t>
             </a:r>
             <a:r>
-              <a:rPr lang="en-US" dirty="0" smtClean="0"/>
+              <a:rPr lang="en-US" dirty="0"/>
               <a:t>)</a:t>
             </a:r>
-            <a:endParaRPr lang="en-US" dirty="0"/>
           </a:p>
         </p:txBody>
       </p:sp>
@@ -6825,25 +6759,24 @@
           <a:p>
             <a:pPr algn="ctr"/>
             <a:r>
-              <a:rPr lang="en-US" dirty="0" smtClean="0"/>
+              <a:rPr lang="en-US" dirty="0"/>
               <a:t>Permanent Storage</a:t>
             </a:r>
           </a:p>
           <a:p>
             <a:pPr algn="ctr"/>
             <a:r>
-              <a:rPr lang="en-US" dirty="0" smtClean="0"/>
+              <a:rPr lang="en-US" dirty="0"/>
               <a:t>(</a:t>
             </a:r>
             <a:r>
-              <a:rPr lang="en-US" dirty="0" err="1" smtClean="0"/>
+              <a:rPr lang="en-US" dirty="0" err="1"/>
               <a:t>eg</a:t>
             </a:r>
             <a:r>
-              <a:rPr lang="en-US" dirty="0" smtClean="0"/>
+              <a:rPr lang="en-US" dirty="0"/>
               <a:t>, hard-drive)</a:t>
             </a:r>
-            <a:endParaRPr lang="en-US" dirty="0"/>
           </a:p>
         </p:txBody>
       </p:sp>
@@ -6907,10 +6840,9 @@
           <a:lstStyle/>
           <a:p>
             <a:r>
-              <a:rPr lang="en-US" dirty="0" smtClean="0"/>
+              <a:rPr lang="en-US" dirty="0"/>
               <a:t>OS</a:t>
             </a:r>
-            <a:endParaRPr lang="en-US" dirty="0"/>
           </a:p>
         </p:txBody>
       </p:sp>
@@ -6937,10 +6869,9 @@
           <a:lstStyle/>
           <a:p>
             <a:r>
-              <a:rPr lang="en-US" sz="2400" dirty="0" smtClean="0"/>
+              <a:rPr lang="en-US" sz="2400" dirty="0"/>
               <a:t>100M</a:t>
             </a:r>
-            <a:endParaRPr lang="en-US" sz="2400" dirty="0"/>
           </a:p>
         </p:txBody>
       </p:sp>
@@ -6990,10 +6921,9 @@
           <a:lstStyle/>
           <a:p>
             <a:r>
-              <a:rPr lang="en-US" dirty="0" smtClean="0"/>
+              <a:rPr lang="en-US" dirty="0"/>
               <a:t>Reading Pages</a:t>
             </a:r>
-            <a:endParaRPr lang="en-US" dirty="0"/>
           </a:p>
         </p:txBody>
       </p:sp>
@@ -7020,7 +6950,7 @@
           <a:lstStyle/>
           <a:p>
             <a:r>
-              <a:rPr lang="en-US" dirty="0" smtClean="0"/>
+              <a:rPr lang="en-US" dirty="0"/>
               <a:t>First page is fast: only 20 rows in RAM, which are fast to sort</a:t>
             </a:r>
           </a:p>
@@ -7030,104 +6960,99 @@
               <a:t>N</a:t>
             </a:r>
             <a:r>
-              <a:rPr lang="en-US" i="1" dirty="0" smtClean="0"/>
+              <a:rPr lang="en-US" i="1" dirty="0"/>
               <a:t>th</a:t>
             </a:r>
             <a:r>
-              <a:rPr lang="en-US" dirty="0" smtClean="0"/>
+              <a:rPr lang="en-US" dirty="0"/>
               <a:t> page requires a buffer of </a:t>
             </a:r>
             <a:r>
-              <a:rPr lang="en-US" i="1" dirty="0" smtClean="0"/>
+              <a:rPr lang="en-US" i="1" dirty="0"/>
               <a:t>20*N</a:t>
             </a:r>
             <a:r>
-              <a:rPr lang="en-US" dirty="0" smtClean="0"/>
+              <a:rPr lang="en-US" dirty="0"/>
               <a:t>, which needs to be sorted to determine the first </a:t>
             </a:r>
             <a:r>
               <a:rPr lang="en-US" i="1" dirty="0"/>
-              <a:t>N</a:t>
-            </a:r>
-            <a:r>
-              <a:rPr lang="en-US" i="1" dirty="0" smtClean="0"/>
-              <a:t>-1</a:t>
-            </a:r>
-            <a:r>
-              <a:rPr lang="en-US" dirty="0" smtClean="0"/>
+              <a:t>N-1</a:t>
+            </a:r>
+            <a:r>
+              <a:rPr lang="en-US" dirty="0"/>
               <a:t> pages to skip</a:t>
             </a:r>
           </a:p>
           <a:p>
             <a:pPr lvl="1"/>
             <a:r>
-              <a:rPr lang="en-US" dirty="0" smtClean="0"/>
+              <a:rPr lang="en-US" dirty="0"/>
               <a:t>recall that sorting has complexity </a:t>
             </a:r>
             <a:r>
-              <a:rPr lang="en-US" i="1" dirty="0" smtClean="0"/>
+              <a:rPr lang="en-US" i="1" dirty="0"/>
               <a:t>O(n log n)</a:t>
             </a:r>
           </a:p>
           <a:p>
             <a:r>
-              <a:rPr lang="en-US" dirty="0" smtClean="0"/>
+              <a:rPr lang="en-US" dirty="0"/>
               <a:t>Last page? Database (</a:t>
             </a:r>
             <a:r>
-              <a:rPr lang="en-US" dirty="0" err="1" smtClean="0"/>
+              <a:rPr lang="en-US" dirty="0" err="1"/>
               <a:t>eg</a:t>
             </a:r>
             <a:r>
-              <a:rPr lang="en-US" dirty="0" smtClean="0"/>
+              <a:rPr lang="en-US" dirty="0"/>
               <a:t> </a:t>
             </a:r>
             <a:r>
-              <a:rPr lang="en-US" dirty="0" err="1" smtClean="0"/>
+              <a:rPr lang="en-US" dirty="0" err="1"/>
               <a:t>Postgres</a:t>
             </a:r>
             <a:r>
-              <a:rPr lang="en-US" dirty="0" smtClean="0"/>
+              <a:rPr lang="en-US" dirty="0"/>
               <a:t>) has to keep in RAM 100m rows, and sort them, to decide which are the first </a:t>
             </a:r>
             <a:r>
-              <a:rPr lang="en-US" i="1" dirty="0" smtClean="0"/>
+              <a:rPr lang="en-US" i="1" dirty="0"/>
               <a:t>n-1</a:t>
             </a:r>
             <a:r>
-              <a:rPr lang="en-US" dirty="0" smtClean="0"/>
+              <a:rPr lang="en-US" dirty="0"/>
               <a:t> pages to skip</a:t>
             </a:r>
           </a:p>
           <a:p>
             <a:pPr lvl="1"/>
             <a:r>
-              <a:rPr lang="en-US" dirty="0" smtClean="0"/>
+              <a:rPr lang="en-US" dirty="0"/>
               <a:t>if reading first page could take just a few </a:t>
             </a:r>
             <a:r>
-              <a:rPr lang="en-US" i="1" dirty="0" smtClean="0"/>
+              <a:rPr lang="en-US" i="1" dirty="0"/>
               <a:t>milliseconds</a:t>
             </a:r>
             <a:r>
-              <a:rPr lang="en-US" dirty="0" smtClean="0"/>
+              <a:rPr lang="en-US" dirty="0"/>
               <a:t>, reading last page could take </a:t>
             </a:r>
             <a:r>
-              <a:rPr lang="en-US" i="1" dirty="0" smtClean="0"/>
+              <a:rPr lang="en-US" i="1" dirty="0"/>
               <a:t>minutes</a:t>
             </a:r>
             <a:r>
-              <a:rPr lang="en-US" dirty="0" smtClean="0"/>
+              <a:rPr lang="en-US" dirty="0"/>
               <a:t>…</a:t>
             </a:r>
           </a:p>
           <a:p>
             <a:r>
-              <a:rPr lang="en-US" b="1" dirty="0" smtClean="0"/>
+              <a:rPr lang="en-US" b="1" dirty="0"/>
               <a:t>The higher the page number, the slower it will be</a:t>
             </a:r>
-            <a:endParaRPr lang="en-US" b="1" dirty="0"/>
           </a:p>
         </p:txBody>
       </p:sp>
@@ -7177,10 +7102,9 @@
           <a:lstStyle/>
           <a:p>
             <a:r>
-              <a:rPr lang="en-US" dirty="0" smtClean="0"/>
+              <a:rPr lang="en-US" dirty="0"/>
               <a:t>Ex. Reading Page 3</a:t>
             </a:r>
-            <a:endParaRPr lang="en-US" dirty="0"/>
           </a:p>
         </p:txBody>
       </p:sp>
@@ -7207,45 +7131,45 @@
           <a:lstStyle/>
           <a:p>
             <a:r>
-              <a:rPr lang="en-US" dirty="0" smtClean="0"/>
+              <a:rPr lang="en-US" dirty="0"/>
               <a:t>OFFSET=40, LIMIT=20</a:t>
             </a:r>
           </a:p>
           <a:p>
             <a:r>
-              <a:rPr lang="en-US" dirty="0" smtClean="0"/>
+              <a:rPr lang="en-US" dirty="0"/>
               <a:t>Only need a buffer </a:t>
             </a:r>
             <a:r>
-              <a:rPr lang="en-US" i="1" dirty="0" smtClean="0"/>
+              <a:rPr lang="en-US" i="1" dirty="0"/>
               <a:t>B</a:t>
             </a:r>
             <a:r>
-              <a:rPr lang="en-US" dirty="0" smtClean="0"/>
+              <a:rPr lang="en-US" dirty="0"/>
               <a:t> of size 60, and sort 60 elements</a:t>
             </a:r>
           </a:p>
           <a:p>
             <a:r>
-              <a:rPr lang="en-US" dirty="0" smtClean="0"/>
+              <a:rPr lang="en-US" dirty="0"/>
               <a:t>If in current </a:t>
             </a:r>
             <a:r>
-              <a:rPr lang="en-US" i="1" dirty="0" smtClean="0"/>
+              <a:rPr lang="en-US" i="1" dirty="0"/>
               <a:t>B</a:t>
             </a:r>
             <a:r>
-              <a:rPr lang="en-US" dirty="0" smtClean="0"/>
+              <a:rPr lang="en-US" dirty="0"/>
               <a:t> the lowest id is X, then ignore all elements read from storage with id lower than X, as anyway impossible it will be part of the top 60</a:t>
             </a:r>
           </a:p>
           <a:p>
             <a:r>
-              <a:rPr lang="en-US" dirty="0" smtClean="0"/>
+              <a:rPr lang="en-US" dirty="0"/>
               <a:t>Even if returning top 40-59, still need to determine which are the top 0-39 </a:t>
             </a:r>
             <a:r>
-              <a:rPr lang="en-US" dirty="0" smtClean="0">
+              <a:rPr lang="en-US" dirty="0">
                 <a:sym typeface="Wingdings" panose="05000000000000000000" pitchFamily="2" charset="2"/>
               </a:rPr>
               <a:t></a:t>
@@ -7291,33 +7215,32 @@
           <a:p>
             <a:pPr algn="ctr"/>
             <a:r>
-              <a:rPr lang="en-US" dirty="0" smtClean="0"/>
+              <a:rPr lang="en-US" dirty="0"/>
               <a:t>Database Process</a:t>
             </a:r>
           </a:p>
           <a:p>
             <a:pPr algn="ctr"/>
             <a:r>
-              <a:rPr lang="en-US" dirty="0" smtClean="0"/>
+              <a:rPr lang="en-US" dirty="0"/>
               <a:t>(</a:t>
             </a:r>
             <a:r>
-              <a:rPr lang="en-US" dirty="0" err="1" smtClean="0"/>
+              <a:rPr lang="en-US" dirty="0" err="1"/>
               <a:t>eg</a:t>
             </a:r>
             <a:r>
-              <a:rPr lang="en-US" dirty="0" smtClean="0"/>
+              <a:rPr lang="en-US" dirty="0"/>
               <a:t> </a:t>
             </a:r>
             <a:r>
-              <a:rPr lang="en-US" dirty="0" err="1" smtClean="0"/>
+              <a:rPr lang="en-US" dirty="0" err="1"/>
               <a:t>Postgress</a:t>
             </a:r>
             <a:r>
-              <a:rPr lang="en-US" dirty="0" smtClean="0"/>
+              <a:rPr lang="en-US" dirty="0"/>
               <a:t>)</a:t>
             </a:r>
-            <a:endParaRPr lang="en-US" dirty="0"/>
           </a:p>
         </p:txBody>
       </p:sp>
@@ -7358,25 +7281,24 @@
           <a:p>
             <a:pPr algn="ctr"/>
             <a:r>
-              <a:rPr lang="en-US" dirty="0" smtClean="0"/>
+              <a:rPr lang="en-US" dirty="0"/>
               <a:t>Permanent Storage</a:t>
             </a:r>
           </a:p>
           <a:p>
             <a:pPr algn="ctr"/>
             <a:r>
-              <a:rPr lang="en-US" dirty="0" smtClean="0"/>
+              <a:rPr lang="en-US" dirty="0"/>
               <a:t>(</a:t>
             </a:r>
             <a:r>
-              <a:rPr lang="en-US" dirty="0" err="1" smtClean="0"/>
+              <a:rPr lang="en-US" dirty="0" err="1"/>
               <a:t>eg</a:t>
             </a:r>
             <a:r>
-              <a:rPr lang="en-US" dirty="0" smtClean="0"/>
+              <a:rPr lang="en-US" dirty="0"/>
               <a:t>, hard-drive)</a:t>
             </a:r>
-            <a:endParaRPr lang="en-US" dirty="0"/>
           </a:p>
         </p:txBody>
       </p:sp>
@@ -7440,10 +7362,9 @@
           <a:lstStyle/>
           <a:p>
             <a:r>
-              <a:rPr lang="en-US" dirty="0" smtClean="0"/>
+              <a:rPr lang="en-US" dirty="0"/>
               <a:t>OS</a:t>
             </a:r>
-            <a:endParaRPr lang="en-US" dirty="0"/>
           </a:p>
         </p:txBody>
       </p:sp>
@@ -7470,10 +7391,9 @@
           <a:lstStyle/>
           <a:p>
             <a:r>
-              <a:rPr lang="en-US" sz="2400" dirty="0" smtClean="0"/>
+              <a:rPr lang="en-US" sz="2400" dirty="0"/>
               <a:t>100M</a:t>
             </a:r>
-            <a:endParaRPr lang="en-US" sz="2400" dirty="0"/>
           </a:p>
         </p:txBody>
       </p:sp>
@@ -7517,24 +7437,23 @@
                     <a:lstStyle/>
                     <a:p>
                       <a:r>
-                        <a:rPr lang="en-US" dirty="0" smtClean="0"/>
+                        <a:rPr lang="en-US" dirty="0"/>
                         <a:t>Top 0-39 elements</a:t>
                       </a:r>
                     </a:p>
                     <a:p>
                       <a:r>
-                        <a:rPr lang="en-US" dirty="0" smtClean="0"/>
+                        <a:rPr lang="en-US" dirty="0"/>
                         <a:t>(</a:t>
                       </a:r>
                       <a:r>
-                        <a:rPr lang="en-US" dirty="0" err="1" smtClean="0"/>
+                        <a:rPr lang="en-US" dirty="0" err="1"/>
                         <a:t>ie</a:t>
                       </a:r>
                       <a:r>
-                        <a:rPr lang="en-US" dirty="0" smtClean="0"/>
+                        <a:rPr lang="en-US" dirty="0"/>
                         <a:t> page 1 and 2)</a:t>
                       </a:r>
-                      <a:endParaRPr lang="en-US" dirty="0"/>
                     </a:p>
                   </a:txBody>
                   <a:tcPr/>
@@ -7552,24 +7471,23 @@
                     <a:lstStyle/>
                     <a:p>
                       <a:r>
-                        <a:rPr lang="en-US" dirty="0" smtClean="0"/>
+                        <a:rPr lang="en-US" dirty="0"/>
                         <a:t>Top 40-59 elements</a:t>
                       </a:r>
                     </a:p>
                     <a:p>
                       <a:r>
-                        <a:rPr lang="en-US" dirty="0" smtClean="0"/>
+                        <a:rPr lang="en-US" dirty="0"/>
                         <a:t>(</a:t>
                       </a:r>
                       <a:r>
-                        <a:rPr lang="en-US" dirty="0" err="1" smtClean="0"/>
+                        <a:rPr lang="en-US" dirty="0" err="1"/>
                         <a:t>ie</a:t>
                       </a:r>
                       <a:r>
-                        <a:rPr lang="en-US" dirty="0" smtClean="0"/>
+                        <a:rPr lang="en-US" dirty="0"/>
                         <a:t> page 3)</a:t>
                       </a:r>
-                      <a:endParaRPr lang="en-US" dirty="0"/>
                     </a:p>
                   </a:txBody>
                   <a:tcPr/>
@@ -7644,10 +7562,9 @@
           <a:lstStyle/>
           <a:p>
             <a:r>
-              <a:rPr lang="en-US" dirty="0" smtClean="0"/>
+              <a:rPr lang="en-US" dirty="0"/>
               <a:t>RAM</a:t>
             </a:r>
-            <a:endParaRPr lang="en-US" dirty="0"/>
           </a:p>
         </p:txBody>
       </p:sp>
@@ -7704,10 +7621,9 @@
           <a:lstStyle/>
           <a:p>
             <a:r>
-              <a:rPr lang="en-US" dirty="0" smtClean="0"/>
+              <a:rPr lang="en-US" dirty="0"/>
               <a:t>Problem: Database Modifications</a:t>
             </a:r>
-            <a:endParaRPr lang="en-US" dirty="0"/>
           </a:p>
         </p:txBody>
       </p:sp>
@@ -7734,34 +7650,33 @@
           <a:lstStyle/>
           <a:p>
             <a:r>
-              <a:rPr lang="en-US" i="1" dirty="0" smtClean="0"/>
+              <a:rPr lang="en-US" i="1" dirty="0"/>
               <a:t>Question</a:t>
             </a:r>
             <a:r>
-              <a:rPr lang="en-US" dirty="0" smtClean="0"/>
+              <a:rPr lang="en-US" dirty="0"/>
               <a:t>: what if, after reading Page 1, someone else does a DELETE of an element in first page? </a:t>
             </a:r>
           </a:p>
           <a:p>
             <a:r>
-              <a:rPr lang="en-US" i="1" dirty="0" smtClean="0"/>
+              <a:rPr lang="en-US" i="1" dirty="0"/>
               <a:t>Answer</a:t>
             </a:r>
             <a:r>
-              <a:rPr lang="en-US" dirty="0" smtClean="0"/>
+              <a:rPr lang="en-US" dirty="0"/>
               <a:t>: an element will skipped when reading Page 2</a:t>
             </a:r>
           </a:p>
           <a:p>
             <a:r>
-              <a:rPr lang="en-US" dirty="0" err="1" smtClean="0"/>
+              <a:rPr lang="en-US" dirty="0" err="1"/>
               <a:t>Eg</a:t>
             </a:r>
             <a:r>
-              <a:rPr lang="en-US" dirty="0" smtClean="0"/>
+              <a:rPr lang="en-US" dirty="0"/>
               <a:t>, assume page size n=3, and someone removes id 8</a:t>
             </a:r>
-            <a:endParaRPr lang="en-US" dirty="0"/>
           </a:p>
         </p:txBody>
       </p:sp>
@@ -7868,10 +7783,9 @@
                     <a:lstStyle/>
                     <a:p>
                       <a:r>
-                        <a:rPr lang="en-US" dirty="0" smtClean="0"/>
+                        <a:rPr lang="en-US" dirty="0"/>
                         <a:t>9</a:t>
                       </a:r>
-                      <a:endParaRPr lang="en-US" dirty="0"/>
                     </a:p>
                   </a:txBody>
                   <a:tcPr/>
@@ -7882,10 +7796,9 @@
                     <a:lstStyle/>
                     <a:p>
                       <a:r>
-                        <a:rPr lang="en-US" dirty="0" smtClean="0"/>
+                        <a:rPr lang="en-US" dirty="0"/>
                         <a:t>8</a:t>
                       </a:r>
-                      <a:endParaRPr lang="en-US" dirty="0"/>
                     </a:p>
                   </a:txBody>
                   <a:tcPr/>
@@ -7896,10 +7809,9 @@
                     <a:lstStyle/>
                     <a:p>
                       <a:r>
-                        <a:rPr lang="en-US" dirty="0" smtClean="0"/>
+                        <a:rPr lang="en-US" dirty="0"/>
                         <a:t>7</a:t>
                       </a:r>
-                      <a:endParaRPr lang="en-US" dirty="0"/>
                     </a:p>
                   </a:txBody>
                   <a:tcPr/>
@@ -7910,10 +7822,9 @@
                     <a:lstStyle/>
                     <a:p>
                       <a:r>
-                        <a:rPr lang="en-US" dirty="0" smtClean="0"/>
+                        <a:rPr lang="en-US" dirty="0"/>
                         <a:t>6</a:t>
                       </a:r>
-                      <a:endParaRPr lang="en-US" dirty="0"/>
                     </a:p>
                   </a:txBody>
                   <a:tcPr>
@@ -7928,10 +7839,9 @@
                     <a:lstStyle/>
                     <a:p>
                       <a:r>
-                        <a:rPr lang="en-US" dirty="0" smtClean="0"/>
+                        <a:rPr lang="en-US" dirty="0"/>
                         <a:t>5</a:t>
                       </a:r>
-                      <a:endParaRPr lang="en-US" dirty="0"/>
                     </a:p>
                   </a:txBody>
                   <a:tcPr>
@@ -7946,10 +7856,9 @@
                     <a:lstStyle/>
                     <a:p>
                       <a:r>
-                        <a:rPr lang="en-US" dirty="0" smtClean="0"/>
+                        <a:rPr lang="en-US" dirty="0"/>
                         <a:t>4</a:t>
                       </a:r>
-                      <a:endParaRPr lang="en-US" dirty="0"/>
                     </a:p>
                   </a:txBody>
                   <a:tcPr>
@@ -7964,10 +7873,9 @@
                     <a:lstStyle/>
                     <a:p>
                       <a:r>
-                        <a:rPr lang="en-US" dirty="0" smtClean="0"/>
+                        <a:rPr lang="en-US" dirty="0"/>
                         <a:t>3</a:t>
                       </a:r>
-                      <a:endParaRPr lang="en-US" dirty="0"/>
                     </a:p>
                   </a:txBody>
                   <a:tcPr>
@@ -7982,10 +7890,9 @@
                     <a:lstStyle/>
                     <a:p>
                       <a:r>
-                        <a:rPr lang="en-US" dirty="0" smtClean="0"/>
+                        <a:rPr lang="en-US" dirty="0"/>
                         <a:t>2</a:t>
                       </a:r>
-                      <a:endParaRPr lang="en-US" dirty="0"/>
                     </a:p>
                   </a:txBody>
                   <a:tcPr>
@@ -8000,10 +7907,9 @@
                     <a:lstStyle/>
                     <a:p>
                       <a:r>
-                        <a:rPr lang="en-US" dirty="0" smtClean="0"/>
+                        <a:rPr lang="en-US" dirty="0"/>
                         <a:t>1</a:t>
                       </a:r>
-                      <a:endParaRPr lang="en-US" dirty="0"/>
                     </a:p>
                   </a:txBody>
                   <a:tcPr>
@@ -8018,10 +7924,9 @@
                     <a:lstStyle/>
                     <a:p>
                       <a:r>
-                        <a:rPr lang="en-US" dirty="0" smtClean="0"/>
+                        <a:rPr lang="en-US" dirty="0"/>
                         <a:t>0</a:t>
                       </a:r>
-                      <a:endParaRPr lang="en-US" dirty="0"/>
                     </a:p>
                   </a:txBody>
                   <a:tcPr>
@@ -8145,10 +8050,9 @@
                     <a:lstStyle/>
                     <a:p>
                       <a:r>
-                        <a:rPr lang="en-US" dirty="0" smtClean="0"/>
+                        <a:rPr lang="en-US" dirty="0"/>
                         <a:t>9</a:t>
                       </a:r>
-                      <a:endParaRPr lang="en-US" dirty="0"/>
                     </a:p>
                   </a:txBody>
                   <a:tcPr/>
@@ -8159,10 +8063,9 @@
                     <a:lstStyle/>
                     <a:p>
                       <a:r>
-                        <a:rPr lang="en-US" dirty="0" smtClean="0"/>
+                        <a:rPr lang="en-US" dirty="0"/>
                         <a:t>7</a:t>
                       </a:r>
-                      <a:endParaRPr lang="en-US" dirty="0"/>
                     </a:p>
                   </a:txBody>
                   <a:tcPr/>
@@ -8173,10 +8076,9 @@
                     <a:lstStyle/>
                     <a:p>
                       <a:r>
-                        <a:rPr lang="en-US" dirty="0" smtClean="0"/>
+                        <a:rPr lang="en-US" dirty="0"/>
                         <a:t>6</a:t>
                       </a:r>
-                      <a:endParaRPr lang="en-US" dirty="0"/>
                     </a:p>
                   </a:txBody>
                   <a:tcPr/>
@@ -8187,10 +8089,9 @@
                     <a:lstStyle/>
                     <a:p>
                       <a:r>
-                        <a:rPr lang="en-US" dirty="0" smtClean="0"/>
+                        <a:rPr lang="en-US" dirty="0"/>
                         <a:t>5</a:t>
                       </a:r>
-                      <a:endParaRPr lang="en-US" dirty="0"/>
                     </a:p>
                   </a:txBody>
                   <a:tcPr>
@@ -8205,10 +8106,9 @@
                     <a:lstStyle/>
                     <a:p>
                       <a:r>
-                        <a:rPr lang="en-US" dirty="0" smtClean="0"/>
+                        <a:rPr lang="en-US" dirty="0"/>
                         <a:t>4</a:t>
                       </a:r>
-                      <a:endParaRPr lang="en-US" dirty="0"/>
                     </a:p>
                   </a:txBody>
                   <a:tcPr>
@@ -8223,10 +8123,9 @@
                     <a:lstStyle/>
                     <a:p>
                       <a:r>
-                        <a:rPr lang="en-US" dirty="0" smtClean="0"/>
+                        <a:rPr lang="en-US" dirty="0"/>
                         <a:t>3</a:t>
                       </a:r>
-                      <a:endParaRPr lang="en-US" dirty="0"/>
                     </a:p>
                   </a:txBody>
                   <a:tcPr>
@@ -8241,10 +8140,9 @@
                     <a:lstStyle/>
                     <a:p>
                       <a:r>
-                        <a:rPr lang="en-US" dirty="0" smtClean="0"/>
+                        <a:rPr lang="en-US" dirty="0"/>
                         <a:t>2</a:t>
                       </a:r>
-                      <a:endParaRPr lang="en-US" dirty="0"/>
                     </a:p>
                   </a:txBody>
                   <a:tcPr>
@@ -8259,10 +8157,9 @@
                     <a:lstStyle/>
                     <a:p>
                       <a:r>
-                        <a:rPr lang="en-US" dirty="0" smtClean="0"/>
+                        <a:rPr lang="en-US" dirty="0"/>
                         <a:t>1</a:t>
                       </a:r>
-                      <a:endParaRPr lang="en-US" dirty="0"/>
                     </a:p>
                   </a:txBody>
                   <a:tcPr>
@@ -8277,10 +8174,9 @@
                     <a:lstStyle/>
                     <a:p>
                       <a:r>
-                        <a:rPr lang="en-US" dirty="0" smtClean="0"/>
+                        <a:rPr lang="en-US" dirty="0"/>
                         <a:t>0</a:t>
                       </a:r>
-                      <a:endParaRPr lang="en-US" dirty="0"/>
                     </a:p>
                   </a:txBody>
                   <a:tcPr>
@@ -8339,13 +8235,8 @@
           <a:p>
             <a:r>
               <a:rPr lang="en-US" dirty="0"/>
-              <a:t>R</a:t>
-            </a:r>
-            <a:r>
-              <a:rPr lang="en-US" dirty="0" smtClean="0"/>
-              <a:t>eading Page 1: &lt;9,8,7&gt;</a:t>
-            </a:r>
-            <a:endParaRPr lang="en-US" dirty="0"/>
+              <a:t>Reading Page 1: &lt;9,8,7&gt;</a:t>
+            </a:r>
           </a:p>
         </p:txBody>
       </p:sp>
@@ -8372,22 +8263,21 @@
           <a:lstStyle/>
           <a:p>
             <a:r>
-              <a:rPr lang="en-US" dirty="0" smtClean="0"/>
+              <a:rPr lang="en-US" dirty="0"/>
               <a:t>Deleting value 8</a:t>
             </a:r>
           </a:p>
           <a:p>
             <a:r>
-              <a:rPr lang="en-US" dirty="0" smtClean="0"/>
+              <a:rPr lang="en-US" dirty="0"/>
               <a:t>Reading Page 2: &lt;5,4,3&gt;</a:t>
             </a:r>
           </a:p>
           <a:p>
             <a:r>
-              <a:rPr lang="en-US" dirty="0" smtClean="0"/>
+              <a:rPr lang="en-US" dirty="0"/>
               <a:t>Value 6 was skipped…</a:t>
             </a:r>
-            <a:endParaRPr lang="en-US" dirty="0"/>
           </a:p>
         </p:txBody>
       </p:sp>
@@ -8497,10 +8387,9 @@
           <a:lstStyle/>
           <a:p>
             <a:r>
-              <a:rPr lang="en-US" dirty="0" smtClean="0"/>
+              <a:rPr lang="en-US" dirty="0"/>
               <a:t>Page 1</a:t>
             </a:r>
-            <a:endParaRPr lang="en-US" dirty="0"/>
           </a:p>
         </p:txBody>
       </p:sp>
@@ -8527,10 +8416,9 @@
           <a:lstStyle/>
           <a:p>
             <a:r>
-              <a:rPr lang="en-US" dirty="0" smtClean="0"/>
+              <a:rPr lang="en-US" dirty="0"/>
               <a:t>Page 2</a:t>
             </a:r>
-            <a:endParaRPr lang="en-US" dirty="0"/>
           </a:p>
         </p:txBody>
       </p:sp>
@@ -8557,10 +8445,9 @@
           <a:lstStyle/>
           <a:p>
             <a:r>
-              <a:rPr lang="en-US" dirty="0" smtClean="0"/>
+              <a:rPr lang="en-US" dirty="0"/>
               <a:t>Page 3</a:t>
             </a:r>
-            <a:endParaRPr lang="en-US" dirty="0"/>
           </a:p>
         </p:txBody>
       </p:sp>
@@ -8639,26 +8526,14 @@
           <a:lstStyle/>
           <a:p>
             <a:r>
-              <a:rPr lang="en-US" dirty="0" smtClean="0"/>
+              <a:rPr lang="en-US" dirty="0"/>
               <a:t>Database data will be converted into JSON, to send over HTTP to the client</a:t>
             </a:r>
           </a:p>
           <a:p>
             <a:r>
-              <a:rPr lang="en-US" dirty="0" smtClean="0"/>
-              <a:t>To </a:t>
-            </a:r>
-            <a:r>
-              <a:rPr lang="en-US" dirty="0"/>
-              <a:t>access the next/previous pages, </a:t>
-            </a:r>
-            <a:r>
-              <a:rPr lang="en-US" dirty="0" smtClean="0"/>
-              <a:t>client could </a:t>
-            </a:r>
-            <a:r>
-              <a:rPr lang="en-US" dirty="0"/>
-              <a:t>compute the needed offsets/limits</a:t>
+              <a:rPr lang="en-US" dirty="0"/>
+              <a:t>To access the next/previous pages, client could compute the needed offsets/limits</a:t>
             </a:r>
           </a:p>
           <a:p>
@@ -8733,25 +8608,24 @@
           <a:p>
             <a:pPr algn="ctr"/>
             <a:r>
-              <a:rPr lang="en-US" dirty="0" smtClean="0"/>
+              <a:rPr lang="en-US" dirty="0"/>
               <a:t>Client</a:t>
             </a:r>
           </a:p>
           <a:p>
             <a:pPr algn="ctr"/>
             <a:r>
-              <a:rPr lang="en-US" dirty="0" smtClean="0"/>
+              <a:rPr lang="en-US" dirty="0"/>
               <a:t>(</a:t>
             </a:r>
             <a:r>
-              <a:rPr lang="en-US" dirty="0" err="1" smtClean="0"/>
+              <a:rPr lang="en-US" dirty="0" err="1"/>
               <a:t>eg</a:t>
             </a:r>
             <a:r>
-              <a:rPr lang="en-US" dirty="0" smtClean="0"/>
+              <a:rPr lang="en-US" dirty="0"/>
               <a:t>, browser)</a:t>
             </a:r>
-            <a:endParaRPr lang="en-US" dirty="0"/>
           </a:p>
         </p:txBody>
       </p:sp>
@@ -8792,33 +8666,32 @@
           <a:p>
             <a:pPr algn="ctr"/>
             <a:r>
-              <a:rPr lang="en-US" dirty="0" smtClean="0"/>
+              <a:rPr lang="en-US" dirty="0"/>
               <a:t>Your Application</a:t>
             </a:r>
           </a:p>
           <a:p>
             <a:pPr algn="ctr"/>
             <a:r>
-              <a:rPr lang="en-US" dirty="0" smtClean="0"/>
+              <a:rPr lang="en-US" dirty="0"/>
               <a:t>(</a:t>
             </a:r>
             <a:r>
-              <a:rPr lang="en-US" dirty="0" err="1" smtClean="0"/>
+              <a:rPr lang="en-US" dirty="0" err="1"/>
               <a:t>eg</a:t>
             </a:r>
             <a:r>
-              <a:rPr lang="en-US" dirty="0" smtClean="0"/>
+              <a:rPr lang="en-US" dirty="0"/>
               <a:t>, </a:t>
             </a:r>
             <a:r>
-              <a:rPr lang="en-US" dirty="0" err="1" smtClean="0"/>
+              <a:rPr lang="en-US" dirty="0" err="1"/>
               <a:t>SpringBoot</a:t>
             </a:r>
             <a:r>
-              <a:rPr lang="en-US" dirty="0" smtClean="0"/>
+              <a:rPr lang="en-US" dirty="0"/>
               <a:t>)</a:t>
             </a:r>
-            <a:endParaRPr lang="en-US" dirty="0"/>
           </a:p>
         </p:txBody>
       </p:sp>
@@ -8882,10 +8755,9 @@
           <a:lstStyle/>
           <a:p>
             <a:r>
-              <a:rPr lang="en-US" dirty="0" smtClean="0"/>
+              <a:rPr lang="en-US" dirty="0"/>
               <a:t>HTTP</a:t>
             </a:r>
-            <a:endParaRPr lang="en-US" dirty="0"/>
           </a:p>
         </p:txBody>
       </p:sp>
@@ -8912,10 +8784,9 @@
           <a:lstStyle/>
           <a:p>
             <a:r>
-              <a:rPr lang="en-US" sz="2400" dirty="0" smtClean="0"/>
+              <a:rPr lang="en-US" sz="2400" dirty="0"/>
               <a:t>20</a:t>
             </a:r>
-            <a:endParaRPr lang="en-US" sz="2400" dirty="0"/>
           </a:p>
         </p:txBody>
       </p:sp>
@@ -9416,10 +9287,9 @@
           <a:lstStyle/>
           <a:p>
             <a:r>
-              <a:rPr lang="en-US" dirty="0" smtClean="0"/>
+              <a:rPr lang="en-US" dirty="0"/>
               <a:t>Keyset Pagination</a:t>
             </a:r>
-            <a:endParaRPr lang="en-US" dirty="0"/>
           </a:p>
         </p:txBody>
       </p:sp>
@@ -9469,10 +9339,9 @@
           <a:lstStyle/>
           <a:p>
             <a:r>
-              <a:rPr lang="en-US" dirty="0" smtClean="0"/>
+              <a:rPr lang="en-US" dirty="0"/>
               <a:t>Goal: Performance</a:t>
             </a:r>
-            <a:endParaRPr lang="en-US" dirty="0"/>
           </a:p>
         </p:txBody>
       </p:sp>
@@ -9497,27 +9366,26 @@
           <a:lstStyle/>
           <a:p>
             <a:r>
-              <a:rPr lang="en-US" dirty="0" smtClean="0"/>
+              <a:rPr lang="en-US" dirty="0"/>
               <a:t>Given a page of size N, cost of reading it should be constant</a:t>
             </a:r>
           </a:p>
           <a:p>
             <a:pPr lvl="1"/>
             <a:r>
-              <a:rPr lang="en-US" dirty="0" err="1" smtClean="0"/>
+              <a:rPr lang="en-US" dirty="0" err="1"/>
               <a:t>ie</a:t>
             </a:r>
             <a:r>
-              <a:rPr lang="en-US" dirty="0" smtClean="0"/>
+              <a:rPr lang="en-US" dirty="0"/>
               <a:t>, reading last page should not take much, much more time than first</a:t>
             </a:r>
           </a:p>
           <a:p>
             <a:r>
-              <a:rPr lang="en-US" dirty="0" smtClean="0"/>
+              <a:rPr lang="en-US" dirty="0"/>
               <a:t>Deleting items in read pages should not impact the reading of the next pages</a:t>
             </a:r>
-            <a:endParaRPr lang="en-US" dirty="0"/>
           </a:p>
         </p:txBody>
       </p:sp>
@@ -9567,34 +9435,9 @@
           <a:lstStyle/>
           <a:p>
             <a:r>
-              <a:rPr lang="en-US" dirty="0" smtClean="0"/>
-              <a:t>SQL WHERE on </a:t>
-            </a:r>
-            <a:r>
-              <a:rPr lang="en-US" dirty="0"/>
-              <a:t>L</a:t>
-            </a:r>
-            <a:r>
-              <a:rPr lang="en-US" dirty="0" smtClean="0"/>
-              <a:t>ast </a:t>
-            </a:r>
-            <a:r>
-              <a:rPr lang="en-US" dirty="0"/>
-              <a:t>R</a:t>
-            </a:r>
-            <a:r>
-              <a:rPr lang="en-US" dirty="0" smtClean="0"/>
-              <a:t>ead </a:t>
-            </a:r>
-            <a:r>
-              <a:rPr lang="en-US" dirty="0"/>
-              <a:t>I</a:t>
-            </a:r>
-            <a:r>
-              <a:rPr lang="en-US" dirty="0" smtClean="0"/>
-              <a:t>tem</a:t>
-            </a:r>
-            <a:endParaRPr lang="en-US" dirty="0"/>
+              <a:rPr lang="en-US" dirty="0"/>
+              <a:t>SQL WHERE on Last Read Item</a:t>
+            </a:r>
           </a:p>
         </p:txBody>
       </p:sp>
@@ -9621,13 +9464,13 @@
           <a:lstStyle/>
           <a:p>
             <a:r>
-              <a:rPr lang="en-US" dirty="0" smtClean="0"/>
+              <a:rPr lang="en-US" dirty="0"/>
               <a:t>Assume sorting by ID in descending order</a:t>
             </a:r>
           </a:p>
           <a:p>
             <a:r>
-              <a:rPr lang="en-US" dirty="0" smtClean="0"/>
+              <a:rPr lang="en-US" dirty="0"/>
               <a:t>Page 1: </a:t>
             </a:r>
             <a:r>
@@ -9656,16 +9499,12 @@
             </a:r>
             <a:r>
               <a:rPr lang="en-US" i="1" dirty="0"/>
-              <a:t> </a:t>
-            </a:r>
-            <a:r>
-              <a:rPr lang="en-US" i="1" dirty="0" smtClean="0"/>
-              <a:t>3</a:t>
-            </a:r>
-          </a:p>
-          <a:p>
-            <a:r>
-              <a:rPr lang="en-US" dirty="0" smtClean="0"/>
+              <a:t> 3</a:t>
+            </a:r>
+          </a:p>
+          <a:p>
+            <a:r>
+              <a:rPr lang="en-US" dirty="0"/>
               <a:t>Page 2: </a:t>
             </a:r>
             <a:r>
@@ -9694,31 +9533,27 @@
             </a:r>
             <a:r>
               <a:rPr lang="en-US" i="1" dirty="0"/>
-              <a:t> </a:t>
-            </a:r>
-            <a:r>
-              <a:rPr lang="en-US" i="1" dirty="0" smtClean="0"/>
-              <a:t>3 </a:t>
-            </a:r>
-            <a:r>
-              <a:rPr lang="en-US" b="1" i="1" dirty="0" smtClean="0"/>
+              <a:t> 3 </a:t>
+            </a:r>
+            <a:r>
+              <a:rPr lang="en-US" b="1" i="1" dirty="0"/>
               <a:t>WHERE</a:t>
             </a:r>
             <a:r>
-              <a:rPr lang="en-US" i="1" dirty="0" smtClean="0"/>
+              <a:rPr lang="en-US" i="1" dirty="0"/>
               <a:t> id &lt; 7</a:t>
             </a:r>
           </a:p>
           <a:p>
             <a:pPr lvl="1"/>
             <a:r>
-              <a:rPr lang="en-US" dirty="0" smtClean="0"/>
+              <a:rPr lang="en-US" dirty="0"/>
               <a:t>7 is the id of lowest item in previous page</a:t>
             </a:r>
           </a:p>
           <a:p>
             <a:r>
-              <a:rPr lang="en-US" dirty="0" smtClean="0"/>
+              <a:rPr lang="en-US" dirty="0"/>
               <a:t>Page 3: </a:t>
             </a:r>
             <a:r>
@@ -9755,13 +9590,9 @@
             </a:r>
             <a:r>
               <a:rPr lang="en-US" i="1" dirty="0"/>
-              <a:t> id &lt; </a:t>
-            </a:r>
-            <a:r>
-              <a:rPr lang="en-US" i="1" dirty="0" smtClean="0"/>
-              <a:t>4</a:t>
-            </a:r>
-            <a:endParaRPr lang="en-US" dirty="0" smtClean="0"/>
+              <a:t> id &lt; 4</a:t>
+            </a:r>
+            <a:endParaRPr lang="en-US" dirty="0"/>
           </a:p>
           <a:p>
             <a:endParaRPr lang="en-US" i="1" dirty="0"/>
@@ -9770,7 +9601,7 @@
             <a:endParaRPr lang="en-US" dirty="0"/>
           </a:p>
           <a:p>
-            <a:endParaRPr lang="en-US" dirty="0" smtClean="0"/>
+            <a:endParaRPr lang="en-US" dirty="0"/>
           </a:p>
           <a:p>
             <a:endParaRPr lang="en-US" dirty="0"/>
@@ -9880,10 +9711,9 @@
                     <a:lstStyle/>
                     <a:p>
                       <a:r>
-                        <a:rPr lang="en-US" dirty="0" smtClean="0"/>
+                        <a:rPr lang="en-US" dirty="0"/>
                         <a:t>9</a:t>
                       </a:r>
-                      <a:endParaRPr lang="en-US" dirty="0"/>
                     </a:p>
                   </a:txBody>
                   <a:tcPr/>
@@ -9894,10 +9724,9 @@
                     <a:lstStyle/>
                     <a:p>
                       <a:r>
-                        <a:rPr lang="en-US" dirty="0" smtClean="0"/>
+                        <a:rPr lang="en-US" dirty="0"/>
                         <a:t>8</a:t>
                       </a:r>
-                      <a:endParaRPr lang="en-US" dirty="0"/>
                     </a:p>
                   </a:txBody>
                   <a:tcPr/>
@@ -9908,10 +9737,9 @@
                     <a:lstStyle/>
                     <a:p>
                       <a:r>
-                        <a:rPr lang="en-US" dirty="0" smtClean="0"/>
+                        <a:rPr lang="en-US" dirty="0"/>
                         <a:t>7</a:t>
                       </a:r>
-                      <a:endParaRPr lang="en-US" dirty="0"/>
                     </a:p>
                   </a:txBody>
                   <a:tcPr/>
@@ -9922,10 +9750,9 @@
                     <a:lstStyle/>
                     <a:p>
                       <a:r>
-                        <a:rPr lang="en-US" dirty="0" smtClean="0"/>
+                        <a:rPr lang="en-US" dirty="0"/>
                         <a:t>6</a:t>
                       </a:r>
-                      <a:endParaRPr lang="en-US" dirty="0"/>
                     </a:p>
                   </a:txBody>
                   <a:tcPr>
@@ -9940,10 +9767,9 @@
                     <a:lstStyle/>
                     <a:p>
                       <a:r>
-                        <a:rPr lang="en-US" dirty="0" smtClean="0"/>
+                        <a:rPr lang="en-US" dirty="0"/>
                         <a:t>5</a:t>
                       </a:r>
-                      <a:endParaRPr lang="en-US" dirty="0"/>
                     </a:p>
                   </a:txBody>
                   <a:tcPr>
@@ -9958,10 +9784,9 @@
                     <a:lstStyle/>
                     <a:p>
                       <a:r>
-                        <a:rPr lang="en-US" dirty="0" smtClean="0"/>
+                        <a:rPr lang="en-US" dirty="0"/>
                         <a:t>4</a:t>
                       </a:r>
-                      <a:endParaRPr lang="en-US" dirty="0"/>
                     </a:p>
                   </a:txBody>
                   <a:tcPr>
@@ -9976,10 +9801,9 @@
                     <a:lstStyle/>
                     <a:p>
                       <a:r>
-                        <a:rPr lang="en-US" dirty="0" smtClean="0"/>
+                        <a:rPr lang="en-US" dirty="0"/>
                         <a:t>3</a:t>
                       </a:r>
-                      <a:endParaRPr lang="en-US" dirty="0"/>
                     </a:p>
                   </a:txBody>
                   <a:tcPr>
@@ -9994,10 +9818,9 @@
                     <a:lstStyle/>
                     <a:p>
                       <a:r>
-                        <a:rPr lang="en-US" dirty="0" smtClean="0"/>
+                        <a:rPr lang="en-US" dirty="0"/>
                         <a:t>2</a:t>
                       </a:r>
-                      <a:endParaRPr lang="en-US" dirty="0"/>
                     </a:p>
                   </a:txBody>
                   <a:tcPr>
@@ -10012,10 +9835,9 @@
                     <a:lstStyle/>
                     <a:p>
                       <a:r>
-                        <a:rPr lang="en-US" dirty="0" smtClean="0"/>
+                        <a:rPr lang="en-US" dirty="0"/>
                         <a:t>1</a:t>
                       </a:r>
-                      <a:endParaRPr lang="en-US" dirty="0"/>
                     </a:p>
                   </a:txBody>
                   <a:tcPr>
@@ -10030,10 +9852,9 @@
                     <a:lstStyle/>
                     <a:p>
                       <a:r>
-                        <a:rPr lang="en-US" dirty="0" smtClean="0"/>
+                        <a:rPr lang="en-US" dirty="0"/>
                         <a:t>0</a:t>
                       </a:r>
-                      <a:endParaRPr lang="en-US" dirty="0"/>
                     </a:p>
                   </a:txBody>
                   <a:tcPr>
@@ -10077,10 +9898,9 @@
           <a:lstStyle/>
           <a:p>
             <a:r>
-              <a:rPr lang="en-US" dirty="0" smtClean="0"/>
+              <a:rPr lang="en-US" dirty="0"/>
               <a:t>Page 1</a:t>
             </a:r>
-            <a:endParaRPr lang="en-US" dirty="0"/>
           </a:p>
         </p:txBody>
       </p:sp>
@@ -10107,10 +9927,9 @@
           <a:lstStyle/>
           <a:p>
             <a:r>
-              <a:rPr lang="en-US" dirty="0" smtClean="0"/>
+              <a:rPr lang="en-US" dirty="0"/>
               <a:t>Page 2</a:t>
             </a:r>
-            <a:endParaRPr lang="en-US" dirty="0"/>
           </a:p>
         </p:txBody>
       </p:sp>
@@ -10137,10 +9956,9 @@
           <a:lstStyle/>
           <a:p>
             <a:r>
-              <a:rPr lang="en-US" dirty="0" smtClean="0"/>
+              <a:rPr lang="en-US" dirty="0"/>
               <a:t>Page 3</a:t>
             </a:r>
-            <a:endParaRPr lang="en-US" dirty="0"/>
           </a:p>
         </p:txBody>
       </p:sp>
@@ -10190,10 +10008,9 @@
           <a:lstStyle/>
           <a:p>
             <a:r>
-              <a:rPr lang="en-US" dirty="0" smtClean="0"/>
+              <a:rPr lang="en-US" dirty="0"/>
               <a:t>Downside</a:t>
             </a:r>
-            <a:endParaRPr lang="en-US" dirty="0"/>
           </a:p>
         </p:txBody>
       </p:sp>
@@ -10218,50 +10035,49 @@
           <a:lstStyle/>
           <a:p>
             <a:r>
-              <a:rPr lang="en-US" dirty="0" smtClean="0"/>
+              <a:rPr lang="en-US" dirty="0"/>
               <a:t>To read page </a:t>
             </a:r>
             <a:r>
-              <a:rPr lang="en-US" i="1" dirty="0" smtClean="0"/>
+              <a:rPr lang="en-US" i="1" dirty="0"/>
               <a:t>N</a:t>
             </a:r>
             <a:r>
-              <a:rPr lang="en-US" dirty="0" smtClean="0"/>
+              <a:rPr lang="en-US" dirty="0"/>
               <a:t>, we first must read the previous </a:t>
             </a:r>
             <a:r>
-              <a:rPr lang="en-US" i="1" dirty="0" smtClean="0"/>
+              <a:rPr lang="en-US" i="1" dirty="0"/>
               <a:t>N-1</a:t>
             </a:r>
             <a:r>
-              <a:rPr lang="en-US" dirty="0" smtClean="0"/>
+              <a:rPr lang="en-US" dirty="0"/>
               <a:t> pages, to know lowest id of page </a:t>
             </a:r>
             <a:r>
-              <a:rPr lang="en-US" i="1" dirty="0" smtClean="0"/>
+              <a:rPr lang="en-US" i="1" dirty="0"/>
               <a:t>N-1</a:t>
             </a:r>
           </a:p>
           <a:p>
             <a:pPr lvl="1"/>
             <a:r>
-              <a:rPr lang="en-US" dirty="0" smtClean="0"/>
+              <a:rPr lang="en-US" dirty="0"/>
               <a:t>can’t jump directly to a specific page, but no problem if we iterate over them in order</a:t>
             </a:r>
           </a:p>
           <a:p>
             <a:r>
-              <a:rPr lang="en-US" dirty="0" smtClean="0"/>
+              <a:rPr lang="en-US" dirty="0"/>
               <a:t>Need to keep track of last read item</a:t>
             </a:r>
           </a:p>
           <a:p>
             <a:pPr lvl="1"/>
             <a:r>
-              <a:rPr lang="en-US" dirty="0" smtClean="0"/>
+              <a:rPr lang="en-US" dirty="0"/>
               <a:t>all of its columns involved in the ORDER BY, more on this later…</a:t>
             </a:r>
-            <a:endParaRPr lang="en-US" dirty="0"/>
           </a:p>
         </p:txBody>
       </p:sp>
@@ -10311,10 +10127,9 @@
           <a:lstStyle/>
           <a:p>
             <a:r>
-              <a:rPr lang="en-US" dirty="0" smtClean="0"/>
+              <a:rPr lang="en-US" dirty="0"/>
               <a:t>Benefit 1: Performance</a:t>
             </a:r>
-            <a:endParaRPr lang="en-US" dirty="0"/>
           </a:p>
         </p:txBody>
       </p:sp>
@@ -10341,36 +10156,35 @@
           <a:lstStyle/>
           <a:p>
             <a:r>
-              <a:rPr lang="en-US" dirty="0" smtClean="0"/>
+              <a:rPr lang="en-US" dirty="0"/>
               <a:t>Example, N=20, reading Page 501</a:t>
             </a:r>
           </a:p>
           <a:p>
             <a:r>
-              <a:rPr lang="en-US" dirty="0" smtClean="0"/>
+              <a:rPr lang="en-US" dirty="0"/>
               <a:t>Assume read all previous pages, where X is lowest id in Page 500</a:t>
             </a:r>
           </a:p>
           <a:p>
             <a:r>
-              <a:rPr lang="en-US" dirty="0" smtClean="0"/>
+              <a:rPr lang="en-US" dirty="0"/>
               <a:t>Keep buffer B of only size 20</a:t>
             </a:r>
           </a:p>
           <a:p>
             <a:r>
-              <a:rPr lang="en-US" dirty="0" smtClean="0"/>
+              <a:rPr lang="en-US" dirty="0"/>
               <a:t>No need to keep track of top 1-1000, as </a:t>
             </a:r>
             <a:r>
-              <a:rPr lang="en-US" i="1" dirty="0" smtClean="0"/>
+              <a:rPr lang="en-US" i="1" dirty="0"/>
               <a:t>“WHERE id &lt; X”</a:t>
             </a:r>
             <a:r>
-              <a:rPr lang="en-US" dirty="0" smtClean="0"/>
+              <a:rPr lang="en-US" dirty="0"/>
               <a:t> takes care of it</a:t>
             </a:r>
-            <a:endParaRPr lang="en-US" dirty="0"/>
           </a:p>
         </p:txBody>
       </p:sp>
@@ -10411,33 +10225,32 @@
           <a:p>
             <a:pPr algn="ctr"/>
             <a:r>
-              <a:rPr lang="en-US" dirty="0" smtClean="0"/>
+              <a:rPr lang="en-US" dirty="0"/>
               <a:t>Database Process</a:t>
             </a:r>
           </a:p>
           <a:p>
             <a:pPr algn="ctr"/>
             <a:r>
-              <a:rPr lang="en-US" dirty="0" smtClean="0"/>
+              <a:rPr lang="en-US" dirty="0"/>
               <a:t>(</a:t>
             </a:r>
             <a:r>
-              <a:rPr lang="en-US" dirty="0" err="1" smtClean="0"/>
+              <a:rPr lang="en-US" dirty="0" err="1"/>
               <a:t>eg</a:t>
             </a:r>
             <a:r>
-              <a:rPr lang="en-US" dirty="0" smtClean="0"/>
+              <a:rPr lang="en-US" dirty="0"/>
               <a:t> </a:t>
             </a:r>
             <a:r>
-              <a:rPr lang="en-US" dirty="0" err="1" smtClean="0"/>
+              <a:rPr lang="en-US" dirty="0" err="1"/>
               <a:t>Postgress</a:t>
             </a:r>
             <a:r>
-              <a:rPr lang="en-US" dirty="0" smtClean="0"/>
+              <a:rPr lang="en-US" dirty="0"/>
               <a:t>)</a:t>
             </a:r>
-            <a:endParaRPr lang="en-US" dirty="0"/>
           </a:p>
         </p:txBody>
       </p:sp>
@@ -10478,25 +10291,24 @@
           <a:p>
             <a:pPr algn="ctr"/>
             <a:r>
-              <a:rPr lang="en-US" dirty="0" smtClean="0"/>
+              <a:rPr lang="en-US" dirty="0"/>
               <a:t>Permanent Storage</a:t>
             </a:r>
           </a:p>
           <a:p>
             <a:pPr algn="ctr"/>
             <a:r>
-              <a:rPr lang="en-US" dirty="0" smtClean="0"/>
+              <a:rPr lang="en-US" dirty="0"/>
               <a:t>(</a:t>
             </a:r>
             <a:r>
-              <a:rPr lang="en-US" dirty="0" err="1" smtClean="0"/>
+              <a:rPr lang="en-US" dirty="0" err="1"/>
               <a:t>eg</a:t>
             </a:r>
             <a:r>
-              <a:rPr lang="en-US" dirty="0" smtClean="0"/>
+              <a:rPr lang="en-US" dirty="0"/>
               <a:t>, hard-drive)</a:t>
             </a:r>
-            <a:endParaRPr lang="en-US" dirty="0"/>
           </a:p>
         </p:txBody>
       </p:sp>
@@ -10560,10 +10372,9 @@
           <a:lstStyle/>
           <a:p>
             <a:r>
-              <a:rPr lang="en-US" dirty="0" smtClean="0"/>
+              <a:rPr lang="en-US" dirty="0"/>
               <a:t>OS</a:t>
             </a:r>
-            <a:endParaRPr lang="en-US" dirty="0"/>
           </a:p>
         </p:txBody>
       </p:sp>
@@ -10590,10 +10401,9 @@
           <a:lstStyle/>
           <a:p>
             <a:r>
-              <a:rPr lang="en-US" sz="2400" dirty="0" smtClean="0"/>
+              <a:rPr lang="en-US" sz="2400" dirty="0"/>
               <a:t>100M</a:t>
             </a:r>
-            <a:endParaRPr lang="en-US" sz="2400" dirty="0"/>
           </a:p>
         </p:txBody>
       </p:sp>
@@ -10637,41 +10447,31 @@
                     <a:lstStyle/>
                     <a:p>
                       <a:r>
-                        <a:rPr lang="en-US" dirty="0" smtClean="0"/>
-                        <a:t>Top </a:t>
+                        <a:rPr lang="en-US" dirty="0"/>
+                        <a:t>Top 1000-1019</a:t>
                       </a:r>
                       <a:r>
-                        <a:rPr lang="en-US" dirty="0" smtClean="0"/>
-                        <a:t>1000-1019</a:t>
-                      </a:r>
-                      <a:r>
-                        <a:rPr lang="en-US" baseline="0" dirty="0" smtClean="0"/>
+                        <a:rPr lang="en-US" baseline="0" dirty="0"/>
                         <a:t> </a:t>
                       </a:r>
                       <a:r>
-                        <a:rPr lang="en-US" dirty="0" smtClean="0"/>
+                        <a:rPr lang="en-US" dirty="0"/>
                         <a:t>elements</a:t>
                       </a:r>
-                      <a:endParaRPr lang="en-US" dirty="0" smtClean="0"/>
                     </a:p>
                     <a:p>
                       <a:r>
-                        <a:rPr lang="en-US" dirty="0" smtClean="0"/>
+                        <a:rPr lang="en-US" dirty="0"/>
                         <a:t>(</a:t>
                       </a:r>
                       <a:r>
-                        <a:rPr lang="en-US" dirty="0" err="1" smtClean="0"/>
+                        <a:rPr lang="en-US" dirty="0" err="1"/>
                         <a:t>ie</a:t>
                       </a:r>
                       <a:r>
-                        <a:rPr lang="en-US" dirty="0" smtClean="0"/>
-                        <a:t> page </a:t>
+                        <a:rPr lang="en-US" dirty="0"/>
+                        <a:t> page 501)</a:t>
                       </a:r>
-                      <a:r>
-                        <a:rPr lang="en-US" dirty="0" smtClean="0"/>
-                        <a:t>501)</a:t>
-                      </a:r>
-                      <a:endParaRPr lang="en-US" dirty="0"/>
                     </a:p>
                   </a:txBody>
                   <a:tcPr/>
@@ -10746,10 +10546,9 @@
           <a:lstStyle/>
           <a:p>
             <a:r>
-              <a:rPr lang="en-US" dirty="0" smtClean="0"/>
+              <a:rPr lang="en-US" dirty="0"/>
               <a:t>RAM</a:t>
             </a:r>
-            <a:endParaRPr lang="en-US" dirty="0"/>
           </a:p>
         </p:txBody>
       </p:sp>
@@ -10806,10 +10605,9 @@
           <a:lstStyle/>
           <a:p>
             <a:r>
-              <a:rPr lang="en-US" dirty="0" smtClean="0"/>
+              <a:rPr lang="en-US" dirty="0"/>
               <a:t>Benefit 2: Data Consistency</a:t>
             </a:r>
-            <a:endParaRPr lang="en-US" dirty="0"/>
           </a:p>
         </p:txBody>
       </p:sp>
@@ -10836,56 +10634,55 @@
           <a:lstStyle/>
           <a:p>
             <a:r>
-              <a:rPr lang="en-US" i="1" dirty="0" smtClean="0"/>
+              <a:rPr lang="en-US" i="1" dirty="0"/>
               <a:t>Question</a:t>
             </a:r>
             <a:r>
-              <a:rPr lang="en-US" dirty="0" smtClean="0"/>
+              <a:rPr lang="en-US" dirty="0"/>
               <a:t>: what if, after reading Page 1, someone else does a DELETE of an element in first page? </a:t>
             </a:r>
           </a:p>
           <a:p>
             <a:r>
-              <a:rPr lang="en-US" i="1" dirty="0" smtClean="0"/>
+              <a:rPr lang="en-US" i="1" dirty="0"/>
               <a:t>Answer</a:t>
             </a:r>
             <a:r>
-              <a:rPr lang="en-US" dirty="0" smtClean="0"/>
+              <a:rPr lang="en-US" dirty="0"/>
               <a:t>: no problem!</a:t>
             </a:r>
           </a:p>
           <a:p>
             <a:r>
-              <a:rPr lang="en-US" dirty="0" err="1" smtClean="0"/>
+              <a:rPr lang="en-US" dirty="0" err="1"/>
               <a:t>Eg</a:t>
             </a:r>
             <a:r>
-              <a:rPr lang="en-US" dirty="0" smtClean="0"/>
+              <a:rPr lang="en-US" dirty="0"/>
               <a:t>, assume page size </a:t>
             </a:r>
             <a:r>
-              <a:rPr lang="en-US" i="1" dirty="0" smtClean="0"/>
+              <a:rPr lang="en-US" i="1" dirty="0"/>
               <a:t>N=3</a:t>
             </a:r>
             <a:r>
-              <a:rPr lang="en-US" dirty="0" smtClean="0"/>
+              <a:rPr lang="en-US" dirty="0"/>
               <a:t>, and someone removes id 8</a:t>
             </a:r>
           </a:p>
           <a:p>
             <a:r>
-              <a:rPr lang="en-US" dirty="0" smtClean="0"/>
+              <a:rPr lang="en-US" dirty="0"/>
               <a:t>Due to “</a:t>
             </a:r>
             <a:r>
-              <a:rPr lang="en-US" i="1" dirty="0" smtClean="0"/>
+              <a:rPr lang="en-US" i="1" dirty="0"/>
               <a:t>WHERE id &lt; 7</a:t>
             </a:r>
             <a:r>
-              <a:rPr lang="en-US" dirty="0" smtClean="0"/>
+              <a:rPr lang="en-US" dirty="0"/>
               <a:t>”, the value 6 is not skipped when reading Page 2</a:t>
             </a:r>
-            <a:endParaRPr lang="en-US" dirty="0"/>
           </a:p>
         </p:txBody>
       </p:sp>
@@ -10986,10 +10783,9 @@
                     <a:lstStyle/>
                     <a:p>
                       <a:r>
-                        <a:rPr lang="en-US" dirty="0" smtClean="0"/>
+                        <a:rPr lang="en-US" dirty="0"/>
                         <a:t>9</a:t>
                       </a:r>
-                      <a:endParaRPr lang="en-US" dirty="0"/>
                     </a:p>
                   </a:txBody>
                   <a:tcPr/>
@@ -11000,10 +10796,9 @@
                     <a:lstStyle/>
                     <a:p>
                       <a:r>
-                        <a:rPr lang="en-US" dirty="0" smtClean="0"/>
+                        <a:rPr lang="en-US" dirty="0"/>
                         <a:t>8</a:t>
                       </a:r>
-                      <a:endParaRPr lang="en-US" dirty="0"/>
                     </a:p>
                   </a:txBody>
                   <a:tcPr/>
@@ -11014,10 +10809,9 @@
                     <a:lstStyle/>
                     <a:p>
                       <a:r>
-                        <a:rPr lang="en-US" dirty="0" smtClean="0"/>
+                        <a:rPr lang="en-US" dirty="0"/>
                         <a:t>7</a:t>
                       </a:r>
-                      <a:endParaRPr lang="en-US" dirty="0"/>
                     </a:p>
                   </a:txBody>
                   <a:tcPr/>
@@ -11028,10 +10822,9 @@
                     <a:lstStyle/>
                     <a:p>
                       <a:r>
-                        <a:rPr lang="en-US" dirty="0" smtClean="0"/>
+                        <a:rPr lang="en-US" dirty="0"/>
                         <a:t>6</a:t>
                       </a:r>
-                      <a:endParaRPr lang="en-US" dirty="0"/>
                     </a:p>
                   </a:txBody>
                   <a:tcPr>
@@ -11046,10 +10839,9 @@
                     <a:lstStyle/>
                     <a:p>
                       <a:r>
-                        <a:rPr lang="en-US" dirty="0" smtClean="0"/>
+                        <a:rPr lang="en-US" dirty="0"/>
                         <a:t>5</a:t>
                       </a:r>
-                      <a:endParaRPr lang="en-US" dirty="0"/>
                     </a:p>
                   </a:txBody>
                   <a:tcPr>
@@ -11064,10 +10856,9 @@
                     <a:lstStyle/>
                     <a:p>
                       <a:r>
-                        <a:rPr lang="en-US" dirty="0" smtClean="0"/>
+                        <a:rPr lang="en-US" dirty="0"/>
                         <a:t>4</a:t>
                       </a:r>
-                      <a:endParaRPr lang="en-US" dirty="0"/>
                     </a:p>
                   </a:txBody>
                   <a:tcPr>
@@ -11082,10 +10873,9 @@
                     <a:lstStyle/>
                     <a:p>
                       <a:r>
-                        <a:rPr lang="en-US" dirty="0" smtClean="0"/>
+                        <a:rPr lang="en-US" dirty="0"/>
                         <a:t>3</a:t>
                       </a:r>
-                      <a:endParaRPr lang="en-US" dirty="0"/>
                     </a:p>
                   </a:txBody>
                   <a:tcPr>
@@ -11100,10 +10890,9 @@
                     <a:lstStyle/>
                     <a:p>
                       <a:r>
-                        <a:rPr lang="en-US" dirty="0" smtClean="0"/>
+                        <a:rPr lang="en-US" dirty="0"/>
                         <a:t>2</a:t>
                       </a:r>
-                      <a:endParaRPr lang="en-US" dirty="0"/>
                     </a:p>
                   </a:txBody>
                   <a:tcPr>
@@ -11118,10 +10907,9 @@
                     <a:lstStyle/>
                     <a:p>
                       <a:r>
-                        <a:rPr lang="en-US" dirty="0" smtClean="0"/>
+                        <a:rPr lang="en-US" dirty="0"/>
                         <a:t>1</a:t>
                       </a:r>
-                      <a:endParaRPr lang="en-US" dirty="0"/>
                     </a:p>
                   </a:txBody>
                   <a:tcPr>
@@ -11136,10 +10924,9 @@
                     <a:lstStyle/>
                     <a:p>
                       <a:r>
-                        <a:rPr lang="en-US" dirty="0" smtClean="0"/>
+                        <a:rPr lang="en-US" dirty="0"/>
                         <a:t>0</a:t>
                       </a:r>
-                      <a:endParaRPr lang="en-US" dirty="0"/>
                     </a:p>
                   </a:txBody>
                   <a:tcPr>
@@ -11263,10 +11050,9 @@
                     <a:lstStyle/>
                     <a:p>
                       <a:r>
-                        <a:rPr lang="en-US" dirty="0" smtClean="0"/>
+                        <a:rPr lang="en-US" dirty="0"/>
                         <a:t>9</a:t>
                       </a:r>
-                      <a:endParaRPr lang="en-US" dirty="0"/>
                     </a:p>
                   </a:txBody>
                   <a:tcPr/>
@@ -11277,10 +11063,9 @@
                     <a:lstStyle/>
                     <a:p>
                       <a:r>
-                        <a:rPr lang="en-US" dirty="0" smtClean="0"/>
+                        <a:rPr lang="en-US" dirty="0"/>
                         <a:t>7</a:t>
                       </a:r>
-                      <a:endParaRPr lang="en-US" dirty="0"/>
                     </a:p>
                   </a:txBody>
                   <a:tcPr/>
@@ -11291,10 +11076,9 @@
                     <a:lstStyle/>
                     <a:p>
                       <a:r>
-                        <a:rPr lang="en-US" dirty="0" smtClean="0"/>
+                        <a:rPr lang="en-US" dirty="0"/>
                         <a:t>6</a:t>
                       </a:r>
-                      <a:endParaRPr lang="en-US" dirty="0"/>
                     </a:p>
                   </a:txBody>
                   <a:tcPr>
@@ -11309,10 +11093,9 @@
                     <a:lstStyle/>
                     <a:p>
                       <a:r>
-                        <a:rPr lang="en-US" dirty="0" smtClean="0"/>
+                        <a:rPr lang="en-US" dirty="0"/>
                         <a:t>5</a:t>
                       </a:r>
-                      <a:endParaRPr lang="en-US" dirty="0"/>
                     </a:p>
                   </a:txBody>
                   <a:tcPr>
@@ -11327,10 +11110,9 @@
                     <a:lstStyle/>
                     <a:p>
                       <a:r>
-                        <a:rPr lang="en-US" dirty="0" smtClean="0"/>
+                        <a:rPr lang="en-US" dirty="0"/>
                         <a:t>4</a:t>
                       </a:r>
-                      <a:endParaRPr lang="en-US" dirty="0"/>
                     </a:p>
                   </a:txBody>
                   <a:tcPr>
@@ -11345,10 +11127,9 @@
                     <a:lstStyle/>
                     <a:p>
                       <a:r>
-                        <a:rPr lang="en-US" dirty="0" smtClean="0"/>
+                        <a:rPr lang="en-US" dirty="0"/>
                         <a:t>3</a:t>
                       </a:r>
-                      <a:endParaRPr lang="en-US" dirty="0"/>
                     </a:p>
                   </a:txBody>
                   <a:tcPr>
@@ -11363,10 +11144,9 @@
                     <a:lstStyle/>
                     <a:p>
                       <a:r>
-                        <a:rPr lang="en-US" dirty="0" smtClean="0"/>
+                        <a:rPr lang="en-US" dirty="0"/>
                         <a:t>2</a:t>
                       </a:r>
-                      <a:endParaRPr lang="en-US" dirty="0"/>
                     </a:p>
                   </a:txBody>
                   <a:tcPr>
@@ -11381,10 +11161,9 @@
                     <a:lstStyle/>
                     <a:p>
                       <a:r>
-                        <a:rPr lang="en-US" dirty="0" smtClean="0"/>
+                        <a:rPr lang="en-US" dirty="0"/>
                         <a:t>1</a:t>
                       </a:r>
-                      <a:endParaRPr lang="en-US" dirty="0"/>
                     </a:p>
                   </a:txBody>
                   <a:tcPr>
@@ -11399,10 +11178,9 @@
                     <a:lstStyle/>
                     <a:p>
                       <a:r>
-                        <a:rPr lang="en-US" dirty="0" smtClean="0"/>
+                        <a:rPr lang="en-US" dirty="0"/>
                         <a:t>0</a:t>
                       </a:r>
-                      <a:endParaRPr lang="en-US" dirty="0"/>
                     </a:p>
                   </a:txBody>
                   <a:tcPr>
@@ -11463,13 +11241,8 @@
           <a:p>
             <a:r>
               <a:rPr lang="en-US" dirty="0"/>
-              <a:t>R</a:t>
-            </a:r>
-            <a:r>
-              <a:rPr lang="en-US" dirty="0" smtClean="0"/>
-              <a:t>eading Page 1: &lt;9,8,7&gt;</a:t>
-            </a:r>
-            <a:endParaRPr lang="en-US" dirty="0"/>
+              <a:t>Reading Page 1: &lt;9,8,7&gt;</a:t>
+            </a:r>
           </a:p>
         </p:txBody>
       </p:sp>
@@ -11496,22 +11269,21 @@
           <a:lstStyle/>
           <a:p>
             <a:r>
-              <a:rPr lang="en-US" dirty="0" smtClean="0"/>
+              <a:rPr lang="en-US" dirty="0"/>
               <a:t>Deleting value 8</a:t>
             </a:r>
           </a:p>
           <a:p>
             <a:r>
-              <a:rPr lang="en-US" dirty="0" smtClean="0"/>
+              <a:rPr lang="en-US" dirty="0"/>
               <a:t>Reading Page 2: &lt;6,5,4&gt;</a:t>
             </a:r>
           </a:p>
           <a:p>
             <a:r>
-              <a:rPr lang="en-US" dirty="0" smtClean="0"/>
+              <a:rPr lang="en-US" dirty="0"/>
               <a:t>Value 6 is NOT skipped…</a:t>
             </a:r>
-            <a:endParaRPr lang="en-US" dirty="0"/>
           </a:p>
         </p:txBody>
       </p:sp>
@@ -11581,10 +11353,9 @@
           <a:lstStyle/>
           <a:p>
             <a:r>
-              <a:rPr lang="en-US" dirty="0" smtClean="0"/>
+              <a:rPr lang="en-US" dirty="0"/>
               <a:t>Page 1</a:t>
             </a:r>
-            <a:endParaRPr lang="en-US" dirty="0"/>
           </a:p>
         </p:txBody>
       </p:sp>
@@ -11611,10 +11382,9 @@
           <a:lstStyle/>
           <a:p>
             <a:r>
-              <a:rPr lang="en-US" dirty="0" smtClean="0"/>
+              <a:rPr lang="en-US" dirty="0"/>
               <a:t>Page 2</a:t>
             </a:r>
-            <a:endParaRPr lang="en-US" dirty="0"/>
           </a:p>
         </p:txBody>
       </p:sp>
@@ -11641,10 +11411,9 @@
           <a:lstStyle/>
           <a:p>
             <a:r>
-              <a:rPr lang="en-US" dirty="0" smtClean="0"/>
+              <a:rPr lang="en-US" dirty="0"/>
               <a:t>Page 3</a:t>
             </a:r>
-            <a:endParaRPr lang="en-US" dirty="0"/>
           </a:p>
         </p:txBody>
       </p:sp>
@@ -11671,10 +11440,9 @@
           <a:lstStyle/>
           <a:p>
             <a:r>
-              <a:rPr lang="en-US" dirty="0" smtClean="0"/>
+              <a:rPr lang="en-US" dirty="0"/>
               <a:t>Page 2</a:t>
             </a:r>
-            <a:endParaRPr lang="en-US" dirty="0"/>
           </a:p>
         </p:txBody>
       </p:sp>
@@ -11701,10 +11469,9 @@
           <a:lstStyle/>
           <a:p>
             <a:r>
-              <a:rPr lang="en-US" dirty="0" smtClean="0"/>
+              <a:rPr lang="en-US" dirty="0"/>
               <a:t>Page 3</a:t>
             </a:r>
-            <a:endParaRPr lang="en-US" dirty="0"/>
           </a:p>
         </p:txBody>
       </p:sp>
@@ -11754,10 +11521,9 @@
           <a:lstStyle/>
           <a:p>
             <a:r>
-              <a:rPr lang="en-US" dirty="0" smtClean="0"/>
+              <a:rPr lang="en-US" dirty="0"/>
               <a:t>Multi-Column Ordering</a:t>
             </a:r>
-            <a:endParaRPr lang="en-US" dirty="0"/>
           </a:p>
         </p:txBody>
       </p:sp>
@@ -11784,83 +11550,82 @@
           <a:lstStyle/>
           <a:p>
             <a:r>
-              <a:rPr lang="en-US" dirty="0" smtClean="0"/>
+              <a:rPr lang="en-US" dirty="0"/>
               <a:t>There might be different ways to order data</a:t>
             </a:r>
           </a:p>
           <a:p>
             <a:pPr lvl="1"/>
             <a:r>
-              <a:rPr lang="en-US" dirty="0" err="1" smtClean="0"/>
+              <a:rPr lang="en-US" dirty="0" err="1"/>
               <a:t>eg</a:t>
             </a:r>
             <a:r>
-              <a:rPr lang="en-US" dirty="0" smtClean="0"/>
+              <a:rPr lang="en-US" dirty="0"/>
               <a:t>, posts in a discussion forum sorted in chronological order</a:t>
             </a:r>
           </a:p>
           <a:p>
             <a:r>
-              <a:rPr lang="en-US" dirty="0" smtClean="0"/>
+              <a:rPr lang="en-US" dirty="0"/>
               <a:t>Ordering MUST be </a:t>
             </a:r>
             <a:r>
-              <a:rPr lang="en-US" i="1" dirty="0" smtClean="0"/>
+              <a:rPr lang="en-US" i="1" dirty="0"/>
               <a:t>deterministic</a:t>
             </a:r>
             <a:r>
-              <a:rPr lang="en-US" dirty="0" smtClean="0"/>
+              <a:rPr lang="en-US" dirty="0"/>
               <a:t> and </a:t>
             </a:r>
             <a:r>
-              <a:rPr lang="en-US" i="1" dirty="0" smtClean="0"/>
+              <a:rPr lang="en-US" i="1" dirty="0"/>
               <a:t>strict</a:t>
             </a:r>
           </a:p>
           <a:p>
             <a:pPr lvl="1"/>
             <a:r>
-              <a:rPr lang="en-US" dirty="0" smtClean="0"/>
+              <a:rPr lang="en-US" dirty="0"/>
               <a:t>no 2 elements must be equal for the ordering relations</a:t>
             </a:r>
           </a:p>
           <a:p>
             <a:pPr lvl="1"/>
             <a:r>
-              <a:rPr lang="en-US" dirty="0" smtClean="0"/>
+              <a:rPr lang="en-US" dirty="0"/>
               <a:t>otherwise, multiple SELECTs on different pages could give inconsistent results if the actual returned values are in different order when equivalent</a:t>
             </a:r>
           </a:p>
           <a:p>
             <a:r>
-              <a:rPr lang="en-US" dirty="0" smtClean="0"/>
+              <a:rPr lang="en-US" dirty="0"/>
               <a:t>Given some properties (</a:t>
             </a:r>
             <a:r>
-              <a:rPr lang="en-US" dirty="0" err="1" smtClean="0"/>
+              <a:rPr lang="en-US" dirty="0" err="1"/>
               <a:t>eg</a:t>
             </a:r>
             <a:r>
-              <a:rPr lang="en-US" dirty="0" smtClean="0"/>
+              <a:rPr lang="en-US" dirty="0"/>
               <a:t> Time) which do not guarantee strictness (</a:t>
             </a:r>
             <a:r>
-              <a:rPr lang="en-US" dirty="0" err="1" smtClean="0"/>
+              <a:rPr lang="en-US" dirty="0" err="1"/>
               <a:t>ie</a:t>
             </a:r>
             <a:r>
-              <a:rPr lang="en-US" dirty="0" smtClean="0"/>
+              <a:rPr lang="en-US" dirty="0"/>
               <a:t> 2 or more elements with same value), can sort by a unique second parameter (</a:t>
             </a:r>
             <a:r>
-              <a:rPr lang="en-US" dirty="0" err="1" smtClean="0"/>
+              <a:rPr lang="en-US" dirty="0" err="1"/>
               <a:t>eg</a:t>
             </a:r>
             <a:r>
-              <a:rPr lang="en-US" dirty="0" smtClean="0"/>
+              <a:rPr lang="en-US" dirty="0"/>
               <a:t>, the primary key) when ties</a:t>
             </a:r>
-            <a:endParaRPr lang="en-US" dirty="0"/>
           </a:p>
         </p:txBody>
       </p:sp>
@@ -11915,10 +11680,9 @@
           <a:lstStyle/>
           <a:p>
             <a:r>
-              <a:rPr lang="en-US" dirty="0" smtClean="0"/>
+              <a:rPr lang="en-US" dirty="0"/>
               <a:t>Example</a:t>
             </a:r>
-            <a:endParaRPr lang="en-US" dirty="0"/>
           </a:p>
         </p:txBody>
       </p:sp>
@@ -11945,45 +11709,44 @@
           <a:lstStyle/>
           <a:p>
             <a:r>
-              <a:rPr lang="en-US" dirty="0" smtClean="0"/>
+              <a:rPr lang="en-US" dirty="0"/>
               <a:t>Books sorted only by YEAR in the ORDER BY</a:t>
             </a:r>
           </a:p>
           <a:p>
             <a:r>
-              <a:rPr lang="en-US" dirty="0" smtClean="0"/>
+              <a:rPr lang="en-US" dirty="0"/>
               <a:t>Asking for first page twice could give 2 totally different sets</a:t>
             </a:r>
           </a:p>
           <a:p>
             <a:pPr lvl="1"/>
             <a:r>
-              <a:rPr lang="en-US" dirty="0" smtClean="0"/>
+              <a:rPr lang="en-US" dirty="0"/>
               <a:t>reading 2</a:t>
             </a:r>
             <a:r>
-              <a:rPr lang="en-US" baseline="30000" dirty="0" smtClean="0"/>
+              <a:rPr lang="en-US" baseline="30000" dirty="0"/>
               <a:t>nd</a:t>
             </a:r>
             <a:r>
-              <a:rPr lang="en-US" dirty="0" smtClean="0"/>
+              <a:rPr lang="en-US" dirty="0"/>
               <a:t> page then could lead to re-read some rows while skipping some others</a:t>
             </a:r>
           </a:p>
           <a:p>
             <a:r>
-              <a:rPr lang="en-US" i="1" dirty="0" smtClean="0"/>
+              <a:rPr lang="en-US" i="1" dirty="0"/>
               <a:t>SELECT * from Book order by YEAR </a:t>
             </a:r>
             <a:r>
-              <a:rPr lang="en-US" i="1" dirty="0" err="1" smtClean="0"/>
+              <a:rPr lang="en-US" i="1" dirty="0" err="1"/>
               <a:t>desc</a:t>
             </a:r>
             <a:r>
-              <a:rPr lang="en-US" i="1" dirty="0" smtClean="0"/>
+              <a:rPr lang="en-US" i="1" dirty="0"/>
               <a:t> limit 3</a:t>
             </a:r>
-            <a:endParaRPr lang="en-US" i="1" dirty="0"/>
           </a:p>
         </p:txBody>
       </p:sp>
@@ -12034,10 +11797,9 @@
                     <a:lstStyle/>
                     <a:p>
                       <a:r>
-                        <a:rPr lang="en-US" dirty="0" smtClean="0"/>
+                        <a:rPr lang="en-US" dirty="0"/>
                         <a:t>YEAR</a:t>
                       </a:r>
-                      <a:endParaRPr lang="en-US" dirty="0"/>
                     </a:p>
                   </a:txBody>
                   <a:tcPr/>
@@ -12048,10 +11810,9 @@
                     <a:lstStyle/>
                     <a:p>
                       <a:r>
-                        <a:rPr lang="en-US" dirty="0" smtClean="0"/>
+                        <a:rPr lang="en-US" dirty="0"/>
                         <a:t>ID</a:t>
                       </a:r>
-                      <a:endParaRPr lang="en-US" dirty="0"/>
                     </a:p>
                   </a:txBody>
                   <a:tcPr/>
@@ -12069,10 +11830,9 @@
                     <a:lstStyle/>
                     <a:p>
                       <a:r>
-                        <a:rPr lang="en-US" dirty="0" smtClean="0"/>
+                        <a:rPr lang="en-US" dirty="0"/>
                         <a:t>2019</a:t>
                       </a:r>
-                      <a:endParaRPr lang="en-US" dirty="0"/>
                     </a:p>
                   </a:txBody>
                   <a:tcPr/>
@@ -12083,10 +11843,9 @@
                     <a:lstStyle/>
                     <a:p>
                       <a:r>
-                        <a:rPr lang="en-US" dirty="0" smtClean="0"/>
+                        <a:rPr lang="en-US" dirty="0"/>
                         <a:t>3</a:t>
                       </a:r>
-                      <a:endParaRPr lang="en-US" dirty="0"/>
                     </a:p>
                   </a:txBody>
                   <a:tcPr/>
@@ -12104,10 +11863,9 @@
                     <a:lstStyle/>
                     <a:p>
                       <a:r>
-                        <a:rPr lang="en-US" dirty="0" smtClean="0"/>
+                        <a:rPr lang="en-US" dirty="0"/>
                         <a:t>2019</a:t>
                       </a:r>
-                      <a:endParaRPr lang="en-US" dirty="0"/>
                     </a:p>
                   </a:txBody>
                   <a:tcPr/>
@@ -12118,10 +11876,9 @@
                     <a:lstStyle/>
                     <a:p>
                       <a:r>
-                        <a:rPr lang="en-US" dirty="0" smtClean="0"/>
+                        <a:rPr lang="en-US" dirty="0"/>
                         <a:t>5</a:t>
                       </a:r>
-                      <a:endParaRPr lang="en-US" dirty="0"/>
                     </a:p>
                   </a:txBody>
                   <a:tcPr/>
@@ -12139,10 +11896,9 @@
                     <a:lstStyle/>
                     <a:p>
                       <a:r>
-                        <a:rPr lang="en-US" dirty="0" smtClean="0"/>
+                        <a:rPr lang="en-US" dirty="0"/>
                         <a:t>2019</a:t>
                       </a:r>
-                      <a:endParaRPr lang="en-US" dirty="0"/>
                     </a:p>
                   </a:txBody>
                   <a:tcPr/>
@@ -12153,10 +11909,9 @@
                     <a:lstStyle/>
                     <a:p>
                       <a:r>
-                        <a:rPr lang="en-US" dirty="0" smtClean="0"/>
+                        <a:rPr lang="en-US" dirty="0"/>
                         <a:t>1</a:t>
                       </a:r>
-                      <a:endParaRPr lang="en-US" dirty="0"/>
                     </a:p>
                   </a:txBody>
                   <a:tcPr/>
@@ -12174,10 +11929,9 @@
                     <a:lstStyle/>
                     <a:p>
                       <a:r>
-                        <a:rPr lang="en-US" dirty="0" smtClean="0"/>
+                        <a:rPr lang="en-US" dirty="0"/>
                         <a:t>2019</a:t>
                       </a:r>
-                      <a:endParaRPr lang="en-US" dirty="0"/>
                     </a:p>
                   </a:txBody>
                   <a:tcPr/>
@@ -12188,10 +11942,9 @@
                     <a:lstStyle/>
                     <a:p>
                       <a:r>
-                        <a:rPr lang="en-US" dirty="0" smtClean="0"/>
+                        <a:rPr lang="en-US" dirty="0"/>
                         <a:t>7</a:t>
                       </a:r>
-                      <a:endParaRPr lang="en-US" dirty="0"/>
                     </a:p>
                   </a:txBody>
                   <a:tcPr/>
@@ -12209,10 +11962,9 @@
                     <a:lstStyle/>
                     <a:p>
                       <a:r>
-                        <a:rPr lang="en-US" dirty="0" smtClean="0"/>
+                        <a:rPr lang="en-US" dirty="0"/>
                         <a:t>1969</a:t>
                       </a:r>
-                      <a:endParaRPr lang="en-US" dirty="0"/>
                     </a:p>
                   </a:txBody>
                   <a:tcPr/>
@@ -12223,10 +11975,9 @@
                     <a:lstStyle/>
                     <a:p>
                       <a:r>
-                        <a:rPr lang="en-US" dirty="0" smtClean="0"/>
+                        <a:rPr lang="en-US" dirty="0"/>
                         <a:t>9</a:t>
                       </a:r>
-                      <a:endParaRPr lang="en-US" dirty="0"/>
                     </a:p>
                   </a:txBody>
                   <a:tcPr/>
@@ -12288,10 +12039,9 @@
                     <a:lstStyle/>
                     <a:p>
                       <a:r>
-                        <a:rPr lang="en-US" dirty="0" smtClean="0"/>
+                        <a:rPr lang="en-US" dirty="0"/>
                         <a:t>YEAR</a:t>
                       </a:r>
-                      <a:endParaRPr lang="en-US" dirty="0"/>
                     </a:p>
                   </a:txBody>
                   <a:tcPr/>
@@ -12302,10 +12052,9 @@
                     <a:lstStyle/>
                     <a:p>
                       <a:r>
-                        <a:rPr lang="en-US" dirty="0" smtClean="0"/>
+                        <a:rPr lang="en-US" dirty="0"/>
                         <a:t>ID</a:t>
                       </a:r>
-                      <a:endParaRPr lang="en-US" dirty="0"/>
                     </a:p>
                   </a:txBody>
                   <a:tcPr/>
@@ -12323,10 +12072,9 @@
                     <a:lstStyle/>
                     <a:p>
                       <a:r>
-                        <a:rPr lang="en-US" dirty="0" smtClean="0"/>
+                        <a:rPr lang="en-US" dirty="0"/>
                         <a:t>2019</a:t>
                       </a:r>
-                      <a:endParaRPr lang="en-US" dirty="0"/>
                     </a:p>
                   </a:txBody>
                   <a:tcPr/>
@@ -12337,10 +12085,9 @@
                     <a:lstStyle/>
                     <a:p>
                       <a:r>
-                        <a:rPr lang="en-US" dirty="0" smtClean="0"/>
+                        <a:rPr lang="en-US" dirty="0"/>
                         <a:t>1</a:t>
                       </a:r>
-                      <a:endParaRPr lang="en-US" dirty="0"/>
                     </a:p>
                   </a:txBody>
                   <a:tcPr/>
@@ -12358,10 +12105,9 @@
                     <a:lstStyle/>
                     <a:p>
                       <a:r>
-                        <a:rPr lang="en-US" dirty="0" smtClean="0"/>
+                        <a:rPr lang="en-US" dirty="0"/>
                         <a:t>2019</a:t>
                       </a:r>
-                      <a:endParaRPr lang="en-US" dirty="0"/>
                     </a:p>
                   </a:txBody>
                   <a:tcPr/>
@@ -12372,10 +12118,9 @@
                     <a:lstStyle/>
                     <a:p>
                       <a:r>
-                        <a:rPr lang="en-US" dirty="0" smtClean="0"/>
+                        <a:rPr lang="en-US" dirty="0"/>
                         <a:t>5</a:t>
                       </a:r>
-                      <a:endParaRPr lang="en-US" dirty="0"/>
                     </a:p>
                   </a:txBody>
                   <a:tcPr/>
@@ -12393,10 +12138,9 @@
                     <a:lstStyle/>
                     <a:p>
                       <a:r>
-                        <a:rPr lang="en-US" dirty="0" smtClean="0"/>
+                        <a:rPr lang="en-US" dirty="0"/>
                         <a:t>2019</a:t>
                       </a:r>
-                      <a:endParaRPr lang="en-US" dirty="0"/>
                     </a:p>
                   </a:txBody>
                   <a:tcPr/>
@@ -12407,10 +12151,9 @@
                     <a:lstStyle/>
                     <a:p>
                       <a:r>
-                        <a:rPr lang="en-US" dirty="0" smtClean="0"/>
+                        <a:rPr lang="en-US" dirty="0"/>
                         <a:t>3</a:t>
                       </a:r>
-                      <a:endParaRPr lang="en-US" dirty="0"/>
                     </a:p>
                   </a:txBody>
                   <a:tcPr/>
@@ -12472,10 +12215,9 @@
                     <a:lstStyle/>
                     <a:p>
                       <a:r>
-                        <a:rPr lang="en-US" dirty="0" smtClean="0"/>
+                        <a:rPr lang="en-US" dirty="0"/>
                         <a:t>YEAR</a:t>
                       </a:r>
-                      <a:endParaRPr lang="en-US" dirty="0"/>
                     </a:p>
                   </a:txBody>
                   <a:tcPr/>
@@ -12486,10 +12228,9 @@
                     <a:lstStyle/>
                     <a:p>
                       <a:r>
-                        <a:rPr lang="en-US" dirty="0" smtClean="0"/>
+                        <a:rPr lang="en-US" dirty="0"/>
                         <a:t>ID</a:t>
                       </a:r>
-                      <a:endParaRPr lang="en-US" dirty="0"/>
                     </a:p>
                   </a:txBody>
                   <a:tcPr/>
@@ -12507,10 +12248,9 @@
                     <a:lstStyle/>
                     <a:p>
                       <a:r>
-                        <a:rPr lang="en-US" dirty="0" smtClean="0"/>
+                        <a:rPr lang="en-US" dirty="0"/>
                         <a:t>2019</a:t>
                       </a:r>
-                      <a:endParaRPr lang="en-US" dirty="0"/>
                     </a:p>
                   </a:txBody>
                   <a:tcPr/>
@@ -12521,10 +12261,9 @@
                     <a:lstStyle/>
                     <a:p>
                       <a:r>
-                        <a:rPr lang="en-US" dirty="0" smtClean="0"/>
+                        <a:rPr lang="en-US" dirty="0"/>
                         <a:t>5</a:t>
                       </a:r>
-                      <a:endParaRPr lang="en-US" dirty="0"/>
                     </a:p>
                   </a:txBody>
                   <a:tcPr/>
@@ -12542,10 +12281,9 @@
                     <a:lstStyle/>
                     <a:p>
                       <a:r>
-                        <a:rPr lang="en-US" dirty="0" smtClean="0"/>
+                        <a:rPr lang="en-US" dirty="0"/>
                         <a:t>2019</a:t>
                       </a:r>
-                      <a:endParaRPr lang="en-US" dirty="0"/>
                     </a:p>
                   </a:txBody>
                   <a:tcPr/>
@@ -12556,10 +12294,9 @@
                     <a:lstStyle/>
                     <a:p>
                       <a:r>
-                        <a:rPr lang="en-US" dirty="0" smtClean="0"/>
+                        <a:rPr lang="en-US" dirty="0"/>
                         <a:t>7</a:t>
                       </a:r>
-                      <a:endParaRPr lang="en-US" dirty="0"/>
                     </a:p>
                   </a:txBody>
                   <a:tcPr/>
@@ -12577,10 +12314,9 @@
                     <a:lstStyle/>
                     <a:p>
                       <a:r>
-                        <a:rPr lang="en-US" dirty="0" smtClean="0"/>
+                        <a:rPr lang="en-US" dirty="0"/>
                         <a:t>2019</a:t>
                       </a:r>
-                      <a:endParaRPr lang="en-US" dirty="0"/>
                     </a:p>
                   </a:txBody>
                   <a:tcPr/>
@@ -12591,10 +12327,9 @@
                     <a:lstStyle/>
                     <a:p>
                       <a:r>
-                        <a:rPr lang="en-US" dirty="0" smtClean="0"/>
+                        <a:rPr lang="en-US" dirty="0"/>
                         <a:t>1</a:t>
                       </a:r>
-                      <a:endParaRPr lang="en-US" dirty="0"/>
                     </a:p>
                   </a:txBody>
                   <a:tcPr/>
@@ -12710,10 +12445,9 @@
           <a:lstStyle/>
           <a:p>
             <a:r>
-              <a:rPr lang="en-US" dirty="0" smtClean="0"/>
+              <a:rPr lang="en-US" dirty="0"/>
               <a:t>SELECT</a:t>
             </a:r>
-            <a:endParaRPr lang="en-US" dirty="0"/>
           </a:p>
         </p:txBody>
       </p:sp>
@@ -12740,10 +12474,9 @@
           <a:lstStyle/>
           <a:p>
             <a:r>
-              <a:rPr lang="en-US" dirty="0" smtClean="0"/>
+              <a:rPr lang="en-US" dirty="0"/>
               <a:t>SELECT</a:t>
             </a:r>
-            <a:endParaRPr lang="en-US" dirty="0"/>
           </a:p>
         </p:txBody>
       </p:sp>
@@ -12793,10 +12526,9 @@
           <a:lstStyle/>
           <a:p>
             <a:r>
-              <a:rPr lang="en-US" dirty="0" smtClean="0"/>
+              <a:rPr lang="en-US" dirty="0"/>
               <a:t>Fixing Ordering</a:t>
             </a:r>
-            <a:endParaRPr lang="en-US" dirty="0"/>
           </a:p>
         </p:txBody>
       </p:sp>
@@ -12821,7 +12553,7 @@
           <a:lstStyle/>
           <a:p>
             <a:r>
-              <a:rPr lang="en-US" dirty="0" smtClean="0"/>
+              <a:rPr lang="en-US" dirty="0"/>
               <a:t>If ordering is strict, then 2 SELECTs will have exactly same result</a:t>
             </a:r>
           </a:p>
@@ -12831,28 +12563,24 @@
               <a:t>SELECT * from Book order by YEAR </a:t>
             </a:r>
             <a:r>
-              <a:rPr lang="en-US" i="1" dirty="0" err="1" smtClean="0"/>
+              <a:rPr lang="en-US" i="1" dirty="0" err="1"/>
               <a:t>desc</a:t>
             </a:r>
             <a:r>
-              <a:rPr lang="en-US" i="1" dirty="0" smtClean="0"/>
+              <a:rPr lang="en-US" i="1" dirty="0"/>
               <a:t>, ID </a:t>
             </a:r>
             <a:r>
-              <a:rPr lang="en-US" i="1" dirty="0" err="1" smtClean="0"/>
+              <a:rPr lang="en-US" i="1" dirty="0" err="1"/>
               <a:t>desc</a:t>
             </a:r>
             <a:r>
-              <a:rPr lang="en-US" i="1" dirty="0" smtClean="0"/>
-              <a:t> </a:t>
-            </a:r>
-            <a:r>
               <a:rPr lang="en-US" i="1" dirty="0"/>
-              <a:t>limit 3</a:t>
-            </a:r>
-          </a:p>
-          <a:p>
-            <a:endParaRPr lang="en-US" dirty="0" smtClean="0"/>
+              <a:t> limit 3</a:t>
+            </a:r>
+          </a:p>
+          <a:p>
+            <a:endParaRPr lang="en-US" dirty="0"/>
           </a:p>
           <a:p>
             <a:endParaRPr lang="en-US" dirty="0"/>
@@ -12906,10 +12634,9 @@
                     <a:lstStyle/>
                     <a:p>
                       <a:r>
-                        <a:rPr lang="en-US" dirty="0" smtClean="0"/>
+                        <a:rPr lang="en-US" dirty="0"/>
                         <a:t>YEAR</a:t>
                       </a:r>
-                      <a:endParaRPr lang="en-US" dirty="0"/>
                     </a:p>
                   </a:txBody>
                   <a:tcPr/>
@@ -12920,10 +12647,9 @@
                     <a:lstStyle/>
                     <a:p>
                       <a:r>
-                        <a:rPr lang="en-US" dirty="0" smtClean="0"/>
+                        <a:rPr lang="en-US" dirty="0"/>
                         <a:t>ID</a:t>
                       </a:r>
-                      <a:endParaRPr lang="en-US" dirty="0"/>
                     </a:p>
                   </a:txBody>
                   <a:tcPr/>
@@ -12941,10 +12667,9 @@
                     <a:lstStyle/>
                     <a:p>
                       <a:r>
-                        <a:rPr lang="en-US" dirty="0" smtClean="0"/>
+                        <a:rPr lang="en-US" dirty="0"/>
                         <a:t>2019</a:t>
                       </a:r>
-                      <a:endParaRPr lang="en-US" dirty="0"/>
                     </a:p>
                   </a:txBody>
                   <a:tcPr/>
@@ -12955,10 +12680,9 @@
                     <a:lstStyle/>
                     <a:p>
                       <a:r>
-                        <a:rPr lang="en-US" dirty="0" smtClean="0"/>
+                        <a:rPr lang="en-US" dirty="0"/>
                         <a:t>3</a:t>
                       </a:r>
-                      <a:endParaRPr lang="en-US" dirty="0"/>
                     </a:p>
                   </a:txBody>
                   <a:tcPr/>
@@ -12976,10 +12700,9 @@
                     <a:lstStyle/>
                     <a:p>
                       <a:r>
-                        <a:rPr lang="en-US" dirty="0" smtClean="0"/>
+                        <a:rPr lang="en-US" dirty="0"/>
                         <a:t>2019</a:t>
                       </a:r>
-                      <a:endParaRPr lang="en-US" dirty="0"/>
                     </a:p>
                   </a:txBody>
                   <a:tcPr/>
@@ -12990,10 +12713,9 @@
                     <a:lstStyle/>
                     <a:p>
                       <a:r>
-                        <a:rPr lang="en-US" dirty="0" smtClean="0"/>
+                        <a:rPr lang="en-US" dirty="0"/>
                         <a:t>5</a:t>
                       </a:r>
-                      <a:endParaRPr lang="en-US" dirty="0"/>
                     </a:p>
                   </a:txBody>
                   <a:tcPr/>
@@ -13011,10 +12733,9 @@
                     <a:lstStyle/>
                     <a:p>
                       <a:r>
-                        <a:rPr lang="en-US" dirty="0" smtClean="0"/>
+                        <a:rPr lang="en-US" dirty="0"/>
                         <a:t>2019</a:t>
                       </a:r>
-                      <a:endParaRPr lang="en-US" dirty="0"/>
                     </a:p>
                   </a:txBody>
                   <a:tcPr/>
@@ -13025,10 +12746,9 @@
                     <a:lstStyle/>
                     <a:p>
                       <a:r>
-                        <a:rPr lang="en-US" dirty="0" smtClean="0"/>
+                        <a:rPr lang="en-US" dirty="0"/>
                         <a:t>1</a:t>
                       </a:r>
-                      <a:endParaRPr lang="en-US" dirty="0"/>
                     </a:p>
                   </a:txBody>
                   <a:tcPr/>
@@ -13046,10 +12766,9 @@
                     <a:lstStyle/>
                     <a:p>
                       <a:r>
-                        <a:rPr lang="en-US" dirty="0" smtClean="0"/>
+                        <a:rPr lang="en-US" dirty="0"/>
                         <a:t>2019</a:t>
                       </a:r>
-                      <a:endParaRPr lang="en-US" dirty="0"/>
                     </a:p>
                   </a:txBody>
                   <a:tcPr/>
@@ -13060,10 +12779,9 @@
                     <a:lstStyle/>
                     <a:p>
                       <a:r>
-                        <a:rPr lang="en-US" dirty="0" smtClean="0"/>
+                        <a:rPr lang="en-US" dirty="0"/>
                         <a:t>7</a:t>
                       </a:r>
-                      <a:endParaRPr lang="en-US" dirty="0"/>
                     </a:p>
                   </a:txBody>
                   <a:tcPr/>
@@ -13081,10 +12799,9 @@
                     <a:lstStyle/>
                     <a:p>
                       <a:r>
-                        <a:rPr lang="en-US" dirty="0" smtClean="0"/>
+                        <a:rPr lang="en-US" dirty="0"/>
                         <a:t>1969</a:t>
                       </a:r>
-                      <a:endParaRPr lang="en-US" dirty="0"/>
                     </a:p>
                   </a:txBody>
                   <a:tcPr/>
@@ -13095,10 +12812,9 @@
                     <a:lstStyle/>
                     <a:p>
                       <a:r>
-                        <a:rPr lang="en-US" dirty="0" smtClean="0"/>
+                        <a:rPr lang="en-US" dirty="0"/>
                         <a:t>9</a:t>
                       </a:r>
-                      <a:endParaRPr lang="en-US" dirty="0"/>
                     </a:p>
                   </a:txBody>
                   <a:tcPr/>
@@ -13160,10 +12876,9 @@
                     <a:lstStyle/>
                     <a:p>
                       <a:r>
-                        <a:rPr lang="en-US" dirty="0" smtClean="0"/>
+                        <a:rPr lang="en-US" dirty="0"/>
                         <a:t>YEAR</a:t>
                       </a:r>
-                      <a:endParaRPr lang="en-US" dirty="0"/>
                     </a:p>
                   </a:txBody>
                   <a:tcPr/>
@@ -13174,10 +12889,9 @@
                     <a:lstStyle/>
                     <a:p>
                       <a:r>
-                        <a:rPr lang="en-US" dirty="0" smtClean="0"/>
+                        <a:rPr lang="en-US" dirty="0"/>
                         <a:t>ID</a:t>
                       </a:r>
-                      <a:endParaRPr lang="en-US" dirty="0"/>
                     </a:p>
                   </a:txBody>
                   <a:tcPr/>
@@ -13195,10 +12909,9 @@
                     <a:lstStyle/>
                     <a:p>
                       <a:r>
-                        <a:rPr lang="en-US" dirty="0" smtClean="0"/>
+                        <a:rPr lang="en-US" dirty="0"/>
                         <a:t>2019</a:t>
                       </a:r>
-                      <a:endParaRPr lang="en-US" dirty="0"/>
                     </a:p>
                   </a:txBody>
                   <a:tcPr/>
@@ -13209,10 +12922,9 @@
                     <a:lstStyle/>
                     <a:p>
                       <a:r>
-                        <a:rPr lang="en-US" dirty="0" smtClean="0"/>
+                        <a:rPr lang="en-US" dirty="0"/>
                         <a:t>7</a:t>
                       </a:r>
-                      <a:endParaRPr lang="en-US" dirty="0"/>
                     </a:p>
                   </a:txBody>
                   <a:tcPr/>
@@ -13230,10 +12942,9 @@
                     <a:lstStyle/>
                     <a:p>
                       <a:r>
-                        <a:rPr lang="en-US" dirty="0" smtClean="0"/>
+                        <a:rPr lang="en-US" dirty="0"/>
                         <a:t>2019</a:t>
                       </a:r>
-                      <a:endParaRPr lang="en-US" dirty="0"/>
                     </a:p>
                   </a:txBody>
                   <a:tcPr/>
@@ -13244,10 +12955,9 @@
                     <a:lstStyle/>
                     <a:p>
                       <a:r>
-                        <a:rPr lang="en-US" dirty="0" smtClean="0"/>
+                        <a:rPr lang="en-US" dirty="0"/>
                         <a:t>5</a:t>
                       </a:r>
-                      <a:endParaRPr lang="en-US" dirty="0"/>
                     </a:p>
                   </a:txBody>
                   <a:tcPr/>
@@ -13265,10 +12975,9 @@
                     <a:lstStyle/>
                     <a:p>
                       <a:r>
-                        <a:rPr lang="en-US" dirty="0" smtClean="0"/>
+                        <a:rPr lang="en-US" dirty="0"/>
                         <a:t>2019</a:t>
                       </a:r>
-                      <a:endParaRPr lang="en-US" dirty="0"/>
                     </a:p>
                   </a:txBody>
                   <a:tcPr/>
@@ -13279,10 +12988,9 @@
                     <a:lstStyle/>
                     <a:p>
                       <a:r>
-                        <a:rPr lang="en-US" dirty="0" smtClean="0"/>
+                        <a:rPr lang="en-US" dirty="0"/>
                         <a:t>3</a:t>
                       </a:r>
-                      <a:endParaRPr lang="en-US" dirty="0"/>
                     </a:p>
                   </a:txBody>
                   <a:tcPr/>
@@ -13359,10 +13067,9 @@
           <a:lstStyle/>
           <a:p>
             <a:r>
-              <a:rPr lang="en-US" dirty="0" smtClean="0"/>
+              <a:rPr lang="en-US" dirty="0"/>
               <a:t>SELECT</a:t>
             </a:r>
-            <a:endParaRPr lang="en-US" dirty="0"/>
           </a:p>
         </p:txBody>
       </p:sp>
@@ -13417,18 +13124,17 @@
           <a:lstStyle/>
           <a:p>
             <a:r>
-              <a:rPr lang="en-US" dirty="0" smtClean="0"/>
+              <a:rPr lang="en-US" dirty="0"/>
               <a:t>What About 2</a:t>
             </a:r>
             <a:r>
-              <a:rPr lang="en-US" baseline="30000" dirty="0" smtClean="0"/>
+              <a:rPr lang="en-US" baseline="30000" dirty="0"/>
               <a:t>nd</a:t>
             </a:r>
             <a:r>
-              <a:rPr lang="en-US" dirty="0" smtClean="0"/>
+              <a:rPr lang="en-US" dirty="0"/>
               <a:t> Page?</a:t>
             </a:r>
-            <a:endParaRPr lang="en-US" dirty="0"/>
           </a:p>
         </p:txBody>
       </p:sp>
@@ -13455,13 +13161,13 @@
           <a:lstStyle/>
           <a:p>
             <a:r>
-              <a:rPr lang="en-US" dirty="0" smtClean="0"/>
+              <a:rPr lang="en-US" dirty="0"/>
               <a:t>IF WHERE only based on YEAR, we could lose data when iterating</a:t>
             </a:r>
           </a:p>
           <a:p>
             <a:r>
-              <a:rPr lang="en-US" dirty="0" smtClean="0"/>
+              <a:rPr lang="en-US" dirty="0"/>
               <a:t>WHERE must be based on all columns in the ORDER BY</a:t>
             </a:r>
           </a:p>
@@ -13484,23 +13190,18 @@
             </a:r>
             <a:r>
               <a:rPr lang="en-US" i="1" dirty="0"/>
-              <a:t> limit </a:t>
-            </a:r>
-            <a:r>
-              <a:rPr lang="en-US" i="1" dirty="0" smtClean="0"/>
-              <a:t>3 </a:t>
-            </a:r>
-            <a:r>
-              <a:rPr lang="en-US" b="1" i="1" dirty="0" smtClean="0"/>
+              <a:t> limit 3 </a:t>
+            </a:r>
+            <a:r>
+              <a:rPr lang="en-US" b="1" i="1" dirty="0"/>
               <a:t>where YEAR &lt; 2019</a:t>
             </a:r>
           </a:p>
           <a:p>
             <a:r>
-              <a:rPr lang="en-US" dirty="0" smtClean="0"/>
+              <a:rPr lang="en-US" dirty="0"/>
               <a:t>The row &lt;2019,1&gt; would be wrongly skipped</a:t>
             </a:r>
-            <a:endParaRPr lang="en-US" dirty="0"/>
           </a:p>
           <a:p>
             <a:endParaRPr lang="en-US" dirty="0"/>
@@ -13554,10 +13255,9 @@
                     <a:lstStyle/>
                     <a:p>
                       <a:r>
-                        <a:rPr lang="en-US" dirty="0" smtClean="0"/>
+                        <a:rPr lang="en-US" dirty="0"/>
                         <a:t>YEAR</a:t>
                       </a:r>
-                      <a:endParaRPr lang="en-US" dirty="0"/>
                     </a:p>
                   </a:txBody>
                   <a:tcPr/>
@@ -13568,10 +13268,9 @@
                     <a:lstStyle/>
                     <a:p>
                       <a:r>
-                        <a:rPr lang="en-US" dirty="0" smtClean="0"/>
+                        <a:rPr lang="en-US" dirty="0"/>
                         <a:t>ID</a:t>
                       </a:r>
-                      <a:endParaRPr lang="en-US" dirty="0"/>
                     </a:p>
                   </a:txBody>
                   <a:tcPr/>
@@ -13589,10 +13288,9 @@
                     <a:lstStyle/>
                     <a:p>
                       <a:r>
-                        <a:rPr lang="en-US" dirty="0" smtClean="0"/>
+                        <a:rPr lang="en-US" dirty="0"/>
                         <a:t>2019</a:t>
                       </a:r>
-                      <a:endParaRPr lang="en-US" dirty="0"/>
                     </a:p>
                   </a:txBody>
                   <a:tcPr/>
@@ -13603,10 +13301,9 @@
                     <a:lstStyle/>
                     <a:p>
                       <a:r>
-                        <a:rPr lang="en-US" dirty="0" smtClean="0"/>
+                        <a:rPr lang="en-US" dirty="0"/>
                         <a:t>3</a:t>
                       </a:r>
-                      <a:endParaRPr lang="en-US" dirty="0"/>
                     </a:p>
                   </a:txBody>
                   <a:tcPr/>
@@ -13624,10 +13321,9 @@
                     <a:lstStyle/>
                     <a:p>
                       <a:r>
-                        <a:rPr lang="en-US" dirty="0" smtClean="0"/>
+                        <a:rPr lang="en-US" dirty="0"/>
                         <a:t>2019</a:t>
                       </a:r>
-                      <a:endParaRPr lang="en-US" dirty="0"/>
                     </a:p>
                   </a:txBody>
                   <a:tcPr/>
@@ -13638,10 +13334,9 @@
                     <a:lstStyle/>
                     <a:p>
                       <a:r>
-                        <a:rPr lang="en-US" dirty="0" smtClean="0"/>
+                        <a:rPr lang="en-US" dirty="0"/>
                         <a:t>5</a:t>
                       </a:r>
-                      <a:endParaRPr lang="en-US" dirty="0"/>
                     </a:p>
                   </a:txBody>
                   <a:tcPr/>
@@ -13659,10 +13354,9 @@
                     <a:lstStyle/>
                     <a:p>
                       <a:r>
-                        <a:rPr lang="en-US" dirty="0" smtClean="0"/>
+                        <a:rPr lang="en-US" dirty="0"/>
                         <a:t>2019</a:t>
                       </a:r>
-                      <a:endParaRPr lang="en-US" dirty="0"/>
                     </a:p>
                   </a:txBody>
                   <a:tcPr/>
@@ -13673,10 +13367,9 @@
                     <a:lstStyle/>
                     <a:p>
                       <a:r>
-                        <a:rPr lang="en-US" dirty="0" smtClean="0"/>
+                        <a:rPr lang="en-US" dirty="0"/>
                         <a:t>1</a:t>
                       </a:r>
-                      <a:endParaRPr lang="en-US" dirty="0"/>
                     </a:p>
                   </a:txBody>
                   <a:tcPr/>
@@ -13694,10 +13387,9 @@
                     <a:lstStyle/>
                     <a:p>
                       <a:r>
-                        <a:rPr lang="en-US" dirty="0" smtClean="0"/>
+                        <a:rPr lang="en-US" dirty="0"/>
                         <a:t>2019</a:t>
                       </a:r>
-                      <a:endParaRPr lang="en-US" dirty="0"/>
                     </a:p>
                   </a:txBody>
                   <a:tcPr/>
@@ -13708,10 +13400,9 @@
                     <a:lstStyle/>
                     <a:p>
                       <a:r>
-                        <a:rPr lang="en-US" dirty="0" smtClean="0"/>
+                        <a:rPr lang="en-US" dirty="0"/>
                         <a:t>7</a:t>
                       </a:r>
-                      <a:endParaRPr lang="en-US" dirty="0"/>
                     </a:p>
                   </a:txBody>
                   <a:tcPr/>
@@ -13729,10 +13420,9 @@
                     <a:lstStyle/>
                     <a:p>
                       <a:r>
-                        <a:rPr lang="en-US" dirty="0" smtClean="0"/>
+                        <a:rPr lang="en-US" dirty="0"/>
                         <a:t>1969</a:t>
                       </a:r>
-                      <a:endParaRPr lang="en-US" dirty="0"/>
                     </a:p>
                   </a:txBody>
                   <a:tcPr/>
@@ -13743,10 +13433,9 @@
                     <a:lstStyle/>
                     <a:p>
                       <a:r>
-                        <a:rPr lang="en-US" dirty="0" smtClean="0"/>
+                        <a:rPr lang="en-US" dirty="0"/>
                         <a:t>9</a:t>
                       </a:r>
-                      <a:endParaRPr lang="en-US" dirty="0"/>
                     </a:p>
                   </a:txBody>
                   <a:tcPr/>
@@ -13808,10 +13497,9 @@
                     <a:lstStyle/>
                     <a:p>
                       <a:r>
-                        <a:rPr lang="en-US" dirty="0" smtClean="0"/>
+                        <a:rPr lang="en-US" dirty="0"/>
                         <a:t>YEAR</a:t>
                       </a:r>
-                      <a:endParaRPr lang="en-US" dirty="0"/>
                     </a:p>
                   </a:txBody>
                   <a:tcPr/>
@@ -13822,10 +13510,9 @@
                     <a:lstStyle/>
                     <a:p>
                       <a:r>
-                        <a:rPr lang="en-US" dirty="0" smtClean="0"/>
+                        <a:rPr lang="en-US" dirty="0"/>
                         <a:t>ID</a:t>
                       </a:r>
-                      <a:endParaRPr lang="en-US" dirty="0"/>
                     </a:p>
                   </a:txBody>
                   <a:tcPr/>
@@ -13843,10 +13530,9 @@
                     <a:lstStyle/>
                     <a:p>
                       <a:r>
-                        <a:rPr lang="en-US" dirty="0" smtClean="0"/>
+                        <a:rPr lang="en-US" dirty="0"/>
                         <a:t>1969</a:t>
                       </a:r>
-                      <a:endParaRPr lang="en-US" dirty="0"/>
                     </a:p>
                   </a:txBody>
                   <a:tcPr/>
@@ -13857,10 +13543,9 @@
                     <a:lstStyle/>
                     <a:p>
                       <a:r>
-                        <a:rPr lang="en-US" dirty="0" smtClean="0"/>
+                        <a:rPr lang="en-US" dirty="0"/>
                         <a:t>9</a:t>
                       </a:r>
-                      <a:endParaRPr lang="en-US" dirty="0"/>
                     </a:p>
                   </a:txBody>
                   <a:tcPr/>
@@ -13937,10 +13622,9 @@
           <a:lstStyle/>
           <a:p>
             <a:r>
-              <a:rPr lang="en-US" dirty="0" smtClean="0"/>
+              <a:rPr lang="en-US" dirty="0"/>
               <a:t>SELECT</a:t>
             </a:r>
-            <a:endParaRPr lang="en-US" dirty="0"/>
           </a:p>
         </p:txBody>
       </p:sp>
@@ -14038,11 +13722,7 @@
           <a:p>
             <a:r>
               <a:rPr lang="en-US" dirty="0"/>
-              <a:t>Not so great solution: provide </a:t>
-            </a:r>
-            <a:r>
-              <a:rPr lang="en-US" dirty="0" smtClean="0"/>
-              <a:t>an </a:t>
+              <a:t>Not so great solution: provide an </a:t>
             </a:r>
             <a:r>
               <a:rPr lang="en-US" i="1" dirty="0"/>
@@ -14118,10 +13798,9 @@
           <a:lstStyle/>
           <a:p>
             <a:r>
-              <a:rPr lang="en-US" dirty="0" smtClean="0"/>
+              <a:rPr lang="en-US" dirty="0"/>
               <a:t>Fix: Handle Matches in WHERE</a:t>
             </a:r>
-            <a:endParaRPr lang="en-US" dirty="0"/>
           </a:p>
         </p:txBody>
       </p:sp>
@@ -14146,22 +13825,18 @@
           <a:lstStyle/>
           <a:p>
             <a:r>
-              <a:rPr lang="en-US" dirty="0" smtClean="0"/>
+              <a:rPr lang="en-US" dirty="0"/>
               <a:t>Last element in first page: &lt;2019,3&gt;</a:t>
             </a:r>
           </a:p>
           <a:p>
             <a:r>
-              <a:rPr lang="en-US" dirty="0" smtClean="0"/>
+              <a:rPr lang="en-US" dirty="0"/>
               <a:t>Page 2: </a:t>
             </a:r>
             <a:r>
-              <a:rPr lang="en-US" i="1" dirty="0" smtClean="0"/>
-              <a:t>SELECT </a:t>
-            </a:r>
-            <a:r>
               <a:rPr lang="en-US" i="1" dirty="0"/>
-              <a:t>* from Book order by YEAR </a:t>
+              <a:t>SELECT * from Book order by YEAR </a:t>
             </a:r>
             <a:r>
               <a:rPr lang="en-US" i="1" dirty="0" err="1"/>
@@ -14181,13 +13856,8 @@
             </a:r>
             <a:r>
               <a:rPr lang="en-US" b="1" i="1" dirty="0"/>
-              <a:t>YEAR &lt; </a:t>
-            </a:r>
-            <a:r>
-              <a:rPr lang="en-US" b="1" i="1" dirty="0" smtClean="0"/>
-              <a:t>2019 or (YEAR = 2019 and ID &lt; 3)</a:t>
-            </a:r>
-            <a:endParaRPr lang="en-US" b="1" i="1" dirty="0"/>
+              <a:t>YEAR &lt; 2019 or (YEAR = 2019 and ID &lt; 3)</a:t>
+            </a:r>
           </a:p>
           <a:p>
             <a:endParaRPr lang="en-US" dirty="0"/>
@@ -14241,10 +13911,9 @@
                     <a:lstStyle/>
                     <a:p>
                       <a:r>
-                        <a:rPr lang="en-US" dirty="0" smtClean="0"/>
+                        <a:rPr lang="en-US" dirty="0"/>
                         <a:t>YEAR</a:t>
                       </a:r>
-                      <a:endParaRPr lang="en-US" dirty="0"/>
                     </a:p>
                   </a:txBody>
                   <a:tcPr/>
@@ -14255,10 +13924,9 @@
                     <a:lstStyle/>
                     <a:p>
                       <a:r>
-                        <a:rPr lang="en-US" dirty="0" smtClean="0"/>
+                        <a:rPr lang="en-US" dirty="0"/>
                         <a:t>ID</a:t>
                       </a:r>
-                      <a:endParaRPr lang="en-US" dirty="0"/>
                     </a:p>
                   </a:txBody>
                   <a:tcPr/>
@@ -14276,10 +13944,9 @@
                     <a:lstStyle/>
                     <a:p>
                       <a:r>
-                        <a:rPr lang="en-US" dirty="0" smtClean="0"/>
+                        <a:rPr lang="en-US" dirty="0"/>
                         <a:t>2019</a:t>
                       </a:r>
-                      <a:endParaRPr lang="en-US" dirty="0"/>
                     </a:p>
                   </a:txBody>
                   <a:tcPr/>
@@ -14290,10 +13957,9 @@
                     <a:lstStyle/>
                     <a:p>
                       <a:r>
-                        <a:rPr lang="en-US" dirty="0" smtClean="0"/>
+                        <a:rPr lang="en-US" dirty="0"/>
                         <a:t>3</a:t>
                       </a:r>
-                      <a:endParaRPr lang="en-US" dirty="0"/>
                     </a:p>
                   </a:txBody>
                   <a:tcPr/>
@@ -14311,10 +13977,9 @@
                     <a:lstStyle/>
                     <a:p>
                       <a:r>
-                        <a:rPr lang="en-US" dirty="0" smtClean="0"/>
+                        <a:rPr lang="en-US" dirty="0"/>
                         <a:t>2019</a:t>
                       </a:r>
-                      <a:endParaRPr lang="en-US" dirty="0"/>
                     </a:p>
                   </a:txBody>
                   <a:tcPr/>
@@ -14325,10 +13990,9 @@
                     <a:lstStyle/>
                     <a:p>
                       <a:r>
-                        <a:rPr lang="en-US" dirty="0" smtClean="0"/>
+                        <a:rPr lang="en-US" dirty="0"/>
                         <a:t>5</a:t>
                       </a:r>
-                      <a:endParaRPr lang="en-US" dirty="0"/>
                     </a:p>
                   </a:txBody>
                   <a:tcPr/>
@@ -14346,10 +14010,9 @@
                     <a:lstStyle/>
                     <a:p>
                       <a:r>
-                        <a:rPr lang="en-US" dirty="0" smtClean="0"/>
+                        <a:rPr lang="en-US" dirty="0"/>
                         <a:t>2019</a:t>
                       </a:r>
-                      <a:endParaRPr lang="en-US" dirty="0"/>
                     </a:p>
                   </a:txBody>
                   <a:tcPr/>
@@ -14360,10 +14023,9 @@
                     <a:lstStyle/>
                     <a:p>
                       <a:r>
-                        <a:rPr lang="en-US" dirty="0" smtClean="0"/>
+                        <a:rPr lang="en-US" dirty="0"/>
                         <a:t>1</a:t>
                       </a:r>
-                      <a:endParaRPr lang="en-US" dirty="0"/>
                     </a:p>
                   </a:txBody>
                   <a:tcPr/>
@@ -14381,10 +14043,9 @@
                     <a:lstStyle/>
                     <a:p>
                       <a:r>
-                        <a:rPr lang="en-US" dirty="0" smtClean="0"/>
+                        <a:rPr lang="en-US" dirty="0"/>
                         <a:t>2019</a:t>
                       </a:r>
-                      <a:endParaRPr lang="en-US" dirty="0"/>
                     </a:p>
                   </a:txBody>
                   <a:tcPr/>
@@ -14395,10 +14056,9 @@
                     <a:lstStyle/>
                     <a:p>
                       <a:r>
-                        <a:rPr lang="en-US" dirty="0" smtClean="0"/>
+                        <a:rPr lang="en-US" dirty="0"/>
                         <a:t>7</a:t>
                       </a:r>
-                      <a:endParaRPr lang="en-US" dirty="0"/>
                     </a:p>
                   </a:txBody>
                   <a:tcPr/>
@@ -14416,10 +14076,9 @@
                     <a:lstStyle/>
                     <a:p>
                       <a:r>
-                        <a:rPr lang="en-US" dirty="0" smtClean="0"/>
+                        <a:rPr lang="en-US" dirty="0"/>
                         <a:t>1969</a:t>
                       </a:r>
-                      <a:endParaRPr lang="en-US" dirty="0"/>
                     </a:p>
                   </a:txBody>
                   <a:tcPr/>
@@ -14430,10 +14089,9 @@
                     <a:lstStyle/>
                     <a:p>
                       <a:r>
-                        <a:rPr lang="en-US" dirty="0" smtClean="0"/>
+                        <a:rPr lang="en-US" dirty="0"/>
                         <a:t>9</a:t>
                       </a:r>
-                      <a:endParaRPr lang="en-US" dirty="0"/>
                     </a:p>
                   </a:txBody>
                   <a:tcPr/>
@@ -14495,10 +14153,9 @@
                     <a:lstStyle/>
                     <a:p>
                       <a:r>
-                        <a:rPr lang="en-US" dirty="0" smtClean="0"/>
+                        <a:rPr lang="en-US" dirty="0"/>
                         <a:t>YEAR</a:t>
                       </a:r>
-                      <a:endParaRPr lang="en-US" dirty="0"/>
                     </a:p>
                   </a:txBody>
                   <a:tcPr/>
@@ -14509,10 +14166,9 @@
                     <a:lstStyle/>
                     <a:p>
                       <a:r>
-                        <a:rPr lang="en-US" dirty="0" smtClean="0"/>
+                        <a:rPr lang="en-US" dirty="0"/>
                         <a:t>ID</a:t>
                       </a:r>
-                      <a:endParaRPr lang="en-US" dirty="0"/>
                     </a:p>
                   </a:txBody>
                   <a:tcPr/>
@@ -14530,10 +14186,9 @@
                     <a:lstStyle/>
                     <a:p>
                       <a:r>
-                        <a:rPr lang="en-US" dirty="0" smtClean="0"/>
+                        <a:rPr lang="en-US" dirty="0"/>
                         <a:t>2019</a:t>
                       </a:r>
-                      <a:endParaRPr lang="en-US" dirty="0"/>
                     </a:p>
                   </a:txBody>
                   <a:tcPr/>
@@ -14544,10 +14199,9 @@
                     <a:lstStyle/>
                     <a:p>
                       <a:r>
-                        <a:rPr lang="en-US" dirty="0" smtClean="0"/>
+                        <a:rPr lang="en-US" dirty="0"/>
                         <a:t>1</a:t>
                       </a:r>
-                      <a:endParaRPr lang="en-US" dirty="0"/>
                     </a:p>
                   </a:txBody>
                   <a:tcPr/>
@@ -14565,10 +14219,9 @@
                     <a:lstStyle/>
                     <a:p>
                       <a:r>
-                        <a:rPr lang="en-US" dirty="0" smtClean="0"/>
+                        <a:rPr lang="en-US" dirty="0"/>
                         <a:t>1969</a:t>
                       </a:r>
-                      <a:endParaRPr lang="en-US" dirty="0"/>
                     </a:p>
                   </a:txBody>
                   <a:tcPr/>
@@ -14579,10 +14232,9 @@
                     <a:lstStyle/>
                     <a:p>
                       <a:r>
-                        <a:rPr lang="en-US" dirty="0" smtClean="0"/>
+                        <a:rPr lang="en-US" dirty="0"/>
                         <a:t>9</a:t>
                       </a:r>
-                      <a:endParaRPr lang="en-US" dirty="0"/>
                     </a:p>
                   </a:txBody>
                   <a:tcPr/>
@@ -14659,10 +14311,9 @@
           <a:lstStyle/>
           <a:p>
             <a:r>
-              <a:rPr lang="en-US" dirty="0" smtClean="0"/>
+              <a:rPr lang="en-US" dirty="0"/>
               <a:t>SELECT</a:t>
             </a:r>
-            <a:endParaRPr lang="en-US" dirty="0"/>
           </a:p>
         </p:txBody>
       </p:sp>
@@ -14719,32 +14370,31 @@
           <a:lstStyle/>
           <a:p>
             <a:r>
-              <a:rPr lang="en-US" dirty="0" smtClean="0"/>
+              <a:rPr lang="en-US" dirty="0"/>
               <a:t>In </a:t>
             </a:r>
             <a:r>
-              <a:rPr lang="en-US" dirty="0" err="1" smtClean="0"/>
+              <a:rPr lang="en-US" dirty="0" err="1"/>
               <a:t>dto</a:t>
             </a:r>
             <a:r>
-              <a:rPr lang="en-US" dirty="0" smtClean="0"/>
+              <a:rPr lang="en-US" dirty="0"/>
               <a:t>, can simply have a “</a:t>
             </a:r>
             <a:r>
-              <a:rPr lang="en-US" i="1" dirty="0" smtClean="0"/>
+              <a:rPr lang="en-US" i="1" dirty="0"/>
               <a:t>next</a:t>
             </a:r>
             <a:r>
-              <a:rPr lang="en-US" dirty="0" smtClean="0"/>
+              <a:rPr lang="en-US" dirty="0"/>
               <a:t>” link URL</a:t>
             </a:r>
           </a:p>
           <a:p>
             <a:r>
-              <a:rPr lang="en-US" dirty="0" smtClean="0"/>
+              <a:rPr lang="en-US" dirty="0"/>
               <a:t>Need 2 query parameters to keep track of last item in current page</a:t>
             </a:r>
-            <a:endParaRPr lang="en-US" dirty="0"/>
           </a:p>
         </p:txBody>
       </p:sp>
@@ -14777,16 +14427,11 @@
               <a:rPr lang="en-US" sz="3600" dirty="0"/>
               <a:t> = {  </a:t>
             </a:r>
-            <a:endParaRPr lang="en-US" sz="3600" dirty="0" smtClean="0"/>
           </a:p>
           <a:p>
             <a:r>
               <a:rPr lang="en-US" sz="3600" dirty="0"/>
-              <a:t>	</a:t>
-            </a:r>
-            <a:r>
-              <a:rPr lang="en-US" sz="3600" dirty="0" smtClean="0"/>
-              <a:t>“</a:t>
+              <a:t>	“</a:t>
             </a:r>
             <a:r>
               <a:rPr lang="en-US" sz="3600" b="1" dirty="0"/>
@@ -14808,14 +14453,10 @@
             </a:r>
             <a:r>
               <a:rPr lang="en-US" sz="3600" dirty="0"/>
-              <a:t>     </a:t>
-            </a:r>
-            <a:r>
-              <a:rPr lang="en-US" sz="3600" dirty="0" smtClean="0"/>
-              <a:t> </a:t>
-            </a:r>
-            <a:r>
-              <a:rPr lang="en-US" sz="3600" i="1" dirty="0" smtClean="0"/>
+              <a:t>      </a:t>
+            </a:r>
+            <a:r>
+              <a:rPr lang="en-US" sz="3600" i="1" dirty="0"/>
               <a:t>“</a:t>
             </a:r>
             <a:r>
@@ -14824,40 +14465,34 @@
             </a:r>
             <a:r>
               <a:rPr lang="en-US" sz="3600" i="1" dirty="0"/>
-              <a:t>”: </a:t>
-            </a:r>
-            <a:r>
-              <a:rPr lang="en-US" sz="3600" i="1" dirty="0" smtClean="0"/>
-              <a:t>“/</a:t>
-            </a:r>
-            <a:r>
-              <a:rPr lang="en-US" sz="3600" i="1" dirty="0" err="1" smtClean="0"/>
+              <a:t>”: “/</a:t>
+            </a:r>
+            <a:r>
+              <a:rPr lang="en-US" sz="3600" i="1" dirty="0" err="1"/>
               <a:t>books?</a:t>
             </a:r>
             <a:r>
-              <a:rPr lang="en-US" sz="3600" b="1" i="1" dirty="0" err="1" smtClean="0"/>
+              <a:rPr lang="en-US" sz="3600" b="1" i="1" dirty="0" err="1"/>
               <a:t>keysetId</a:t>
             </a:r>
             <a:r>
-              <a:rPr lang="en-US" sz="3600" i="1" dirty="0" smtClean="0"/>
+              <a:rPr lang="en-US" sz="3600" i="1" dirty="0"/>
               <a:t>=3&amp;</a:t>
             </a:r>
             <a:r>
-              <a:rPr lang="en-US" sz="3600" b="1" i="1" dirty="0" smtClean="0"/>
+              <a:rPr lang="en-US" sz="3600" b="1" i="1" dirty="0"/>
               <a:t>keysetYear</a:t>
             </a:r>
             <a:r>
-              <a:rPr lang="en-US" sz="3600" i="1" dirty="0" smtClean="0"/>
+              <a:rPr lang="en-US" sz="3600" i="1" dirty="0"/>
               <a:t>=2019”</a:t>
             </a:r>
-            <a:endParaRPr lang="en-US" sz="3600" i="1" dirty="0"/>
-          </a:p>
-          <a:p>
-            <a:r>
-              <a:rPr lang="en-US" sz="3600" i="1" dirty="0" smtClean="0"/>
+          </a:p>
+          <a:p>
+            <a:r>
+              <a:rPr lang="en-US" sz="3600" i="1" dirty="0"/>
               <a:t>}</a:t>
             </a:r>
-            <a:endParaRPr lang="en-US" sz="3600" i="1" dirty="0"/>
           </a:p>
         </p:txBody>
       </p:sp>
@@ -14882,10 +14517,9 @@
           <a:lstStyle/>
           <a:p>
             <a:r>
-              <a:rPr lang="en-US" dirty="0" smtClean="0"/>
+              <a:rPr lang="en-US" dirty="0"/>
               <a:t>JSON Marshalling</a:t>
             </a:r>
-            <a:endParaRPr lang="en-US" dirty="0"/>
           </a:p>
         </p:txBody>
       </p:sp>
@@ -14935,10 +14569,9 @@
           <a:lstStyle/>
           <a:p>
             <a:r>
-              <a:rPr lang="en-US" dirty="0" smtClean="0"/>
+              <a:rPr lang="en-US" dirty="0"/>
               <a:t>Data Expansion</a:t>
             </a:r>
-            <a:endParaRPr lang="en-US" dirty="0"/>
           </a:p>
         </p:txBody>
       </p:sp>
@@ -15401,29 +15034,27 @@
           </a:p>
           <a:p>
             <a:r>
-              <a:rPr lang="en-US" b="1" dirty="0" smtClean="0"/>
+              <a:rPr lang="en-US" b="1" dirty="0"/>
               <a:t>advanced/rest/exception-handling</a:t>
             </a:r>
-            <a:endParaRPr lang="en-US" b="1" dirty="0"/>
-          </a:p>
-          <a:p>
-            <a:r>
-              <a:rPr lang="en-US" b="1" dirty="0" smtClean="0"/>
+          </a:p>
+          <a:p>
+            <a:r>
+              <a:rPr lang="en-US" b="1" dirty="0"/>
               <a:t>advanced/rest/rest-exception</a:t>
             </a:r>
           </a:p>
           <a:p>
             <a:r>
-              <a:rPr lang="en-US" b="1" dirty="0" smtClean="0"/>
-              <a:t>advanced/rest/pagination</a:t>
-            </a:r>
-          </a:p>
-          <a:p>
-            <a:r>
-              <a:rPr lang="en-US" b="1" dirty="0" smtClean="0"/>
-              <a:t>advanced/rest/gui-v2</a:t>
-            </a:r>
-            <a:endParaRPr lang="en-US" b="1" dirty="0"/>
+              <a:rPr lang="en-US" b="1" dirty="0"/>
+              <a:t>advanced/rest/pagination-offset</a:t>
+            </a:r>
+          </a:p>
+          <a:p>
+            <a:r>
+              <a:rPr lang="en-US" b="1" dirty="0"/>
+              <a:t>advanced/rest/pagination-keyset-gui-v2</a:t>
+            </a:r>
           </a:p>
           <a:p>
             <a:r>

</xml_diff>